<commit_message>
updating code and adding final presentation
</commit_message>
<xml_diff>
--- a/presentations/final.pptx
+++ b/presentations/final.pptx
@@ -10,14 +10,17 @@
     <p:sldId id="259" r:id="rId4"/>
     <p:sldId id="260" r:id="rId5"/>
     <p:sldId id="261" r:id="rId6"/>
-    <p:sldId id="267" r:id="rId7"/>
-    <p:sldId id="268" r:id="rId8"/>
-    <p:sldId id="262" r:id="rId9"/>
-    <p:sldId id="263" r:id="rId10"/>
-    <p:sldId id="264" r:id="rId11"/>
-    <p:sldId id="269" r:id="rId12"/>
-    <p:sldId id="270" r:id="rId13"/>
-    <p:sldId id="265" r:id="rId14"/>
+    <p:sldId id="272" r:id="rId7"/>
+    <p:sldId id="271" r:id="rId8"/>
+    <p:sldId id="267" r:id="rId9"/>
+    <p:sldId id="268" r:id="rId10"/>
+    <p:sldId id="262" r:id="rId11"/>
+    <p:sldId id="263" r:id="rId12"/>
+    <p:sldId id="264" r:id="rId13"/>
+    <p:sldId id="269" r:id="rId14"/>
+    <p:sldId id="270" r:id="rId15"/>
+    <p:sldId id="265" r:id="rId16"/>
+    <p:sldId id="273" r:id="rId17"/>
   </p:sldIdLst>
   <p:sldSz cx="12192000" cy="6858000"/>
   <p:notesSz cx="6858000" cy="9144000"/>
@@ -2559,7 +2562,7 @@
           <a:p>
             <a:fld id="{9A46B15B-F6DC-42CA-B5CC-72ADB0A57ABD}" type="datetimeFigureOut">
               <a:rPr lang="en-US" smtClean="0"/>
-              <a:t>2/21/2021</a:t>
+              <a:t>3/21/2021</a:t>
             </a:fld>
             <a:endParaRPr lang="en-US"/>
           </a:p>
@@ -2757,7 +2760,7 @@
           <a:p>
             <a:fld id="{9A46B15B-F6DC-42CA-B5CC-72ADB0A57ABD}" type="datetimeFigureOut">
               <a:rPr lang="en-US" smtClean="0"/>
-              <a:t>2/21/2021</a:t>
+              <a:t>3/21/2021</a:t>
             </a:fld>
             <a:endParaRPr lang="en-US"/>
           </a:p>
@@ -2965,7 +2968,7 @@
           <a:p>
             <a:fld id="{9A46B15B-F6DC-42CA-B5CC-72ADB0A57ABD}" type="datetimeFigureOut">
               <a:rPr lang="en-US" smtClean="0"/>
-              <a:t>2/21/2021</a:t>
+              <a:t>3/21/2021</a:t>
             </a:fld>
             <a:endParaRPr lang="en-US"/>
           </a:p>
@@ -3163,7 +3166,7 @@
           <a:p>
             <a:fld id="{9A46B15B-F6DC-42CA-B5CC-72ADB0A57ABD}" type="datetimeFigureOut">
               <a:rPr lang="en-US" smtClean="0"/>
-              <a:t>2/21/2021</a:t>
+              <a:t>3/21/2021</a:t>
             </a:fld>
             <a:endParaRPr lang="en-US"/>
           </a:p>
@@ -3438,7 +3441,7 @@
           <a:p>
             <a:fld id="{9A46B15B-F6DC-42CA-B5CC-72ADB0A57ABD}" type="datetimeFigureOut">
               <a:rPr lang="en-US" smtClean="0"/>
-              <a:t>2/21/2021</a:t>
+              <a:t>3/21/2021</a:t>
             </a:fld>
             <a:endParaRPr lang="en-US"/>
           </a:p>
@@ -3703,7 +3706,7 @@
           <a:p>
             <a:fld id="{9A46B15B-F6DC-42CA-B5CC-72ADB0A57ABD}" type="datetimeFigureOut">
               <a:rPr lang="en-US" smtClean="0"/>
-              <a:t>2/21/2021</a:t>
+              <a:t>3/21/2021</a:t>
             </a:fld>
             <a:endParaRPr lang="en-US"/>
           </a:p>
@@ -4115,7 +4118,7 @@
           <a:p>
             <a:fld id="{9A46B15B-F6DC-42CA-B5CC-72ADB0A57ABD}" type="datetimeFigureOut">
               <a:rPr lang="en-US" smtClean="0"/>
-              <a:t>2/21/2021</a:t>
+              <a:t>3/21/2021</a:t>
             </a:fld>
             <a:endParaRPr lang="en-US"/>
           </a:p>
@@ -4256,7 +4259,7 @@
           <a:p>
             <a:fld id="{9A46B15B-F6DC-42CA-B5CC-72ADB0A57ABD}" type="datetimeFigureOut">
               <a:rPr lang="en-US" smtClean="0"/>
-              <a:t>2/21/2021</a:t>
+              <a:t>3/21/2021</a:t>
             </a:fld>
             <a:endParaRPr lang="en-US"/>
           </a:p>
@@ -4369,7 +4372,7 @@
           <a:p>
             <a:fld id="{9A46B15B-F6DC-42CA-B5CC-72ADB0A57ABD}" type="datetimeFigureOut">
               <a:rPr lang="en-US" smtClean="0"/>
-              <a:t>2/21/2021</a:t>
+              <a:t>3/21/2021</a:t>
             </a:fld>
             <a:endParaRPr lang="en-US"/>
           </a:p>
@@ -4680,7 +4683,7 @@
           <a:p>
             <a:fld id="{9A46B15B-F6DC-42CA-B5CC-72ADB0A57ABD}" type="datetimeFigureOut">
               <a:rPr lang="en-US" smtClean="0"/>
-              <a:t>2/21/2021</a:t>
+              <a:t>3/21/2021</a:t>
             </a:fld>
             <a:endParaRPr lang="en-US"/>
           </a:p>
@@ -4968,7 +4971,7 @@
           <a:p>
             <a:fld id="{9A46B15B-F6DC-42CA-B5CC-72ADB0A57ABD}" type="datetimeFigureOut">
               <a:rPr lang="en-US" smtClean="0"/>
-              <a:t>2/21/2021</a:t>
+              <a:t>3/21/2021</a:t>
             </a:fld>
             <a:endParaRPr lang="en-US"/>
           </a:p>
@@ -5209,7 +5212,7 @@
           <a:p>
             <a:fld id="{9A46B15B-F6DC-42CA-B5CC-72ADB0A57ABD}" type="datetimeFigureOut">
               <a:rPr lang="en-US" smtClean="0"/>
-              <a:t>2/21/2021</a:t>
+              <a:t>3/21/2021</a:t>
             </a:fld>
             <a:endParaRPr lang="en-US"/>
           </a:p>
@@ -5856,8 +5859,8 @@
           <a:lstStyle/>
           <a:p>
             <a:r>
-              <a:rPr lang="en-US" sz="7200"/>
-              <a:t>Lift Risk</a:t>
+              <a:rPr lang="en-US" sz="7200" dirty="0"/>
+              <a:t>Deep Learning Methods for Lift Risk Assessment</a:t>
             </a:r>
           </a:p>
         </p:txBody>
@@ -5969,6 +5972,1369 @@
 </file>
 
 <file path=ppt/slides/slide10.xml><?xml version="1.0" encoding="utf-8"?>
+<p:sld xmlns:a="http://schemas.openxmlformats.org/drawingml/2006/main" xmlns:r="http://schemas.openxmlformats.org/officeDocument/2006/relationships" xmlns:p="http://schemas.openxmlformats.org/presentationml/2006/main">
+  <p:cSld>
+    <p:bg>
+      <p:bgPr>
+        <a:solidFill>
+          <a:schemeClr val="bg1"/>
+        </a:solidFill>
+        <a:effectLst/>
+      </p:bgPr>
+    </p:bg>
+    <p:spTree>
+      <p:nvGrpSpPr>
+        <p:cNvPr id="1" name=""/>
+        <p:cNvGrpSpPr/>
+        <p:nvPr/>
+      </p:nvGrpSpPr>
+      <p:grpSpPr>
+        <a:xfrm>
+          <a:off x="0" y="0"/>
+          <a:ext cx="0" cy="0"/>
+          <a:chOff x="0" y="0"/>
+          <a:chExt cx="0" cy="0"/>
+        </a:xfrm>
+      </p:grpSpPr>
+      <p:sp useBgFill="1">
+        <p:nvSpPr>
+          <p:cNvPr id="1051" name="Rectangle 72">
+            <a:extLst>
+              <a:ext uri="{FF2B5EF4-FFF2-40B4-BE49-F238E27FC236}">
+                <a16:creationId xmlns:a16="http://schemas.microsoft.com/office/drawing/2014/main" id="{85861AFF-3522-4704-9245-9C78B6945854}"/>
+              </a:ext>
+              <a:ext uri="{C183D7F6-B498-43B3-948B-1728B52AA6E4}">
+                <adec:decorative xmlns:adec="http://schemas.microsoft.com/office/drawing/2017/decorative" val="1"/>
+              </a:ext>
+            </a:extLst>
+          </p:cNvPr>
+          <p:cNvSpPr>
+            <a:spLocks noGrp="1" noRot="1" noChangeAspect="1" noMove="1" noResize="1" noEditPoints="1" noAdjustHandles="1" noChangeArrowheads="1" noChangeShapeType="1" noTextEdit="1"/>
+          </p:cNvSpPr>
+          <p:nvPr>
+            <p:extLst>
+              <p:ext uri="{386F3935-93C4-4BCD-93E2-E3B085C9AB24}">
+                <p16:designElem xmlns:p16="http://schemas.microsoft.com/office/powerpoint/2015/main" val="1"/>
+              </p:ext>
+            </p:extLst>
+          </p:nvPr>
+        </p:nvSpPr>
+        <p:spPr>
+          <a:xfrm>
+            <a:off x="0" y="0"/>
+            <a:ext cx="12191999" cy="6857365"/>
+          </a:xfrm>
+          <a:prstGeom prst="rect">
+            <a:avLst/>
+          </a:prstGeom>
+          <a:ln>
+            <a:noFill/>
+          </a:ln>
+        </p:spPr>
+        <p:style>
+          <a:lnRef idx="2">
+            <a:schemeClr val="accent1">
+              <a:shade val="50000"/>
+            </a:schemeClr>
+          </a:lnRef>
+          <a:fillRef idx="1">
+            <a:schemeClr val="accent1"/>
+          </a:fillRef>
+          <a:effectRef idx="0">
+            <a:schemeClr val="accent1"/>
+          </a:effectRef>
+          <a:fontRef idx="minor">
+            <a:schemeClr val="lt1"/>
+          </a:fontRef>
+        </p:style>
+        <p:txBody>
+          <a:bodyPr rtlCol="0" anchor="ctr"/>
+          <a:lstStyle/>
+          <a:p>
+            <a:pPr algn="ctr"/>
+            <a:endParaRPr lang="en-US"/>
+          </a:p>
+        </p:txBody>
+      </p:sp>
+      <p:grpSp>
+        <p:nvGrpSpPr>
+          <p:cNvPr id="1052" name="Group 74">
+            <a:extLst>
+              <a:ext uri="{FF2B5EF4-FFF2-40B4-BE49-F238E27FC236}">
+                <a16:creationId xmlns:a16="http://schemas.microsoft.com/office/drawing/2014/main" id="{AE1C45F0-260A-458C-96ED-C1F6D2151219}"/>
+              </a:ext>
+              <a:ext uri="{C183D7F6-B498-43B3-948B-1728B52AA6E4}">
+                <adec:decorative xmlns:adec="http://schemas.microsoft.com/office/drawing/2017/decorative" val="1"/>
+              </a:ext>
+            </a:extLst>
+          </p:cNvPr>
+          <p:cNvGrpSpPr>
+            <a:grpSpLocks noGrp="1" noUngrp="1" noRot="1" noChangeAspect="1" noMove="1" noResize="1"/>
+          </p:cNvGrpSpPr>
+          <p:nvPr>
+            <p:extLst>
+              <p:ext uri="{386F3935-93C4-4BCD-93E2-E3B085C9AB24}">
+                <p16:designElem xmlns:p16="http://schemas.microsoft.com/office/powerpoint/2015/main" val="1"/>
+              </p:ext>
+            </p:extLst>
+          </p:nvPr>
+        </p:nvGrpSpPr>
+        <p:grpSpPr>
+          <a:xfrm>
+            <a:off x="4" y="1062849"/>
+            <a:ext cx="731521" cy="673460"/>
+            <a:chOff x="3940602" y="308034"/>
+            <a:chExt cx="2116791" cy="3428999"/>
+          </a:xfrm>
+          <a:solidFill>
+            <a:schemeClr val="accent4"/>
+          </a:solidFill>
+        </p:grpSpPr>
+        <p:sp>
+          <p:nvSpPr>
+            <p:cNvPr id="76" name="Rectangle 75">
+              <a:extLst>
+                <a:ext uri="{FF2B5EF4-FFF2-40B4-BE49-F238E27FC236}">
+                  <a16:creationId xmlns:a16="http://schemas.microsoft.com/office/drawing/2014/main" id="{A6604B49-AD5C-4590-B051-06C8222ECD99}"/>
+                </a:ext>
+                <a:ext uri="{C183D7F6-B498-43B3-948B-1728B52AA6E4}">
+                  <adec:decorative xmlns:adec="http://schemas.microsoft.com/office/drawing/2017/decorative" val="1"/>
+                </a:ext>
+              </a:extLst>
+            </p:cNvPr>
+            <p:cNvSpPr/>
+            <p:nvPr>
+              <p:extLst>
+                <p:ext uri="{386F3935-93C4-4BCD-93E2-E3B085C9AB24}">
+                  <p16:designElem xmlns:p16="http://schemas.microsoft.com/office/powerpoint/2015/main" val="1"/>
+                </p:ext>
+              </p:extLst>
+            </p:nvPr>
+          </p:nvSpPr>
+          <p:spPr>
+            <a:xfrm>
+              <a:off x="3940602" y="308034"/>
+              <a:ext cx="566743" cy="3428999"/>
+            </a:xfrm>
+            <a:prstGeom prst="rect">
+              <a:avLst/>
+            </a:prstGeom>
+            <a:grpFill/>
+            <a:ln>
+              <a:noFill/>
+            </a:ln>
+          </p:spPr>
+          <p:style>
+            <a:lnRef idx="2">
+              <a:schemeClr val="accent1">
+                <a:shade val="50000"/>
+              </a:schemeClr>
+            </a:lnRef>
+            <a:fillRef idx="1">
+              <a:schemeClr val="accent1"/>
+            </a:fillRef>
+            <a:effectRef idx="0">
+              <a:schemeClr val="accent1"/>
+            </a:effectRef>
+            <a:fontRef idx="minor">
+              <a:schemeClr val="lt1"/>
+            </a:fontRef>
+          </p:style>
+          <p:txBody>
+            <a:bodyPr rtlCol="0" anchor="ctr"/>
+            <a:lstStyle/>
+            <a:p>
+              <a:pPr algn="ctr"/>
+              <a:endParaRPr lang="en-US"/>
+            </a:p>
+          </p:txBody>
+        </p:sp>
+        <p:sp>
+          <p:nvSpPr>
+            <p:cNvPr id="77" name="Rectangle 76">
+              <a:extLst>
+                <a:ext uri="{FF2B5EF4-FFF2-40B4-BE49-F238E27FC236}">
+                  <a16:creationId xmlns:a16="http://schemas.microsoft.com/office/drawing/2014/main" id="{743ECCAF-29C5-4537-947C-7EA1292463DB}"/>
+                </a:ext>
+                <a:ext uri="{C183D7F6-B498-43B3-948B-1728B52AA6E4}">
+                  <adec:decorative xmlns:adec="http://schemas.microsoft.com/office/drawing/2017/decorative" val="1"/>
+                </a:ext>
+              </a:extLst>
+            </p:cNvPr>
+            <p:cNvSpPr/>
+            <p:nvPr>
+              <p:extLst>
+                <p:ext uri="{386F3935-93C4-4BCD-93E2-E3B085C9AB24}">
+                  <p16:designElem xmlns:p16="http://schemas.microsoft.com/office/powerpoint/2015/main" val="1"/>
+                </p:ext>
+              </p:extLst>
+            </p:nvPr>
+          </p:nvSpPr>
+          <p:spPr>
+            <a:xfrm>
+              <a:off x="4715626" y="308034"/>
+              <a:ext cx="566743" cy="3428999"/>
+            </a:xfrm>
+            <a:prstGeom prst="rect">
+              <a:avLst/>
+            </a:prstGeom>
+            <a:grpFill/>
+            <a:ln>
+              <a:noFill/>
+            </a:ln>
+          </p:spPr>
+          <p:style>
+            <a:lnRef idx="2">
+              <a:schemeClr val="accent1">
+                <a:shade val="50000"/>
+              </a:schemeClr>
+            </a:lnRef>
+            <a:fillRef idx="1">
+              <a:schemeClr val="accent1"/>
+            </a:fillRef>
+            <a:effectRef idx="0">
+              <a:schemeClr val="accent1"/>
+            </a:effectRef>
+            <a:fontRef idx="minor">
+              <a:schemeClr val="lt1"/>
+            </a:fontRef>
+          </p:style>
+          <p:txBody>
+            <a:bodyPr rtlCol="0" anchor="ctr"/>
+            <a:lstStyle/>
+            <a:p>
+              <a:pPr algn="ctr"/>
+              <a:endParaRPr lang="en-US"/>
+            </a:p>
+          </p:txBody>
+        </p:sp>
+        <p:sp>
+          <p:nvSpPr>
+            <p:cNvPr id="78" name="Rectangle 77">
+              <a:extLst>
+                <a:ext uri="{FF2B5EF4-FFF2-40B4-BE49-F238E27FC236}">
+                  <a16:creationId xmlns:a16="http://schemas.microsoft.com/office/drawing/2014/main" id="{ED49787B-8DE6-4467-AD0A-8DECC6E0C2D6}"/>
+                </a:ext>
+                <a:ext uri="{C183D7F6-B498-43B3-948B-1728B52AA6E4}">
+                  <adec:decorative xmlns:adec="http://schemas.microsoft.com/office/drawing/2017/decorative" val="1"/>
+                </a:ext>
+              </a:extLst>
+            </p:cNvPr>
+            <p:cNvSpPr/>
+            <p:nvPr>
+              <p:extLst>
+                <p:ext uri="{386F3935-93C4-4BCD-93E2-E3B085C9AB24}">
+                  <p16:designElem xmlns:p16="http://schemas.microsoft.com/office/powerpoint/2015/main" val="1"/>
+                </p:ext>
+              </p:extLst>
+            </p:nvPr>
+          </p:nvSpPr>
+          <p:spPr>
+            <a:xfrm>
+              <a:off x="5490650" y="308034"/>
+              <a:ext cx="566743" cy="3428999"/>
+            </a:xfrm>
+            <a:prstGeom prst="rect">
+              <a:avLst/>
+            </a:prstGeom>
+            <a:grpFill/>
+            <a:ln>
+              <a:noFill/>
+            </a:ln>
+          </p:spPr>
+          <p:style>
+            <a:lnRef idx="2">
+              <a:schemeClr val="accent1">
+                <a:shade val="50000"/>
+              </a:schemeClr>
+            </a:lnRef>
+            <a:fillRef idx="1">
+              <a:schemeClr val="accent1"/>
+            </a:fillRef>
+            <a:effectRef idx="0">
+              <a:schemeClr val="accent1"/>
+            </a:effectRef>
+            <a:fontRef idx="minor">
+              <a:schemeClr val="lt1"/>
+            </a:fontRef>
+          </p:style>
+          <p:txBody>
+            <a:bodyPr rtlCol="0" anchor="ctr"/>
+            <a:lstStyle/>
+            <a:p>
+              <a:pPr algn="ctr"/>
+              <a:endParaRPr lang="en-US"/>
+            </a:p>
+          </p:txBody>
+        </p:sp>
+      </p:grpSp>
+      <p:sp>
+        <p:nvSpPr>
+          <p:cNvPr id="1053" name="Rectangle 79">
+            <a:extLst>
+              <a:ext uri="{FF2B5EF4-FFF2-40B4-BE49-F238E27FC236}">
+                <a16:creationId xmlns:a16="http://schemas.microsoft.com/office/drawing/2014/main" id="{D5B0017B-2ECA-49AF-B397-DC140825DF8D}"/>
+              </a:ext>
+              <a:ext uri="{C183D7F6-B498-43B3-948B-1728B52AA6E4}">
+                <adec:decorative xmlns:adec="http://schemas.microsoft.com/office/drawing/2017/decorative" val="1"/>
+              </a:ext>
+            </a:extLst>
+          </p:cNvPr>
+          <p:cNvSpPr>
+            <a:spLocks noGrp="1" noRot="1" noChangeAspect="1" noMove="1" noResize="1" noEditPoints="1" noAdjustHandles="1" noChangeArrowheads="1" noChangeShapeType="1" noTextEdit="1"/>
+          </p:cNvSpPr>
+          <p:nvPr>
+            <p:extLst>
+              <p:ext uri="{386F3935-93C4-4BCD-93E2-E3B085C9AB24}">
+                <p16:designElem xmlns:p16="http://schemas.microsoft.com/office/powerpoint/2015/main" val="1"/>
+              </p:ext>
+            </p:extLst>
+          </p:nvPr>
+        </p:nvSpPr>
+        <p:spPr>
+          <a:xfrm>
+            <a:off x="640080" y="656150"/>
+            <a:ext cx="4651477" cy="1431591"/>
+          </a:xfrm>
+          <a:prstGeom prst="rect">
+            <a:avLst/>
+          </a:prstGeom>
+          <a:solidFill>
+            <a:schemeClr val="bg1"/>
+          </a:solidFill>
+          <a:ln>
+            <a:noFill/>
+          </a:ln>
+          <a:effectLst>
+            <a:outerShdw blurRad="139700" dist="127000" dir="5400000" algn="t" rotWithShape="0">
+              <a:prstClr val="black">
+                <a:alpha val="15000"/>
+              </a:prstClr>
+            </a:outerShdw>
+          </a:effectLst>
+        </p:spPr>
+        <p:style>
+          <a:lnRef idx="2">
+            <a:schemeClr val="accent1">
+              <a:shade val="50000"/>
+            </a:schemeClr>
+          </a:lnRef>
+          <a:fillRef idx="1">
+            <a:schemeClr val="accent1"/>
+          </a:fillRef>
+          <a:effectRef idx="0">
+            <a:schemeClr val="accent1"/>
+          </a:effectRef>
+          <a:fontRef idx="minor">
+            <a:schemeClr val="lt1"/>
+          </a:fontRef>
+        </p:style>
+        <p:txBody>
+          <a:bodyPr rtlCol="0" anchor="ctr"/>
+          <a:lstStyle/>
+          <a:p>
+            <a:pPr algn="ctr"/>
+            <a:endParaRPr lang="en-US"/>
+          </a:p>
+        </p:txBody>
+      </p:sp>
+      <p:sp>
+        <p:nvSpPr>
+          <p:cNvPr id="2" name="Title 1">
+            <a:extLst>
+              <a:ext uri="{FF2B5EF4-FFF2-40B4-BE49-F238E27FC236}">
+                <a16:creationId xmlns:a16="http://schemas.microsoft.com/office/drawing/2014/main" id="{87202D7F-D800-4033-8EF5-3E4BDA8A3883}"/>
+              </a:ext>
+            </a:extLst>
+          </p:cNvPr>
+          <p:cNvSpPr>
+            <a:spLocks noGrp="1"/>
+          </p:cNvSpPr>
+          <p:nvPr>
+            <p:ph type="title"/>
+          </p:nvPr>
+        </p:nvSpPr>
+        <p:spPr>
+          <a:xfrm>
+            <a:off x="1043632" y="873940"/>
+            <a:ext cx="3951525" cy="1035781"/>
+          </a:xfrm>
+        </p:spPr>
+        <p:txBody>
+          <a:bodyPr anchor="ctr">
+            <a:normAutofit/>
+          </a:bodyPr>
+          <a:lstStyle/>
+          <a:p>
+            <a:r>
+              <a:rPr lang="en-US" sz="3200"/>
+              <a:t>Technologies</a:t>
+            </a:r>
+          </a:p>
+        </p:txBody>
+      </p:sp>
+      <p:sp>
+        <p:nvSpPr>
+          <p:cNvPr id="3" name="Content Placeholder 2">
+            <a:extLst>
+              <a:ext uri="{FF2B5EF4-FFF2-40B4-BE49-F238E27FC236}">
+                <a16:creationId xmlns:a16="http://schemas.microsoft.com/office/drawing/2014/main" id="{913C0F7A-26DB-42C9-88B3-4CE7153D5AC8}"/>
+              </a:ext>
+            </a:extLst>
+          </p:cNvPr>
+          <p:cNvSpPr>
+            <a:spLocks noGrp="1"/>
+          </p:cNvSpPr>
+          <p:nvPr>
+            <p:ph idx="1"/>
+          </p:nvPr>
+        </p:nvSpPr>
+        <p:spPr>
+          <a:xfrm>
+            <a:off x="1045030" y="2524721"/>
+            <a:ext cx="3943993" cy="3677123"/>
+          </a:xfrm>
+        </p:spPr>
+        <p:txBody>
+          <a:bodyPr anchor="ctr">
+            <a:normAutofit/>
+          </a:bodyPr>
+          <a:lstStyle/>
+          <a:p>
+            <a:r>
+              <a:rPr lang="en-US" sz="1500"/>
+              <a:t>Code is written in Python</a:t>
+            </a:r>
+          </a:p>
+          <a:p>
+            <a:pPr lvl="1"/>
+            <a:r>
+              <a:rPr lang="en-US" sz="1500"/>
+              <a:t>Tensorflow used for model implementations</a:t>
+            </a:r>
+          </a:p>
+          <a:p>
+            <a:pPr lvl="1"/>
+            <a:r>
+              <a:rPr lang="en-US" sz="1500"/>
+              <a:t>Numpy and Pandas for data preprocessing</a:t>
+            </a:r>
+          </a:p>
+          <a:p>
+            <a:pPr lvl="1"/>
+            <a:r>
+              <a:rPr lang="en-US" sz="1500"/>
+              <a:t>Scikit Learn for metrics</a:t>
+            </a:r>
+          </a:p>
+          <a:p>
+            <a:r>
+              <a:rPr lang="en-US" sz="1500"/>
+              <a:t>Machine Learning models</a:t>
+            </a:r>
+          </a:p>
+          <a:p>
+            <a:pPr lvl="1"/>
+            <a:r>
+              <a:rPr lang="en-US" sz="1500"/>
+              <a:t>Both models are implementations of deep learning networks</a:t>
+            </a:r>
+          </a:p>
+          <a:p>
+            <a:pPr lvl="1"/>
+            <a:r>
+              <a:rPr lang="en-US" sz="1500"/>
+              <a:t>Long Short-Term Memory Networks (LSTM) and convolutional layers form the core of the networks</a:t>
+            </a:r>
+          </a:p>
+          <a:p>
+            <a:r>
+              <a:rPr lang="en-US" sz="1500"/>
+              <a:t>IMU Sensors provide training and testing data</a:t>
+            </a:r>
+          </a:p>
+        </p:txBody>
+      </p:sp>
+      <p:sp>
+        <p:nvSpPr>
+          <p:cNvPr id="1054" name="Rectangle 81">
+            <a:extLst>
+              <a:ext uri="{FF2B5EF4-FFF2-40B4-BE49-F238E27FC236}">
+                <a16:creationId xmlns:a16="http://schemas.microsoft.com/office/drawing/2014/main" id="{DF909CAE-F41A-4061-A316-864DC2A710A2}"/>
+              </a:ext>
+              <a:ext uri="{C183D7F6-B498-43B3-948B-1728B52AA6E4}">
+                <adec:decorative xmlns:adec="http://schemas.microsoft.com/office/drawing/2017/decorative" val="1"/>
+              </a:ext>
+            </a:extLst>
+          </p:cNvPr>
+          <p:cNvSpPr>
+            <a:spLocks noGrp="1" noRot="1" noChangeAspect="1" noMove="1" noResize="1" noEditPoints="1" noAdjustHandles="1" noChangeArrowheads="1" noChangeShapeType="1" noTextEdit="1"/>
+          </p:cNvSpPr>
+          <p:nvPr>
+            <p:extLst>
+              <p:ext uri="{386F3935-93C4-4BCD-93E2-E3B085C9AB24}">
+                <p16:designElem xmlns:p16="http://schemas.microsoft.com/office/powerpoint/2015/main" val="1"/>
+              </p:ext>
+            </p:extLst>
+          </p:nvPr>
+        </p:nvSpPr>
+        <p:spPr>
+          <a:xfrm>
+            <a:off x="5827222" y="650055"/>
+            <a:ext cx="5526578" cy="5634880"/>
+          </a:xfrm>
+          <a:prstGeom prst="rect">
+            <a:avLst/>
+          </a:prstGeom>
+          <a:solidFill>
+            <a:schemeClr val="bg1"/>
+          </a:solidFill>
+          <a:ln>
+            <a:noFill/>
+          </a:ln>
+          <a:effectLst>
+            <a:outerShdw blurRad="139700" dist="127000" dir="5400000" algn="t" rotWithShape="0">
+              <a:prstClr val="black">
+                <a:alpha val="15000"/>
+              </a:prstClr>
+            </a:outerShdw>
+          </a:effectLst>
+        </p:spPr>
+        <p:style>
+          <a:lnRef idx="2">
+            <a:schemeClr val="accent1">
+              <a:shade val="50000"/>
+            </a:schemeClr>
+          </a:lnRef>
+          <a:fillRef idx="1">
+            <a:schemeClr val="accent1"/>
+          </a:fillRef>
+          <a:effectRef idx="0">
+            <a:schemeClr val="accent1"/>
+          </a:effectRef>
+          <a:fontRef idx="minor">
+            <a:schemeClr val="lt1"/>
+          </a:fontRef>
+        </p:style>
+        <p:txBody>
+          <a:bodyPr rtlCol="0" anchor="ctr"/>
+          <a:lstStyle/>
+          <a:p>
+            <a:pPr algn="ctr"/>
+            <a:endParaRPr lang="en-US"/>
+          </a:p>
+        </p:txBody>
+      </p:sp>
+      <p:pic>
+        <p:nvPicPr>
+          <p:cNvPr id="1026" name="Picture 2" descr="Image result for numpy">
+            <a:extLst>
+              <a:ext uri="{FF2B5EF4-FFF2-40B4-BE49-F238E27FC236}">
+                <a16:creationId xmlns:a16="http://schemas.microsoft.com/office/drawing/2014/main" id="{701D79D4-63F5-4689-A54F-9562DC9642B5}"/>
+              </a:ext>
+            </a:extLst>
+          </p:cNvPr>
+          <p:cNvPicPr>
+            <a:picLocks noChangeAspect="1" noChangeArrowheads="1"/>
+          </p:cNvPicPr>
+          <p:nvPr/>
+        </p:nvPicPr>
+        <p:blipFill>
+          <a:blip r:embed="rId2">
+            <a:extLst>
+              <a:ext uri="{28A0092B-C50C-407E-A947-70E740481C1C}">
+                <a14:useLocalDpi xmlns:a14="http://schemas.microsoft.com/office/drawing/2010/main" val="0"/>
+              </a:ext>
+            </a:extLst>
+          </a:blip>
+          <a:stretch>
+            <a:fillRect/>
+          </a:stretch>
+        </p:blipFill>
+        <p:spPr bwMode="auto">
+          <a:xfrm>
+            <a:off x="6096000" y="985932"/>
+            <a:ext cx="1599140" cy="1599140"/>
+          </a:xfrm>
+          <a:prstGeom prst="rect">
+            <a:avLst/>
+          </a:prstGeom>
+          <a:noFill/>
+          <a:extLst>
+            <a:ext uri="{909E8E84-426E-40DD-AFC4-6F175D3DCCD1}">
+              <a14:hiddenFill xmlns:a14="http://schemas.microsoft.com/office/drawing/2010/main">
+                <a:solidFill>
+                  <a:srgbClr val="FFFFFF"/>
+                </a:solidFill>
+              </a14:hiddenFill>
+            </a:ext>
+          </a:extLst>
+        </p:spPr>
+      </p:pic>
+      <p:pic>
+        <p:nvPicPr>
+          <p:cNvPr id="1028" name="Picture 4" descr="Image result for pandas python logo">
+            <a:extLst>
+              <a:ext uri="{FF2B5EF4-FFF2-40B4-BE49-F238E27FC236}">
+                <a16:creationId xmlns:a16="http://schemas.microsoft.com/office/drawing/2014/main" id="{85236C5D-93FC-4EC5-B9C0-34EDD90D5280}"/>
+              </a:ext>
+            </a:extLst>
+          </p:cNvPr>
+          <p:cNvPicPr>
+            <a:picLocks noChangeAspect="1" noChangeArrowheads="1"/>
+          </p:cNvPicPr>
+          <p:nvPr/>
+        </p:nvPicPr>
+        <p:blipFill>
+          <a:blip r:embed="rId3">
+            <a:extLst>
+              <a:ext uri="{28A0092B-C50C-407E-A947-70E740481C1C}">
+                <a14:useLocalDpi xmlns:a14="http://schemas.microsoft.com/office/drawing/2010/main" val="0"/>
+              </a:ext>
+            </a:extLst>
+          </a:blip>
+          <a:stretch>
+            <a:fillRect/>
+          </a:stretch>
+        </p:blipFill>
+        <p:spPr bwMode="auto">
+          <a:xfrm>
+            <a:off x="7973126" y="985937"/>
+            <a:ext cx="1290062" cy="1722300"/>
+          </a:xfrm>
+          <a:prstGeom prst="rect">
+            <a:avLst/>
+          </a:prstGeom>
+          <a:noFill/>
+          <a:extLst>
+            <a:ext uri="{909E8E84-426E-40DD-AFC4-6F175D3DCCD1}">
+              <a14:hiddenFill xmlns:a14="http://schemas.microsoft.com/office/drawing/2010/main">
+                <a:solidFill>
+                  <a:srgbClr val="FFFFFF"/>
+                </a:solidFill>
+              </a14:hiddenFill>
+            </a:ext>
+          </a:extLst>
+        </p:spPr>
+      </p:pic>
+      <p:pic>
+        <p:nvPicPr>
+          <p:cNvPr id="9" name="Picture 8">
+            <a:extLst>
+              <a:ext uri="{FF2B5EF4-FFF2-40B4-BE49-F238E27FC236}">
+                <a16:creationId xmlns:a16="http://schemas.microsoft.com/office/drawing/2014/main" id="{13E274DE-3A86-455D-95EA-883E1FF16FD2}"/>
+              </a:ext>
+            </a:extLst>
+          </p:cNvPr>
+          <p:cNvPicPr>
+            <a:picLocks noChangeAspect="1"/>
+          </p:cNvPicPr>
+          <p:nvPr/>
+        </p:nvPicPr>
+        <p:blipFill>
+          <a:blip r:embed="rId4">
+            <a:extLst>
+              <a:ext uri="{28A0092B-C50C-407E-A947-70E740481C1C}">
+                <a14:useLocalDpi xmlns:a14="http://schemas.microsoft.com/office/drawing/2010/main" val="0"/>
+              </a:ext>
+            </a:extLst>
+          </a:blip>
+          <a:stretch>
+            <a:fillRect/>
+          </a:stretch>
+        </p:blipFill>
+        <p:spPr>
+          <a:xfrm>
+            <a:off x="9547828" y="985931"/>
+            <a:ext cx="1599141" cy="1599141"/>
+          </a:xfrm>
+          <a:prstGeom prst="rect">
+            <a:avLst/>
+          </a:prstGeom>
+        </p:spPr>
+      </p:pic>
+      <p:pic>
+        <p:nvPicPr>
+          <p:cNvPr id="7" name="Picture 6">
+            <a:extLst>
+              <a:ext uri="{FF2B5EF4-FFF2-40B4-BE49-F238E27FC236}">
+                <a16:creationId xmlns:a16="http://schemas.microsoft.com/office/drawing/2014/main" id="{DA8C6CCF-D7C5-455B-875D-015B7E2A0595}"/>
+              </a:ext>
+            </a:extLst>
+          </p:cNvPr>
+          <p:cNvPicPr>
+            <a:picLocks noChangeAspect="1"/>
+          </p:cNvPicPr>
+          <p:nvPr/>
+        </p:nvPicPr>
+        <p:blipFill>
+          <a:blip r:embed="rId5">
+            <a:extLst>
+              <a:ext uri="{28A0092B-C50C-407E-A947-70E740481C1C}">
+                <a14:useLocalDpi xmlns:a14="http://schemas.microsoft.com/office/drawing/2010/main" val="0"/>
+              </a:ext>
+            </a:extLst>
+          </a:blip>
+          <a:stretch>
+            <a:fillRect/>
+          </a:stretch>
+        </p:blipFill>
+        <p:spPr>
+          <a:xfrm>
+            <a:off x="7008178" y="2816738"/>
+            <a:ext cx="3226615" cy="3226615"/>
+          </a:xfrm>
+          <a:prstGeom prst="rect">
+            <a:avLst/>
+          </a:prstGeom>
+        </p:spPr>
+      </p:pic>
+      <p:cxnSp>
+        <p:nvCxnSpPr>
+          <p:cNvPr id="1055" name="Straight Connector 83">
+            <a:extLst>
+              <a:ext uri="{FF2B5EF4-FFF2-40B4-BE49-F238E27FC236}">
+                <a16:creationId xmlns:a16="http://schemas.microsoft.com/office/drawing/2014/main" id="{6CF1BAF6-AD41-4082-B212-8A1F9A2E8779}"/>
+              </a:ext>
+              <a:ext uri="{C183D7F6-B498-43B3-948B-1728B52AA6E4}">
+                <adec:decorative xmlns:adec="http://schemas.microsoft.com/office/drawing/2017/decorative" val="1"/>
+              </a:ext>
+            </a:extLst>
+          </p:cNvPr>
+          <p:cNvCxnSpPr>
+            <a:cxnSpLocks noGrp="1" noRot="1" noChangeAspect="1" noMove="1" noResize="1" noEditPoints="1" noAdjustHandles="1" noChangeArrowheads="1" noChangeShapeType="1"/>
+          </p:cNvCxnSpPr>
+          <p:nvPr>
+            <p:extLst>
+              <p:ext uri="{386F3935-93C4-4BCD-93E2-E3B085C9AB24}">
+                <p16:designElem xmlns:p16="http://schemas.microsoft.com/office/powerpoint/2015/main" val="1"/>
+              </p:ext>
+            </p:extLst>
+          </p:nvPr>
+        </p:nvCxnSpPr>
+        <p:spPr>
+          <a:xfrm flipH="1">
+            <a:off x="838200" y="6492240"/>
+            <a:ext cx="10515600" cy="0"/>
+          </a:xfrm>
+          <a:prstGeom prst="line">
+            <a:avLst/>
+          </a:prstGeom>
+          <a:ln w="57150">
+            <a:solidFill>
+              <a:schemeClr val="accent4"/>
+            </a:solidFill>
+          </a:ln>
+        </p:spPr>
+        <p:style>
+          <a:lnRef idx="1">
+            <a:schemeClr val="accent1"/>
+          </a:lnRef>
+          <a:fillRef idx="0">
+            <a:schemeClr val="accent1"/>
+          </a:fillRef>
+          <a:effectRef idx="0">
+            <a:schemeClr val="accent1"/>
+          </a:effectRef>
+          <a:fontRef idx="minor">
+            <a:schemeClr val="tx1"/>
+          </a:fontRef>
+        </p:style>
+      </p:cxnSp>
+    </p:spTree>
+    <p:extLst>
+      <p:ext uri="{BB962C8B-B14F-4D97-AF65-F5344CB8AC3E}">
+        <p14:creationId xmlns:p14="http://schemas.microsoft.com/office/powerpoint/2010/main" val="4093930349"/>
+      </p:ext>
+    </p:extLst>
+  </p:cSld>
+  <p:clrMapOvr>
+    <a:masterClrMapping/>
+  </p:clrMapOvr>
+</p:sld>
+</file>
+
+<file path=ppt/slides/slide11.xml><?xml version="1.0" encoding="utf-8"?>
+<p:sld xmlns:a="http://schemas.openxmlformats.org/drawingml/2006/main" xmlns:r="http://schemas.openxmlformats.org/officeDocument/2006/relationships" xmlns:p="http://schemas.openxmlformats.org/presentationml/2006/main">
+  <p:cSld>
+    <p:bg>
+      <p:bgPr>
+        <a:solidFill>
+          <a:schemeClr val="bg1"/>
+        </a:solidFill>
+        <a:effectLst/>
+      </p:bgPr>
+    </p:bg>
+    <p:spTree>
+      <p:nvGrpSpPr>
+        <p:cNvPr id="1" name=""/>
+        <p:cNvGrpSpPr/>
+        <p:nvPr/>
+      </p:nvGrpSpPr>
+      <p:grpSpPr>
+        <a:xfrm>
+          <a:off x="0" y="0"/>
+          <a:ext cx="0" cy="0"/>
+          <a:chOff x="0" y="0"/>
+          <a:chExt cx="0" cy="0"/>
+        </a:xfrm>
+      </p:grpSpPr>
+      <p:sp useBgFill="1">
+        <p:nvSpPr>
+          <p:cNvPr id="16" name="Rectangle 7">
+            <a:extLst>
+              <a:ext uri="{FF2B5EF4-FFF2-40B4-BE49-F238E27FC236}">
+                <a16:creationId xmlns:a16="http://schemas.microsoft.com/office/drawing/2014/main" id="{B6CDA21F-E7AF-4C75-8395-33F58D5B0E45}"/>
+              </a:ext>
+              <a:ext uri="{C183D7F6-B498-43B3-948B-1728B52AA6E4}">
+                <adec:decorative xmlns:adec="http://schemas.microsoft.com/office/drawing/2017/decorative" val="1"/>
+              </a:ext>
+            </a:extLst>
+          </p:cNvPr>
+          <p:cNvSpPr>
+            <a:spLocks noGrp="1" noRot="1" noChangeAspect="1" noMove="1" noResize="1" noEditPoints="1" noAdjustHandles="1" noChangeArrowheads="1" noChangeShapeType="1" noTextEdit="1"/>
+          </p:cNvSpPr>
+          <p:nvPr>
+            <p:extLst>
+              <p:ext uri="{386F3935-93C4-4BCD-93E2-E3B085C9AB24}">
+                <p16:designElem xmlns:p16="http://schemas.microsoft.com/office/powerpoint/2015/main" val="1"/>
+              </p:ext>
+            </p:extLst>
+          </p:nvPr>
+        </p:nvSpPr>
+        <p:spPr>
+          <a:xfrm>
+            <a:off x="0" y="0"/>
+            <a:ext cx="12191999" cy="6857365"/>
+          </a:xfrm>
+          <a:prstGeom prst="rect">
+            <a:avLst/>
+          </a:prstGeom>
+          <a:ln>
+            <a:noFill/>
+          </a:ln>
+        </p:spPr>
+        <p:style>
+          <a:lnRef idx="2">
+            <a:schemeClr val="accent1">
+              <a:shade val="50000"/>
+            </a:schemeClr>
+          </a:lnRef>
+          <a:fillRef idx="1">
+            <a:schemeClr val="accent1"/>
+          </a:fillRef>
+          <a:effectRef idx="0">
+            <a:schemeClr val="accent1"/>
+          </a:effectRef>
+          <a:fontRef idx="minor">
+            <a:schemeClr val="lt1"/>
+          </a:fontRef>
+        </p:style>
+        <p:txBody>
+          <a:bodyPr rtlCol="0" anchor="ctr"/>
+          <a:lstStyle/>
+          <a:p>
+            <a:pPr algn="ctr"/>
+            <a:endParaRPr lang="en-US"/>
+          </a:p>
+        </p:txBody>
+      </p:sp>
+      <p:grpSp>
+        <p:nvGrpSpPr>
+          <p:cNvPr id="18" name="Group 9">
+            <a:extLst>
+              <a:ext uri="{FF2B5EF4-FFF2-40B4-BE49-F238E27FC236}">
+                <a16:creationId xmlns:a16="http://schemas.microsoft.com/office/drawing/2014/main" id="{AE1C45F0-260A-458C-96ED-C1F6D2151219}"/>
+              </a:ext>
+              <a:ext uri="{C183D7F6-B498-43B3-948B-1728B52AA6E4}">
+                <adec:decorative xmlns:adec="http://schemas.microsoft.com/office/drawing/2017/decorative" val="1"/>
+              </a:ext>
+            </a:extLst>
+          </p:cNvPr>
+          <p:cNvGrpSpPr>
+            <a:grpSpLocks noGrp="1" noUngrp="1" noRot="1" noChangeAspect="1" noMove="1" noResize="1"/>
+          </p:cNvGrpSpPr>
+          <p:nvPr>
+            <p:extLst>
+              <p:ext uri="{386F3935-93C4-4BCD-93E2-E3B085C9AB24}">
+                <p16:designElem xmlns:p16="http://schemas.microsoft.com/office/powerpoint/2015/main" val="1"/>
+              </p:ext>
+            </p:extLst>
+          </p:nvPr>
+        </p:nvGrpSpPr>
+        <p:grpSpPr>
+          <a:xfrm>
+            <a:off x="4" y="1216597"/>
+            <a:ext cx="731521" cy="673460"/>
+            <a:chOff x="3940602" y="308034"/>
+            <a:chExt cx="2116791" cy="3428999"/>
+          </a:xfrm>
+          <a:solidFill>
+            <a:schemeClr val="accent4"/>
+          </a:solidFill>
+        </p:grpSpPr>
+        <p:sp>
+          <p:nvSpPr>
+            <p:cNvPr id="19" name="Rectangle 10">
+              <a:extLst>
+                <a:ext uri="{FF2B5EF4-FFF2-40B4-BE49-F238E27FC236}">
+                  <a16:creationId xmlns:a16="http://schemas.microsoft.com/office/drawing/2014/main" id="{A6604B49-AD5C-4590-B051-06C8222ECD99}"/>
+                </a:ext>
+                <a:ext uri="{C183D7F6-B498-43B3-948B-1728B52AA6E4}">
+                  <adec:decorative xmlns:adec="http://schemas.microsoft.com/office/drawing/2017/decorative" val="1"/>
+                </a:ext>
+              </a:extLst>
+            </p:cNvPr>
+            <p:cNvSpPr/>
+            <p:nvPr>
+              <p:extLst>
+                <p:ext uri="{386F3935-93C4-4BCD-93E2-E3B085C9AB24}">
+                  <p16:designElem xmlns:p16="http://schemas.microsoft.com/office/powerpoint/2015/main" val="1"/>
+                </p:ext>
+              </p:extLst>
+            </p:nvPr>
+          </p:nvSpPr>
+          <p:spPr>
+            <a:xfrm>
+              <a:off x="3940602" y="308034"/>
+              <a:ext cx="566743" cy="3428999"/>
+            </a:xfrm>
+            <a:prstGeom prst="rect">
+              <a:avLst/>
+            </a:prstGeom>
+            <a:grpFill/>
+            <a:ln>
+              <a:noFill/>
+            </a:ln>
+          </p:spPr>
+          <p:style>
+            <a:lnRef idx="2">
+              <a:schemeClr val="accent1">
+                <a:shade val="50000"/>
+              </a:schemeClr>
+            </a:lnRef>
+            <a:fillRef idx="1">
+              <a:schemeClr val="accent1"/>
+            </a:fillRef>
+            <a:effectRef idx="0">
+              <a:schemeClr val="accent1"/>
+            </a:effectRef>
+            <a:fontRef idx="minor">
+              <a:schemeClr val="lt1"/>
+            </a:fontRef>
+          </p:style>
+          <p:txBody>
+            <a:bodyPr rtlCol="0" anchor="ctr"/>
+            <a:lstStyle/>
+            <a:p>
+              <a:pPr algn="ctr"/>
+              <a:endParaRPr lang="en-US"/>
+            </a:p>
+          </p:txBody>
+        </p:sp>
+        <p:sp>
+          <p:nvSpPr>
+            <p:cNvPr id="20" name="Rectangle 11">
+              <a:extLst>
+                <a:ext uri="{FF2B5EF4-FFF2-40B4-BE49-F238E27FC236}">
+                  <a16:creationId xmlns:a16="http://schemas.microsoft.com/office/drawing/2014/main" id="{743ECCAF-29C5-4537-947C-7EA1292463DB}"/>
+                </a:ext>
+                <a:ext uri="{C183D7F6-B498-43B3-948B-1728B52AA6E4}">
+                  <adec:decorative xmlns:adec="http://schemas.microsoft.com/office/drawing/2017/decorative" val="1"/>
+                </a:ext>
+              </a:extLst>
+            </p:cNvPr>
+            <p:cNvSpPr/>
+            <p:nvPr>
+              <p:extLst>
+                <p:ext uri="{386F3935-93C4-4BCD-93E2-E3B085C9AB24}">
+                  <p16:designElem xmlns:p16="http://schemas.microsoft.com/office/powerpoint/2015/main" val="1"/>
+                </p:ext>
+              </p:extLst>
+            </p:nvPr>
+          </p:nvSpPr>
+          <p:spPr>
+            <a:xfrm>
+              <a:off x="4715626" y="308034"/>
+              <a:ext cx="566743" cy="3428999"/>
+            </a:xfrm>
+            <a:prstGeom prst="rect">
+              <a:avLst/>
+            </a:prstGeom>
+            <a:grpFill/>
+            <a:ln>
+              <a:noFill/>
+            </a:ln>
+          </p:spPr>
+          <p:style>
+            <a:lnRef idx="2">
+              <a:schemeClr val="accent1">
+                <a:shade val="50000"/>
+              </a:schemeClr>
+            </a:lnRef>
+            <a:fillRef idx="1">
+              <a:schemeClr val="accent1"/>
+            </a:fillRef>
+            <a:effectRef idx="0">
+              <a:schemeClr val="accent1"/>
+            </a:effectRef>
+            <a:fontRef idx="minor">
+              <a:schemeClr val="lt1"/>
+            </a:fontRef>
+          </p:style>
+          <p:txBody>
+            <a:bodyPr rtlCol="0" anchor="ctr"/>
+            <a:lstStyle/>
+            <a:p>
+              <a:pPr algn="ctr"/>
+              <a:endParaRPr lang="en-US"/>
+            </a:p>
+          </p:txBody>
+        </p:sp>
+        <p:sp>
+          <p:nvSpPr>
+            <p:cNvPr id="13" name="Rectangle 12">
+              <a:extLst>
+                <a:ext uri="{FF2B5EF4-FFF2-40B4-BE49-F238E27FC236}">
+                  <a16:creationId xmlns:a16="http://schemas.microsoft.com/office/drawing/2014/main" id="{ED49787B-8DE6-4467-AD0A-8DECC6E0C2D6}"/>
+                </a:ext>
+                <a:ext uri="{C183D7F6-B498-43B3-948B-1728B52AA6E4}">
+                  <adec:decorative xmlns:adec="http://schemas.microsoft.com/office/drawing/2017/decorative" val="1"/>
+                </a:ext>
+              </a:extLst>
+            </p:cNvPr>
+            <p:cNvSpPr/>
+            <p:nvPr>
+              <p:extLst>
+                <p:ext uri="{386F3935-93C4-4BCD-93E2-E3B085C9AB24}">
+                  <p16:designElem xmlns:p16="http://schemas.microsoft.com/office/powerpoint/2015/main" val="1"/>
+                </p:ext>
+              </p:extLst>
+            </p:nvPr>
+          </p:nvSpPr>
+          <p:spPr>
+            <a:xfrm>
+              <a:off x="5490650" y="308034"/>
+              <a:ext cx="566743" cy="3428999"/>
+            </a:xfrm>
+            <a:prstGeom prst="rect">
+              <a:avLst/>
+            </a:prstGeom>
+            <a:grpFill/>
+            <a:ln>
+              <a:noFill/>
+            </a:ln>
+          </p:spPr>
+          <p:style>
+            <a:lnRef idx="2">
+              <a:schemeClr val="accent1">
+                <a:shade val="50000"/>
+              </a:schemeClr>
+            </a:lnRef>
+            <a:fillRef idx="1">
+              <a:schemeClr val="accent1"/>
+            </a:fillRef>
+            <a:effectRef idx="0">
+              <a:schemeClr val="accent1"/>
+            </a:effectRef>
+            <a:fontRef idx="minor">
+              <a:schemeClr val="lt1"/>
+            </a:fontRef>
+          </p:style>
+          <p:txBody>
+            <a:bodyPr rtlCol="0" anchor="ctr"/>
+            <a:lstStyle/>
+            <a:p>
+              <a:pPr algn="ctr"/>
+              <a:endParaRPr lang="en-US"/>
+            </a:p>
+          </p:txBody>
+        </p:sp>
+      </p:grpSp>
+      <p:sp>
+        <p:nvSpPr>
+          <p:cNvPr id="15" name="Rectangle 14">
+            <a:extLst>
+              <a:ext uri="{FF2B5EF4-FFF2-40B4-BE49-F238E27FC236}">
+                <a16:creationId xmlns:a16="http://schemas.microsoft.com/office/drawing/2014/main" id="{D5B0017B-2ECA-49AF-B397-DC140825DF8D}"/>
+              </a:ext>
+              <a:ext uri="{C183D7F6-B498-43B3-948B-1728B52AA6E4}">
+                <adec:decorative xmlns:adec="http://schemas.microsoft.com/office/drawing/2017/decorative" val="1"/>
+              </a:ext>
+            </a:extLst>
+          </p:cNvPr>
+          <p:cNvSpPr>
+            <a:spLocks noGrp="1" noRot="1" noChangeAspect="1" noMove="1" noResize="1" noEditPoints="1" noAdjustHandles="1" noChangeArrowheads="1" noChangeShapeType="1" noTextEdit="1"/>
+          </p:cNvSpPr>
+          <p:nvPr>
+            <p:extLst>
+              <p:ext uri="{386F3935-93C4-4BCD-93E2-E3B085C9AB24}">
+                <p16:designElem xmlns:p16="http://schemas.microsoft.com/office/powerpoint/2015/main" val="1"/>
+              </p:ext>
+            </p:extLst>
+          </p:nvPr>
+        </p:nvSpPr>
+        <p:spPr>
+          <a:xfrm>
+            <a:off x="640079" y="613954"/>
+            <a:ext cx="10907487" cy="1894116"/>
+          </a:xfrm>
+          <a:prstGeom prst="rect">
+            <a:avLst/>
+          </a:prstGeom>
+          <a:solidFill>
+            <a:schemeClr val="bg1"/>
+          </a:solidFill>
+          <a:ln>
+            <a:noFill/>
+          </a:ln>
+          <a:effectLst>
+            <a:outerShdw blurRad="139700" dist="127000" dir="5400000" algn="t" rotWithShape="0">
+              <a:prstClr val="black">
+                <a:alpha val="15000"/>
+              </a:prstClr>
+            </a:outerShdw>
+          </a:effectLst>
+        </p:spPr>
+        <p:style>
+          <a:lnRef idx="2">
+            <a:schemeClr val="accent1">
+              <a:shade val="50000"/>
+            </a:schemeClr>
+          </a:lnRef>
+          <a:fillRef idx="1">
+            <a:schemeClr val="accent1"/>
+          </a:fillRef>
+          <a:effectRef idx="0">
+            <a:schemeClr val="accent1"/>
+          </a:effectRef>
+          <a:fontRef idx="minor">
+            <a:schemeClr val="lt1"/>
+          </a:fontRef>
+        </p:style>
+        <p:txBody>
+          <a:bodyPr rtlCol="0" anchor="ctr"/>
+          <a:lstStyle/>
+          <a:p>
+            <a:pPr algn="ctr"/>
+            <a:endParaRPr lang="en-US"/>
+          </a:p>
+        </p:txBody>
+      </p:sp>
+      <p:sp>
+        <p:nvSpPr>
+          <p:cNvPr id="2" name="Title 1">
+            <a:extLst>
+              <a:ext uri="{FF2B5EF4-FFF2-40B4-BE49-F238E27FC236}">
+                <a16:creationId xmlns:a16="http://schemas.microsoft.com/office/drawing/2014/main" id="{88055E0C-5801-46C6-B7CE-67069F722492}"/>
+              </a:ext>
+            </a:extLst>
+          </p:cNvPr>
+          <p:cNvSpPr>
+            <a:spLocks noGrp="1"/>
+          </p:cNvSpPr>
+          <p:nvPr>
+            <p:ph type="title"/>
+          </p:nvPr>
+        </p:nvSpPr>
+        <p:spPr>
+          <a:xfrm>
+            <a:off x="1043631" y="809898"/>
+            <a:ext cx="9942716" cy="1554480"/>
+          </a:xfrm>
+        </p:spPr>
+        <p:txBody>
+          <a:bodyPr anchor="ctr">
+            <a:normAutofit/>
+          </a:bodyPr>
+          <a:lstStyle/>
+          <a:p>
+            <a:r>
+              <a:rPr lang="en-US" sz="4800"/>
+              <a:t>Milestones</a:t>
+            </a:r>
+          </a:p>
+        </p:txBody>
+      </p:sp>
+      <p:sp>
+        <p:nvSpPr>
+          <p:cNvPr id="3" name="Content Placeholder 2">
+            <a:extLst>
+              <a:ext uri="{FF2B5EF4-FFF2-40B4-BE49-F238E27FC236}">
+                <a16:creationId xmlns:a16="http://schemas.microsoft.com/office/drawing/2014/main" id="{F4E57FA3-77D7-4693-801D-B5C092DB223C}"/>
+              </a:ext>
+            </a:extLst>
+          </p:cNvPr>
+          <p:cNvSpPr>
+            <a:spLocks noGrp="1"/>
+          </p:cNvSpPr>
+          <p:nvPr>
+            <p:ph idx="1"/>
+          </p:nvPr>
+        </p:nvSpPr>
+        <p:spPr>
+          <a:xfrm>
+            <a:off x="1045028" y="3017522"/>
+            <a:ext cx="9941319" cy="3124658"/>
+          </a:xfrm>
+        </p:spPr>
+        <p:txBody>
+          <a:bodyPr anchor="ctr">
+            <a:normAutofit/>
+          </a:bodyPr>
+          <a:lstStyle/>
+          <a:p>
+            <a:r>
+              <a:rPr lang="en-US" sz="1700" dirty="0"/>
+              <a:t>Preprocessing – Oct 26</a:t>
+            </a:r>
+            <a:r>
+              <a:rPr lang="en-US" sz="1700" baseline="30000" dirty="0"/>
+              <a:t>th</a:t>
+            </a:r>
+            <a:r>
+              <a:rPr lang="en-US" sz="1700" dirty="0"/>
+              <a:t>, 2020</a:t>
+            </a:r>
+          </a:p>
+          <a:p>
+            <a:pPr lvl="1"/>
+            <a:r>
+              <a:rPr lang="en-US" sz="1700" dirty="0"/>
+              <a:t>Python code for preparing data for model consumption</a:t>
+            </a:r>
+          </a:p>
+          <a:p>
+            <a:r>
+              <a:rPr lang="en-US" sz="1700" dirty="0"/>
+              <a:t>Lift Detection – Dec 1</a:t>
+            </a:r>
+            <a:r>
+              <a:rPr lang="en-US" sz="1700" baseline="30000" dirty="0"/>
+              <a:t>st</a:t>
+            </a:r>
+            <a:r>
+              <a:rPr lang="en-US" sz="1700" dirty="0"/>
+              <a:t>, 2020</a:t>
+            </a:r>
+          </a:p>
+          <a:p>
+            <a:pPr lvl="1"/>
+            <a:r>
+              <a:rPr lang="en-US" sz="1700" dirty="0"/>
+              <a:t>Python implementation of a machine learning model capable of detecting if a lift is occurring in a segment of IMU data</a:t>
+            </a:r>
+          </a:p>
+          <a:p>
+            <a:r>
+              <a:rPr lang="en-US" sz="1700" dirty="0"/>
+              <a:t>Lift Classification – Jan 5</a:t>
+            </a:r>
+            <a:r>
+              <a:rPr lang="en-US" sz="1700" baseline="30000" dirty="0"/>
+              <a:t>th</a:t>
+            </a:r>
+            <a:r>
+              <a:rPr lang="en-US" sz="1700" dirty="0"/>
+              <a:t>, 2021</a:t>
+            </a:r>
+          </a:p>
+          <a:p>
+            <a:pPr lvl="1"/>
+            <a:r>
+              <a:rPr lang="en-US" sz="1700" dirty="0"/>
+              <a:t>Python implementation of a machine learning model capable of classifying a lift’s risk level from a segment of IMU data</a:t>
+            </a:r>
+          </a:p>
+          <a:p>
+            <a:r>
+              <a:rPr lang="en-US" sz="1700" dirty="0"/>
+              <a:t>Refinement – Feb 28</a:t>
+            </a:r>
+            <a:r>
+              <a:rPr lang="en-US" sz="1700" baseline="30000" dirty="0"/>
+              <a:t>th</a:t>
+            </a:r>
+            <a:r>
+              <a:rPr lang="en-US" sz="1700" dirty="0"/>
+              <a:t>, 2021</a:t>
+            </a:r>
+          </a:p>
+          <a:p>
+            <a:pPr lvl="1"/>
+            <a:r>
+              <a:rPr lang="en-US" sz="1700" dirty="0"/>
+              <a:t>Modifications to previous milestones based on possible improvements</a:t>
+            </a:r>
+          </a:p>
+        </p:txBody>
+      </p:sp>
+      <p:cxnSp>
+        <p:nvCxnSpPr>
+          <p:cNvPr id="17" name="Straight Connector 16">
+            <a:extLst>
+              <a:ext uri="{FF2B5EF4-FFF2-40B4-BE49-F238E27FC236}">
+                <a16:creationId xmlns:a16="http://schemas.microsoft.com/office/drawing/2014/main" id="{6CF1BAF6-AD41-4082-B212-8A1F9A2E8779}"/>
+              </a:ext>
+              <a:ext uri="{C183D7F6-B498-43B3-948B-1728B52AA6E4}">
+                <adec:decorative xmlns:adec="http://schemas.microsoft.com/office/drawing/2017/decorative" val="1"/>
+              </a:ext>
+            </a:extLst>
+          </p:cNvPr>
+          <p:cNvCxnSpPr>
+            <a:cxnSpLocks noGrp="1" noRot="1" noChangeAspect="1" noMove="1" noResize="1" noEditPoints="1" noAdjustHandles="1" noChangeArrowheads="1" noChangeShapeType="1"/>
+          </p:cNvCxnSpPr>
+          <p:nvPr>
+            <p:extLst>
+              <p:ext uri="{386F3935-93C4-4BCD-93E2-E3B085C9AB24}">
+                <p16:designElem xmlns:p16="http://schemas.microsoft.com/office/powerpoint/2015/main" val="1"/>
+              </p:ext>
+            </p:extLst>
+          </p:nvPr>
+        </p:nvCxnSpPr>
+        <p:spPr>
+          <a:xfrm flipH="1">
+            <a:off x="838200" y="6485313"/>
+            <a:ext cx="10515600" cy="0"/>
+          </a:xfrm>
+          <a:prstGeom prst="line">
+            <a:avLst/>
+          </a:prstGeom>
+          <a:ln w="57150">
+            <a:solidFill>
+              <a:schemeClr val="accent4"/>
+            </a:solidFill>
+          </a:ln>
+        </p:spPr>
+        <p:style>
+          <a:lnRef idx="1">
+            <a:schemeClr val="accent1"/>
+          </a:lnRef>
+          <a:fillRef idx="0">
+            <a:schemeClr val="accent1"/>
+          </a:fillRef>
+          <a:effectRef idx="0">
+            <a:schemeClr val="accent1"/>
+          </a:effectRef>
+          <a:fontRef idx="minor">
+            <a:schemeClr val="tx1"/>
+          </a:fontRef>
+        </p:style>
+      </p:cxnSp>
+    </p:spTree>
+    <p:extLst>
+      <p:ext uri="{BB962C8B-B14F-4D97-AF65-F5344CB8AC3E}">
+        <p14:creationId xmlns:p14="http://schemas.microsoft.com/office/powerpoint/2010/main" val="4227927210"/>
+      </p:ext>
+    </p:extLst>
+  </p:cSld>
+  <p:clrMapOvr>
+    <a:masterClrMapping/>
+  </p:clrMapOvr>
+</p:sld>
+</file>
+
+<file path=ppt/slides/slide12.xml><?xml version="1.0" encoding="utf-8"?>
 <p:sld xmlns:a="http://schemas.openxmlformats.org/drawingml/2006/main" xmlns:r="http://schemas.openxmlformats.org/officeDocument/2006/relationships" xmlns:p="http://schemas.openxmlformats.org/presentationml/2006/main">
   <p:cSld>
     <p:bg>
@@ -6582,7 +7948,7 @@
 </p:sld>
 </file>
 
-<file path=ppt/slides/slide11.xml><?xml version="1.0" encoding="utf-8"?>
+<file path=ppt/slides/slide13.xml><?xml version="1.0" encoding="utf-8"?>
 <p:sld xmlns:a="http://schemas.openxmlformats.org/drawingml/2006/main" xmlns:r="http://schemas.openxmlformats.org/officeDocument/2006/relationships" xmlns:p="http://schemas.openxmlformats.org/presentationml/2006/main">
   <p:cSld>
     <p:bg>
@@ -7027,7 +8393,7 @@
             <a:pPr lvl="1"/>
             <a:r>
               <a:rPr lang="en-US" sz="1800" dirty="0"/>
-              <a:t>F1 Score: 0.666</a:t>
+              <a:t>F1 Score: 0.835</a:t>
             </a:r>
           </a:p>
           <a:p>
@@ -7675,7 +9041,7 @@
 </p:sld>
 </file>
 
-<file path=ppt/slides/slide12.xml><?xml version="1.0" encoding="utf-8"?>
+<file path=ppt/slides/slide14.xml><?xml version="1.0" encoding="utf-8"?>
 <p:sld xmlns:a="http://schemas.openxmlformats.org/drawingml/2006/main" xmlns:r="http://schemas.openxmlformats.org/officeDocument/2006/relationships" xmlns:p="http://schemas.openxmlformats.org/presentationml/2006/main">
   <p:cSld>
     <p:bg>
@@ -8096,7 +9462,7 @@
         <p:spPr>
           <a:xfrm>
             <a:off x="1045028" y="3017522"/>
-            <a:ext cx="9941319" cy="3124658"/>
+            <a:ext cx="9941319" cy="1738160"/>
           </a:xfrm>
         </p:spPr>
         <p:txBody>
@@ -8106,20 +9472,14 @@
           <a:lstStyle/>
           <a:p>
             <a:r>
-              <a:rPr lang="en-US" sz="2400"/>
-              <a:t>Good performance from both models</a:t>
+              <a:rPr lang="en-US" sz="2400" dirty="0"/>
+              <a:t>Comparative tests show that deep learning is a valid strategy for lift risk detection</a:t>
             </a:r>
           </a:p>
           <a:p>
             <a:r>
-              <a:rPr lang="en-US" sz="2400"/>
-              <a:t>Need to be integrated together into one pipeline</a:t>
-            </a:r>
-          </a:p>
-          <a:p>
-            <a:r>
-              <a:rPr lang="en-US" sz="2400"/>
-              <a:t>Code should be refactored for ease of use</a:t>
+              <a:rPr lang="en-US" sz="2400" dirty="0"/>
+              <a:t>Proposed implementation outperforms baseline</a:t>
             </a:r>
           </a:p>
         </p:txBody>
@@ -8176,6 +9536,257 @@
           </a:fontRef>
         </p:style>
       </p:cxnSp>
+      <p:graphicFrame>
+        <p:nvGraphicFramePr>
+          <p:cNvPr id="14" name="Table 9">
+            <a:extLst>
+              <a:ext uri="{FF2B5EF4-FFF2-40B4-BE49-F238E27FC236}">
+                <a16:creationId xmlns:a16="http://schemas.microsoft.com/office/drawing/2014/main" id="{9841457C-ABD7-4632-8434-69A768147D37}"/>
+              </a:ext>
+            </a:extLst>
+          </p:cNvPr>
+          <p:cNvGraphicFramePr>
+            <a:graphicFrameLocks noGrp="1"/>
+          </p:cNvGraphicFramePr>
+          <p:nvPr>
+            <p:extLst>
+              <p:ext uri="{D42A27DB-BD31-4B8C-83A1-F6EECF244321}">
+                <p14:modId xmlns:p14="http://schemas.microsoft.com/office/powerpoint/2010/main" val="2650995718"/>
+              </p:ext>
+            </p:extLst>
+          </p:nvPr>
+        </p:nvGraphicFramePr>
+        <p:xfrm>
+          <a:off x="3362960" y="4602481"/>
+          <a:ext cx="5818255" cy="1641537"/>
+        </p:xfrm>
+        <a:graphic>
+          <a:graphicData uri="http://schemas.openxmlformats.org/drawingml/2006/table">
+            <a:tbl>
+              <a:tblPr firstRow="1" bandRow="1">
+                <a:tableStyleId>{5C22544A-7EE6-4342-B048-85BDC9FD1C3A}</a:tableStyleId>
+              </a:tblPr>
+              <a:tblGrid>
+                <a:gridCol w="2006477">
+                  <a:extLst>
+                    <a:ext uri="{9D8B030D-6E8A-4147-A177-3AD203B41FA5}">
+                      <a16:colId xmlns:a16="http://schemas.microsoft.com/office/drawing/2014/main" val="2750890122"/>
+                    </a:ext>
+                  </a:extLst>
+                </a:gridCol>
+                <a:gridCol w="902651">
+                  <a:extLst>
+                    <a:ext uri="{9D8B030D-6E8A-4147-A177-3AD203B41FA5}">
+                      <a16:colId xmlns:a16="http://schemas.microsoft.com/office/drawing/2014/main" val="1681708881"/>
+                    </a:ext>
+                  </a:extLst>
+                </a:gridCol>
+                <a:gridCol w="1674137">
+                  <a:extLst>
+                    <a:ext uri="{9D8B030D-6E8A-4147-A177-3AD203B41FA5}">
+                      <a16:colId xmlns:a16="http://schemas.microsoft.com/office/drawing/2014/main" val="1666050000"/>
+                    </a:ext>
+                  </a:extLst>
+                </a:gridCol>
+                <a:gridCol w="1234990">
+                  <a:extLst>
+                    <a:ext uri="{9D8B030D-6E8A-4147-A177-3AD203B41FA5}">
+                      <a16:colId xmlns:a16="http://schemas.microsoft.com/office/drawing/2014/main" val="1606689532"/>
+                    </a:ext>
+                  </a:extLst>
+                </a:gridCol>
+              </a:tblGrid>
+              <a:tr h="547179">
+                <a:tc>
+                  <a:txBody>
+                    <a:bodyPr/>
+                    <a:lstStyle/>
+                    <a:p>
+                      <a:pPr algn="ctr"/>
+                      <a:endParaRPr lang="en-US" sz="1600" dirty="0"/>
+                    </a:p>
+                  </a:txBody>
+                  <a:tcPr marL="112179" marR="112179" marT="56089" marB="56089" anchor="ctr"/>
+                </a:tc>
+                <a:tc>
+                  <a:txBody>
+                    <a:bodyPr/>
+                    <a:lstStyle/>
+                    <a:p>
+                      <a:pPr algn="ctr"/>
+                      <a:r>
+                        <a:rPr lang="en-US" sz="1600" dirty="0"/>
+                        <a:t>SVM</a:t>
+                      </a:r>
+                    </a:p>
+                  </a:txBody>
+                  <a:tcPr marL="112179" marR="112179" marT="56089" marB="56089" anchor="ctr"/>
+                </a:tc>
+                <a:tc>
+                  <a:txBody>
+                    <a:bodyPr/>
+                    <a:lstStyle/>
+                    <a:p>
+                      <a:pPr algn="ctr"/>
+                      <a:r>
+                        <a:rPr lang="en-US" sz="1600" dirty="0" err="1"/>
+                        <a:t>DeepConvLSTM</a:t>
+                      </a:r>
+                      <a:endParaRPr lang="en-US" sz="1600" dirty="0"/>
+                    </a:p>
+                  </a:txBody>
+                  <a:tcPr marL="112179" marR="112179" marT="56089" marB="56089" anchor="ctr"/>
+                </a:tc>
+                <a:tc>
+                  <a:txBody>
+                    <a:bodyPr/>
+                    <a:lstStyle/>
+                    <a:p>
+                      <a:pPr algn="ctr"/>
+                      <a:r>
+                        <a:rPr lang="en-US" sz="1600" dirty="0"/>
+                        <a:t>Proposed</a:t>
+                      </a:r>
+                    </a:p>
+                  </a:txBody>
+                  <a:tcPr marL="112179" marR="112179" marT="56089" marB="56089" anchor="ctr"/>
+                </a:tc>
+                <a:extLst>
+                  <a:ext uri="{0D108BD9-81ED-4DB2-BD59-A6C34878D82A}">
+                    <a16:rowId xmlns:a16="http://schemas.microsoft.com/office/drawing/2014/main" val="1188159692"/>
+                  </a:ext>
+                </a:extLst>
+              </a:tr>
+              <a:tr h="547179">
+                <a:tc>
+                  <a:txBody>
+                    <a:bodyPr/>
+                    <a:lstStyle/>
+                    <a:p>
+                      <a:pPr algn="ctr"/>
+                      <a:r>
+                        <a:rPr lang="en-US" sz="1600" dirty="0"/>
+                        <a:t>Classification (BAC)</a:t>
+                      </a:r>
+                    </a:p>
+                  </a:txBody>
+                  <a:tcPr marL="112179" marR="112179" marT="56089" marB="56089" anchor="ctr"/>
+                </a:tc>
+                <a:tc>
+                  <a:txBody>
+                    <a:bodyPr/>
+                    <a:lstStyle/>
+                    <a:p>
+                      <a:pPr algn="ctr"/>
+                      <a:r>
+                        <a:rPr lang="en-US" sz="1600" dirty="0"/>
+                        <a:t>0.609</a:t>
+                      </a:r>
+                    </a:p>
+                  </a:txBody>
+                  <a:tcPr marL="112179" marR="112179" marT="56089" marB="56089" anchor="ctr"/>
+                </a:tc>
+                <a:tc>
+                  <a:txBody>
+                    <a:bodyPr/>
+                    <a:lstStyle/>
+                    <a:p>
+                      <a:pPr algn="ctr"/>
+                      <a:r>
+                        <a:rPr lang="en-US" sz="1600" dirty="0"/>
+                        <a:t>0.832</a:t>
+                      </a:r>
+                    </a:p>
+                  </a:txBody>
+                  <a:tcPr marL="112179" marR="112179" marT="56089" marB="56089" anchor="ctr"/>
+                </a:tc>
+                <a:tc>
+                  <a:txBody>
+                    <a:bodyPr/>
+                    <a:lstStyle/>
+                    <a:p>
+                      <a:pPr algn="ctr"/>
+                      <a:r>
+                        <a:rPr lang="en-US" sz="1600" dirty="0"/>
+                        <a:t>0.895</a:t>
+                      </a:r>
+                    </a:p>
+                  </a:txBody>
+                  <a:tcPr marL="112179" marR="112179" marT="56089" marB="56089" anchor="ctr"/>
+                </a:tc>
+                <a:extLst>
+                  <a:ext uri="{0D108BD9-81ED-4DB2-BD59-A6C34878D82A}">
+                    <a16:rowId xmlns:a16="http://schemas.microsoft.com/office/drawing/2014/main" val="3487160304"/>
+                  </a:ext>
+                </a:extLst>
+              </a:tr>
+              <a:tr h="547179">
+                <a:tc>
+                  <a:txBody>
+                    <a:bodyPr/>
+                    <a:lstStyle/>
+                    <a:p>
+                      <a:pPr algn="ctr"/>
+                      <a:r>
+                        <a:rPr lang="en-US" sz="1600" dirty="0"/>
+                        <a:t>Detection (F-score)</a:t>
+                      </a:r>
+                    </a:p>
+                  </a:txBody>
+                  <a:tcPr marL="112179" marR="112179" marT="56089" marB="56089" anchor="ctr"/>
+                </a:tc>
+                <a:tc>
+                  <a:txBody>
+                    <a:bodyPr/>
+                    <a:lstStyle/>
+                    <a:p>
+                      <a:pPr algn="ctr"/>
+                      <a:r>
+                        <a:rPr lang="en-US" sz="1600" dirty="0"/>
+                        <a:t>0.450</a:t>
+                      </a:r>
+                    </a:p>
+                  </a:txBody>
+                  <a:tcPr marL="112179" marR="112179" marT="56089" marB="56089" anchor="ctr"/>
+                </a:tc>
+                <a:tc>
+                  <a:txBody>
+                    <a:bodyPr/>
+                    <a:lstStyle/>
+                    <a:p>
+                      <a:pPr algn="ctr"/>
+                      <a:r>
+                        <a:rPr lang="en-US" sz="1600" dirty="0"/>
+                        <a:t>0.732</a:t>
+                      </a:r>
+                    </a:p>
+                  </a:txBody>
+                  <a:tcPr marL="112179" marR="112179" marT="56089" marB="56089" anchor="ctr"/>
+                </a:tc>
+                <a:tc>
+                  <a:txBody>
+                    <a:bodyPr/>
+                    <a:lstStyle/>
+                    <a:p>
+                      <a:pPr algn="ctr"/>
+                      <a:r>
+                        <a:rPr lang="en-US" sz="1600" dirty="0"/>
+                        <a:t>0.835</a:t>
+                      </a:r>
+                    </a:p>
+                  </a:txBody>
+                  <a:tcPr marL="112179" marR="112179" marT="56089" marB="56089" anchor="ctr"/>
+                </a:tc>
+                <a:extLst>
+                  <a:ext uri="{0D108BD9-81ED-4DB2-BD59-A6C34878D82A}">
+                    <a16:rowId xmlns:a16="http://schemas.microsoft.com/office/drawing/2014/main" val="1418847851"/>
+                  </a:ext>
+                </a:extLst>
+              </a:tr>
+            </a:tbl>
+          </a:graphicData>
+        </a:graphic>
+      </p:graphicFrame>
     </p:spTree>
     <p:extLst>
       <p:ext uri="{BB962C8B-B14F-4D97-AF65-F5344CB8AC3E}">
@@ -8189,7 +9800,7 @@
 </p:sld>
 </file>
 
-<file path=ppt/slides/slide13.xml><?xml version="1.0" encoding="utf-8"?>
+<file path=ppt/slides/slide15.xml><?xml version="1.0" encoding="utf-8"?>
 <p:sld xmlns:a="http://schemas.openxmlformats.org/drawingml/2006/main" xmlns:r="http://schemas.openxmlformats.org/officeDocument/2006/relationships" xmlns:p="http://schemas.openxmlformats.org/presentationml/2006/main">
   <p:cSld>
     <p:bg>
@@ -8718,6 +10329,546 @@
 </p:sld>
 </file>
 
+<file path=ppt/slides/slide16.xml><?xml version="1.0" encoding="utf-8"?>
+<p:sld xmlns:a="http://schemas.openxmlformats.org/drawingml/2006/main" xmlns:r="http://schemas.openxmlformats.org/officeDocument/2006/relationships" xmlns:p="http://schemas.openxmlformats.org/presentationml/2006/main">
+  <p:cSld>
+    <p:bg>
+      <p:bgPr>
+        <a:solidFill>
+          <a:schemeClr val="bg1"/>
+        </a:solidFill>
+        <a:effectLst/>
+      </p:bgPr>
+    </p:bg>
+    <p:spTree>
+      <p:nvGrpSpPr>
+        <p:cNvPr id="1" name=""/>
+        <p:cNvGrpSpPr/>
+        <p:nvPr/>
+      </p:nvGrpSpPr>
+      <p:grpSpPr>
+        <a:xfrm>
+          <a:off x="0" y="0"/>
+          <a:ext cx="0" cy="0"/>
+          <a:chOff x="0" y="0"/>
+          <a:chExt cx="0" cy="0"/>
+        </a:xfrm>
+      </p:grpSpPr>
+      <p:sp useBgFill="1">
+        <p:nvSpPr>
+          <p:cNvPr id="12" name="Rectangle 11">
+            <a:extLst>
+              <a:ext uri="{FF2B5EF4-FFF2-40B4-BE49-F238E27FC236}">
+                <a16:creationId xmlns:a16="http://schemas.microsoft.com/office/drawing/2014/main" id="{B0B8DCBA-FEED-46EF-A140-35B904015B49}"/>
+              </a:ext>
+              <a:ext uri="{C183D7F6-B498-43B3-948B-1728B52AA6E4}">
+                <adec:decorative xmlns:adec="http://schemas.microsoft.com/office/drawing/2017/decorative" val="1"/>
+              </a:ext>
+            </a:extLst>
+          </p:cNvPr>
+          <p:cNvSpPr>
+            <a:spLocks noGrp="1" noRot="1" noChangeAspect="1" noMove="1" noResize="1" noEditPoints="1" noAdjustHandles="1" noChangeArrowheads="1" noChangeShapeType="1" noTextEdit="1"/>
+          </p:cNvSpPr>
+          <p:nvPr>
+            <p:extLst>
+              <p:ext uri="{386F3935-93C4-4BCD-93E2-E3B085C9AB24}">
+                <p16:designElem xmlns:p16="http://schemas.microsoft.com/office/powerpoint/2015/main" val="1"/>
+              </p:ext>
+            </p:extLst>
+          </p:nvPr>
+        </p:nvSpPr>
+        <p:spPr>
+          <a:xfrm>
+            <a:off x="0" y="0"/>
+            <a:ext cx="12191999" cy="6857365"/>
+          </a:xfrm>
+          <a:prstGeom prst="rect">
+            <a:avLst/>
+          </a:prstGeom>
+          <a:ln>
+            <a:noFill/>
+          </a:ln>
+        </p:spPr>
+        <p:style>
+          <a:lnRef idx="2">
+            <a:schemeClr val="accent1">
+              <a:shade val="50000"/>
+            </a:schemeClr>
+          </a:lnRef>
+          <a:fillRef idx="1">
+            <a:schemeClr val="accent1"/>
+          </a:fillRef>
+          <a:effectRef idx="0">
+            <a:schemeClr val="accent1"/>
+          </a:effectRef>
+          <a:fontRef idx="minor">
+            <a:schemeClr val="lt1"/>
+          </a:fontRef>
+        </p:style>
+        <p:txBody>
+          <a:bodyPr rtlCol="0" anchor="ctr"/>
+          <a:lstStyle/>
+          <a:p>
+            <a:pPr algn="ctr"/>
+            <a:endParaRPr lang="en-US"/>
+          </a:p>
+        </p:txBody>
+      </p:sp>
+      <p:grpSp>
+        <p:nvGrpSpPr>
+          <p:cNvPr id="14" name="Group 13">
+            <a:extLst>
+              <a:ext uri="{FF2B5EF4-FFF2-40B4-BE49-F238E27FC236}">
+                <a16:creationId xmlns:a16="http://schemas.microsoft.com/office/drawing/2014/main" id="{AE1C45F0-260A-458C-96ED-C1F6D2151219}"/>
+              </a:ext>
+              <a:ext uri="{C183D7F6-B498-43B3-948B-1728B52AA6E4}">
+                <adec:decorative xmlns:adec="http://schemas.microsoft.com/office/drawing/2017/decorative" val="1"/>
+              </a:ext>
+            </a:extLst>
+          </p:cNvPr>
+          <p:cNvGrpSpPr>
+            <a:grpSpLocks noGrp="1" noUngrp="1" noRot="1" noChangeAspect="1" noMove="1" noResize="1"/>
+          </p:cNvGrpSpPr>
+          <p:nvPr>
+            <p:extLst>
+              <p:ext uri="{386F3935-93C4-4BCD-93E2-E3B085C9AB24}">
+                <p16:designElem xmlns:p16="http://schemas.microsoft.com/office/powerpoint/2015/main" val="1"/>
+              </p:ext>
+            </p:extLst>
+          </p:nvPr>
+        </p:nvGrpSpPr>
+        <p:grpSpPr>
+          <a:xfrm>
+            <a:off x="4" y="1062849"/>
+            <a:ext cx="731521" cy="673460"/>
+            <a:chOff x="3940602" y="308034"/>
+            <a:chExt cx="2116791" cy="3428999"/>
+          </a:xfrm>
+          <a:solidFill>
+            <a:schemeClr val="accent4"/>
+          </a:solidFill>
+        </p:grpSpPr>
+        <p:sp>
+          <p:nvSpPr>
+            <p:cNvPr id="15" name="Rectangle 14">
+              <a:extLst>
+                <a:ext uri="{FF2B5EF4-FFF2-40B4-BE49-F238E27FC236}">
+                  <a16:creationId xmlns:a16="http://schemas.microsoft.com/office/drawing/2014/main" id="{A6604B49-AD5C-4590-B051-06C8222ECD99}"/>
+                </a:ext>
+                <a:ext uri="{C183D7F6-B498-43B3-948B-1728B52AA6E4}">
+                  <adec:decorative xmlns:adec="http://schemas.microsoft.com/office/drawing/2017/decorative" val="1"/>
+                </a:ext>
+              </a:extLst>
+            </p:cNvPr>
+            <p:cNvSpPr/>
+            <p:nvPr>
+              <p:extLst>
+                <p:ext uri="{386F3935-93C4-4BCD-93E2-E3B085C9AB24}">
+                  <p16:designElem xmlns:p16="http://schemas.microsoft.com/office/powerpoint/2015/main" val="1"/>
+                </p:ext>
+              </p:extLst>
+            </p:nvPr>
+          </p:nvSpPr>
+          <p:spPr>
+            <a:xfrm>
+              <a:off x="3940602" y="308034"/>
+              <a:ext cx="566743" cy="3428999"/>
+            </a:xfrm>
+            <a:prstGeom prst="rect">
+              <a:avLst/>
+            </a:prstGeom>
+            <a:grpFill/>
+            <a:ln>
+              <a:noFill/>
+            </a:ln>
+          </p:spPr>
+          <p:style>
+            <a:lnRef idx="2">
+              <a:schemeClr val="accent1">
+                <a:shade val="50000"/>
+              </a:schemeClr>
+            </a:lnRef>
+            <a:fillRef idx="1">
+              <a:schemeClr val="accent1"/>
+            </a:fillRef>
+            <a:effectRef idx="0">
+              <a:schemeClr val="accent1"/>
+            </a:effectRef>
+            <a:fontRef idx="minor">
+              <a:schemeClr val="lt1"/>
+            </a:fontRef>
+          </p:style>
+          <p:txBody>
+            <a:bodyPr rtlCol="0" anchor="ctr"/>
+            <a:lstStyle/>
+            <a:p>
+              <a:pPr algn="ctr"/>
+              <a:endParaRPr lang="en-US"/>
+            </a:p>
+          </p:txBody>
+        </p:sp>
+        <p:sp>
+          <p:nvSpPr>
+            <p:cNvPr id="16" name="Rectangle 15">
+              <a:extLst>
+                <a:ext uri="{FF2B5EF4-FFF2-40B4-BE49-F238E27FC236}">
+                  <a16:creationId xmlns:a16="http://schemas.microsoft.com/office/drawing/2014/main" id="{743ECCAF-29C5-4537-947C-7EA1292463DB}"/>
+                </a:ext>
+                <a:ext uri="{C183D7F6-B498-43B3-948B-1728B52AA6E4}">
+                  <adec:decorative xmlns:adec="http://schemas.microsoft.com/office/drawing/2017/decorative" val="1"/>
+                </a:ext>
+              </a:extLst>
+            </p:cNvPr>
+            <p:cNvSpPr/>
+            <p:nvPr>
+              <p:extLst>
+                <p:ext uri="{386F3935-93C4-4BCD-93E2-E3B085C9AB24}">
+                  <p16:designElem xmlns:p16="http://schemas.microsoft.com/office/powerpoint/2015/main" val="1"/>
+                </p:ext>
+              </p:extLst>
+            </p:nvPr>
+          </p:nvSpPr>
+          <p:spPr>
+            <a:xfrm>
+              <a:off x="4715626" y="308034"/>
+              <a:ext cx="566743" cy="3428999"/>
+            </a:xfrm>
+            <a:prstGeom prst="rect">
+              <a:avLst/>
+            </a:prstGeom>
+            <a:grpFill/>
+            <a:ln>
+              <a:noFill/>
+            </a:ln>
+          </p:spPr>
+          <p:style>
+            <a:lnRef idx="2">
+              <a:schemeClr val="accent1">
+                <a:shade val="50000"/>
+              </a:schemeClr>
+            </a:lnRef>
+            <a:fillRef idx="1">
+              <a:schemeClr val="accent1"/>
+            </a:fillRef>
+            <a:effectRef idx="0">
+              <a:schemeClr val="accent1"/>
+            </a:effectRef>
+            <a:fontRef idx="minor">
+              <a:schemeClr val="lt1"/>
+            </a:fontRef>
+          </p:style>
+          <p:txBody>
+            <a:bodyPr rtlCol="0" anchor="ctr"/>
+            <a:lstStyle/>
+            <a:p>
+              <a:pPr algn="ctr"/>
+              <a:endParaRPr lang="en-US"/>
+            </a:p>
+          </p:txBody>
+        </p:sp>
+        <p:sp>
+          <p:nvSpPr>
+            <p:cNvPr id="17" name="Rectangle 16">
+              <a:extLst>
+                <a:ext uri="{FF2B5EF4-FFF2-40B4-BE49-F238E27FC236}">
+                  <a16:creationId xmlns:a16="http://schemas.microsoft.com/office/drawing/2014/main" id="{ED49787B-8DE6-4467-AD0A-8DECC6E0C2D6}"/>
+                </a:ext>
+                <a:ext uri="{C183D7F6-B498-43B3-948B-1728B52AA6E4}">
+                  <adec:decorative xmlns:adec="http://schemas.microsoft.com/office/drawing/2017/decorative" val="1"/>
+                </a:ext>
+              </a:extLst>
+            </p:cNvPr>
+            <p:cNvSpPr/>
+            <p:nvPr>
+              <p:extLst>
+                <p:ext uri="{386F3935-93C4-4BCD-93E2-E3B085C9AB24}">
+                  <p16:designElem xmlns:p16="http://schemas.microsoft.com/office/powerpoint/2015/main" val="1"/>
+                </p:ext>
+              </p:extLst>
+            </p:nvPr>
+          </p:nvSpPr>
+          <p:spPr>
+            <a:xfrm>
+              <a:off x="5490650" y="308034"/>
+              <a:ext cx="566743" cy="3428999"/>
+            </a:xfrm>
+            <a:prstGeom prst="rect">
+              <a:avLst/>
+            </a:prstGeom>
+            <a:grpFill/>
+            <a:ln>
+              <a:noFill/>
+            </a:ln>
+          </p:spPr>
+          <p:style>
+            <a:lnRef idx="2">
+              <a:schemeClr val="accent1">
+                <a:shade val="50000"/>
+              </a:schemeClr>
+            </a:lnRef>
+            <a:fillRef idx="1">
+              <a:schemeClr val="accent1"/>
+            </a:fillRef>
+            <a:effectRef idx="0">
+              <a:schemeClr val="accent1"/>
+            </a:effectRef>
+            <a:fontRef idx="minor">
+              <a:schemeClr val="lt1"/>
+            </a:fontRef>
+          </p:style>
+          <p:txBody>
+            <a:bodyPr rtlCol="0" anchor="ctr"/>
+            <a:lstStyle/>
+            <a:p>
+              <a:pPr algn="ctr"/>
+              <a:endParaRPr lang="en-US"/>
+            </a:p>
+          </p:txBody>
+        </p:sp>
+      </p:grpSp>
+      <p:sp>
+        <p:nvSpPr>
+          <p:cNvPr id="19" name="Rectangle 18">
+            <a:extLst>
+              <a:ext uri="{FF2B5EF4-FFF2-40B4-BE49-F238E27FC236}">
+                <a16:creationId xmlns:a16="http://schemas.microsoft.com/office/drawing/2014/main" id="{D5B0017B-2ECA-49AF-B397-DC140825DF8D}"/>
+              </a:ext>
+              <a:ext uri="{C183D7F6-B498-43B3-948B-1728B52AA6E4}">
+                <adec:decorative xmlns:adec="http://schemas.microsoft.com/office/drawing/2017/decorative" val="1"/>
+              </a:ext>
+            </a:extLst>
+          </p:cNvPr>
+          <p:cNvSpPr>
+            <a:spLocks noGrp="1" noRot="1" noChangeAspect="1" noMove="1" noResize="1" noEditPoints="1" noAdjustHandles="1" noChangeArrowheads="1" noChangeShapeType="1" noTextEdit="1"/>
+          </p:cNvSpPr>
+          <p:nvPr>
+            <p:extLst>
+              <p:ext uri="{386F3935-93C4-4BCD-93E2-E3B085C9AB24}">
+                <p16:designElem xmlns:p16="http://schemas.microsoft.com/office/powerpoint/2015/main" val="1"/>
+              </p:ext>
+            </p:extLst>
+          </p:nvPr>
+        </p:nvSpPr>
+        <p:spPr>
+          <a:xfrm>
+            <a:off x="640080" y="656150"/>
+            <a:ext cx="5590787" cy="1431591"/>
+          </a:xfrm>
+          <a:prstGeom prst="rect">
+            <a:avLst/>
+          </a:prstGeom>
+          <a:solidFill>
+            <a:schemeClr val="bg1"/>
+          </a:solidFill>
+          <a:ln>
+            <a:noFill/>
+          </a:ln>
+          <a:effectLst>
+            <a:outerShdw blurRad="139700" dist="127000" dir="5400000" algn="t" rotWithShape="0">
+              <a:prstClr val="black">
+                <a:alpha val="15000"/>
+              </a:prstClr>
+            </a:outerShdw>
+          </a:effectLst>
+        </p:spPr>
+        <p:style>
+          <a:lnRef idx="2">
+            <a:schemeClr val="accent1">
+              <a:shade val="50000"/>
+            </a:schemeClr>
+          </a:lnRef>
+          <a:fillRef idx="1">
+            <a:schemeClr val="accent1"/>
+          </a:fillRef>
+          <a:effectRef idx="0">
+            <a:schemeClr val="accent1"/>
+          </a:effectRef>
+          <a:fontRef idx="minor">
+            <a:schemeClr val="lt1"/>
+          </a:fontRef>
+        </p:style>
+        <p:txBody>
+          <a:bodyPr rtlCol="0" anchor="ctr"/>
+          <a:lstStyle/>
+          <a:p>
+            <a:pPr algn="ctr"/>
+            <a:endParaRPr lang="en-US"/>
+          </a:p>
+        </p:txBody>
+      </p:sp>
+      <p:sp>
+        <p:nvSpPr>
+          <p:cNvPr id="2" name="Title 1">
+            <a:extLst>
+              <a:ext uri="{FF2B5EF4-FFF2-40B4-BE49-F238E27FC236}">
+                <a16:creationId xmlns:a16="http://schemas.microsoft.com/office/drawing/2014/main" id="{2FF4AAA3-866F-4D4F-AEB6-BA50788852E1}"/>
+              </a:ext>
+            </a:extLst>
+          </p:cNvPr>
+          <p:cNvSpPr>
+            <a:spLocks noGrp="1"/>
+          </p:cNvSpPr>
+          <p:nvPr>
+            <p:ph type="title"/>
+          </p:nvPr>
+        </p:nvSpPr>
+        <p:spPr>
+          <a:xfrm>
+            <a:off x="1043631" y="873940"/>
+            <a:ext cx="4928291" cy="1035781"/>
+          </a:xfrm>
+        </p:spPr>
+        <p:txBody>
+          <a:bodyPr anchor="ctr">
+            <a:normAutofit/>
+          </a:bodyPr>
+          <a:lstStyle/>
+          <a:p>
+            <a:r>
+              <a:rPr lang="en-US" sz="3600" dirty="0"/>
+              <a:t>Thanks!</a:t>
+            </a:r>
+          </a:p>
+        </p:txBody>
+      </p:sp>
+      <p:sp>
+        <p:nvSpPr>
+          <p:cNvPr id="9" name="Content Placeholder 8">
+            <a:extLst>
+              <a:ext uri="{FF2B5EF4-FFF2-40B4-BE49-F238E27FC236}">
+                <a16:creationId xmlns:a16="http://schemas.microsoft.com/office/drawing/2014/main" id="{BAEFDEDB-C459-4679-A09A-9D88D9967240}"/>
+              </a:ext>
+            </a:extLst>
+          </p:cNvPr>
+          <p:cNvSpPr>
+            <a:spLocks noGrp="1"/>
+          </p:cNvSpPr>
+          <p:nvPr>
+            <p:ph idx="1"/>
+          </p:nvPr>
+        </p:nvSpPr>
+        <p:spPr>
+          <a:xfrm>
+            <a:off x="1045029" y="2524721"/>
+            <a:ext cx="4991629" cy="3677123"/>
+          </a:xfrm>
+        </p:spPr>
+        <p:txBody>
+          <a:bodyPr anchor="ctr">
+            <a:normAutofit/>
+          </a:bodyPr>
+          <a:lstStyle/>
+          <a:p>
+            <a:r>
+              <a:rPr lang="en-US" dirty="0">
+                <a:hlinkClick r:id="rId2"/>
+              </a:rPr>
+              <a:t>thoma2bm@mail.uc.edu</a:t>
+            </a:r>
+            <a:endParaRPr lang="en-US" dirty="0"/>
+          </a:p>
+        </p:txBody>
+      </p:sp>
+      <p:pic>
+        <p:nvPicPr>
+          <p:cNvPr id="5" name="Content Placeholder 4">
+            <a:extLst>
+              <a:ext uri="{FF2B5EF4-FFF2-40B4-BE49-F238E27FC236}">
+                <a16:creationId xmlns:a16="http://schemas.microsoft.com/office/drawing/2014/main" id="{3775163F-68E0-4E9A-A1E6-AC0C991AE435}"/>
+              </a:ext>
+            </a:extLst>
+          </p:cNvPr>
+          <p:cNvPicPr>
+            <a:picLocks noChangeAspect="1"/>
+          </p:cNvPicPr>
+          <p:nvPr/>
+        </p:nvPicPr>
+        <p:blipFill rotWithShape="1">
+          <a:blip r:embed="rId3">
+            <a:extLst>
+              <a:ext uri="{28A0092B-C50C-407E-A947-70E740481C1C}">
+                <a14:useLocalDpi xmlns:a14="http://schemas.microsoft.com/office/drawing/2010/main" val="0"/>
+              </a:ext>
+            </a:extLst>
+          </a:blip>
+          <a:srcRect t="2056" b="6055"/>
+          <a:stretch/>
+        </p:blipFill>
+        <p:spPr>
+          <a:xfrm>
+            <a:off x="6788383" y="613147"/>
+            <a:ext cx="4565417" cy="5593443"/>
+          </a:xfrm>
+          <a:prstGeom prst="rect">
+            <a:avLst/>
+          </a:prstGeom>
+        </p:spPr>
+      </p:pic>
+      <p:cxnSp>
+        <p:nvCxnSpPr>
+          <p:cNvPr id="21" name="Straight Connector 20">
+            <a:extLst>
+              <a:ext uri="{FF2B5EF4-FFF2-40B4-BE49-F238E27FC236}">
+                <a16:creationId xmlns:a16="http://schemas.microsoft.com/office/drawing/2014/main" id="{6CF1BAF6-AD41-4082-B212-8A1F9A2E8779}"/>
+              </a:ext>
+              <a:ext uri="{C183D7F6-B498-43B3-948B-1728B52AA6E4}">
+                <adec:decorative xmlns:adec="http://schemas.microsoft.com/office/drawing/2017/decorative" val="1"/>
+              </a:ext>
+            </a:extLst>
+          </p:cNvPr>
+          <p:cNvCxnSpPr>
+            <a:cxnSpLocks noGrp="1" noRot="1" noChangeAspect="1" noMove="1" noResize="1" noEditPoints="1" noAdjustHandles="1" noChangeArrowheads="1" noChangeShapeType="1"/>
+          </p:cNvCxnSpPr>
+          <p:nvPr>
+            <p:extLst>
+              <p:ext uri="{386F3935-93C4-4BCD-93E2-E3B085C9AB24}">
+                <p16:designElem xmlns:p16="http://schemas.microsoft.com/office/powerpoint/2015/main" val="1"/>
+              </p:ext>
+            </p:extLst>
+          </p:nvPr>
+        </p:nvCxnSpPr>
+        <p:spPr>
+          <a:xfrm flipH="1">
+            <a:off x="838200" y="6492240"/>
+            <a:ext cx="10515600" cy="0"/>
+          </a:xfrm>
+          <a:prstGeom prst="line">
+            <a:avLst/>
+          </a:prstGeom>
+          <a:ln w="57150">
+            <a:solidFill>
+              <a:schemeClr val="accent4"/>
+            </a:solidFill>
+          </a:ln>
+        </p:spPr>
+        <p:style>
+          <a:lnRef idx="1">
+            <a:schemeClr val="accent1"/>
+          </a:lnRef>
+          <a:fillRef idx="0">
+            <a:schemeClr val="accent1"/>
+          </a:fillRef>
+          <a:effectRef idx="0">
+            <a:schemeClr val="accent1"/>
+          </a:effectRef>
+          <a:fontRef idx="minor">
+            <a:schemeClr val="tx1"/>
+          </a:fontRef>
+        </p:style>
+      </p:cxnSp>
+    </p:spTree>
+    <p:extLst>
+      <p:ext uri="{BB962C8B-B14F-4D97-AF65-F5344CB8AC3E}">
+        <p14:creationId xmlns:p14="http://schemas.microsoft.com/office/powerpoint/2010/main" val="2024925593"/>
+      </p:ext>
+    </p:extLst>
+  </p:cSld>
+  <p:clrMapOvr>
+    <a:masterClrMapping/>
+  </p:clrMapOvr>
+</p:sld>
+</file>
+
 <file path=ppt/slides/slide2.xml><?xml version="1.0" encoding="utf-8"?>
 <p:sld xmlns:a="http://schemas.openxmlformats.org/drawingml/2006/main" xmlns:r="http://schemas.openxmlformats.org/officeDocument/2006/relationships" xmlns:p="http://schemas.openxmlformats.org/presentationml/2006/main">
   <p:cSld>
@@ -9148,12 +11299,15 @@
           </a:bodyPr>
           <a:lstStyle/>
           <a:p>
-            <a:pPr marL="0" indent="0">
-              <a:buNone/>
-            </a:pPr>
             <a:r>
-              <a:rPr lang="en-US" sz="2400"/>
-              <a:t>Repeated lifting of heavy objects has been shown to create increased risk for incidences of lower back pain. While lifting objects cannot be entirely avoided in daily life, proper technique mitigates these risks. Determining when a person is lifting in a risky way can help a worker learn to avoid dangerous lifts and help the employer determine if the workplace layout is prone to requiring them. The goal of this project is to develop a machine learning approach for detecting the risk level of an individual lift based on accelerometer and gyroscope data from various sensors placed on a worker’s body.</a:t>
+              <a:rPr lang="en-US" sz="2400" dirty="0"/>
+              <a:t>Determine if deep learning is a viable solution to detect risk of back pain caused by lifting heavy objects</a:t>
+            </a:r>
+          </a:p>
+          <a:p>
+            <a:r>
+              <a:rPr lang="en-US" sz="2400" dirty="0"/>
+              <a:t>Develop a machine learning approach to detecting the level of risk</a:t>
             </a:r>
           </a:p>
         </p:txBody>
@@ -10174,27 +12328,27 @@
           <a:lstStyle/>
           <a:p>
             <a:r>
-              <a:rPr lang="en-US" sz="2400"/>
+              <a:rPr lang="en-US" sz="2400" dirty="0"/>
               <a:t>Workplace ergonomics is a very important field</a:t>
             </a:r>
           </a:p>
           <a:p>
             <a:pPr lvl="1"/>
             <a:r>
-              <a:rPr lang="en-US"/>
+              <a:rPr lang="en-US" dirty="0"/>
               <a:t>Unsafe workplaces can have lasting impact on quality of life</a:t>
             </a:r>
           </a:p>
           <a:p>
             <a:r>
-              <a:rPr lang="en-US" sz="2400"/>
+              <a:rPr lang="en-US" sz="2400" dirty="0"/>
               <a:t>Determining the usefulness of machine learning for monitoring workplace safety</a:t>
             </a:r>
           </a:p>
           <a:p>
             <a:r>
-              <a:rPr lang="en-US" sz="2400"/>
-              <a:t>Provides a framework for safer work environments using unintrusive IMU monitoring</a:t>
+              <a:rPr lang="en-US" sz="2400" dirty="0"/>
+              <a:t>Provides a framework for safer work environments using unintrusive wearable sensor monitoring</a:t>
             </a:r>
           </a:p>
         </p:txBody>
@@ -10870,6 +13024,984 @@
       </p:grpSpPr>
       <p:sp useBgFill="1">
         <p:nvSpPr>
+          <p:cNvPr id="10" name="Rectangle 9">
+            <a:extLst>
+              <a:ext uri="{FF2B5EF4-FFF2-40B4-BE49-F238E27FC236}">
+                <a16:creationId xmlns:a16="http://schemas.microsoft.com/office/drawing/2014/main" id="{201CC55D-ED54-4C5C-95E6-10947BD1103B}"/>
+              </a:ext>
+              <a:ext uri="{C183D7F6-B498-43B3-948B-1728B52AA6E4}">
+                <adec:decorative xmlns:adec="http://schemas.microsoft.com/office/drawing/2017/decorative" val="1"/>
+              </a:ext>
+            </a:extLst>
+          </p:cNvPr>
+          <p:cNvSpPr>
+            <a:spLocks noGrp="1" noRot="1" noChangeAspect="1" noMove="1" noResize="1" noEditPoints="1" noAdjustHandles="1" noChangeArrowheads="1" noChangeShapeType="1" noTextEdit="1"/>
+          </p:cNvSpPr>
+          <p:nvPr>
+            <p:extLst>
+              <p:ext uri="{386F3935-93C4-4BCD-93E2-E3B085C9AB24}">
+                <p16:designElem xmlns:p16="http://schemas.microsoft.com/office/powerpoint/2015/main" val="1"/>
+              </p:ext>
+            </p:extLst>
+          </p:nvPr>
+        </p:nvSpPr>
+        <p:spPr>
+          <a:xfrm>
+            <a:off x="0" y="0"/>
+            <a:ext cx="12191999" cy="6857365"/>
+          </a:xfrm>
+          <a:prstGeom prst="rect">
+            <a:avLst/>
+          </a:prstGeom>
+          <a:ln>
+            <a:noFill/>
+          </a:ln>
+        </p:spPr>
+        <p:style>
+          <a:lnRef idx="2">
+            <a:schemeClr val="accent1">
+              <a:shade val="50000"/>
+            </a:schemeClr>
+          </a:lnRef>
+          <a:fillRef idx="1">
+            <a:schemeClr val="accent1"/>
+          </a:fillRef>
+          <a:effectRef idx="0">
+            <a:schemeClr val="accent1"/>
+          </a:effectRef>
+          <a:fontRef idx="minor">
+            <a:schemeClr val="lt1"/>
+          </a:fontRef>
+        </p:style>
+        <p:txBody>
+          <a:bodyPr rtlCol="0" anchor="ctr"/>
+          <a:lstStyle/>
+          <a:p>
+            <a:pPr algn="ctr"/>
+            <a:endParaRPr lang="en-US"/>
+          </a:p>
+        </p:txBody>
+      </p:sp>
+      <p:sp>
+        <p:nvSpPr>
+          <p:cNvPr id="2" name="Title 1">
+            <a:extLst>
+              <a:ext uri="{FF2B5EF4-FFF2-40B4-BE49-F238E27FC236}">
+                <a16:creationId xmlns:a16="http://schemas.microsoft.com/office/drawing/2014/main" id="{C922AEFA-D746-49DC-8B67-9044AD107495}"/>
+              </a:ext>
+            </a:extLst>
+          </p:cNvPr>
+          <p:cNvSpPr>
+            <a:spLocks noGrp="1"/>
+          </p:cNvSpPr>
+          <p:nvPr>
+            <p:ph type="title"/>
+          </p:nvPr>
+        </p:nvSpPr>
+        <p:spPr>
+          <a:xfrm>
+            <a:off x="589560" y="856180"/>
+            <a:ext cx="4560584" cy="1128068"/>
+          </a:xfrm>
+        </p:spPr>
+        <p:txBody>
+          <a:bodyPr anchor="ctr">
+            <a:normAutofit/>
+          </a:bodyPr>
+          <a:lstStyle/>
+          <a:p>
+            <a:r>
+              <a:rPr lang="en-US" sz="4000"/>
+              <a:t>Data Specification</a:t>
+            </a:r>
+          </a:p>
+        </p:txBody>
+      </p:sp>
+      <p:grpSp>
+        <p:nvGrpSpPr>
+          <p:cNvPr id="12" name="Group 11">
+            <a:extLst>
+              <a:ext uri="{FF2B5EF4-FFF2-40B4-BE49-F238E27FC236}">
+                <a16:creationId xmlns:a16="http://schemas.microsoft.com/office/drawing/2014/main" id="{1DE889C7-FAD6-4397-98E2-05D503484459}"/>
+              </a:ext>
+              <a:ext uri="{C183D7F6-B498-43B3-948B-1728B52AA6E4}">
+                <adec:decorative xmlns:adec="http://schemas.microsoft.com/office/drawing/2017/decorative" val="1"/>
+              </a:ext>
+            </a:extLst>
+          </p:cNvPr>
+          <p:cNvGrpSpPr>
+            <a:grpSpLocks noGrp="1" noUngrp="1" noRot="1" noChangeAspect="1" noMove="1" noResize="1"/>
+          </p:cNvGrpSpPr>
+          <p:nvPr>
+            <p:extLst>
+              <p:ext uri="{386F3935-93C4-4BCD-93E2-E3B085C9AB24}">
+                <p16:designElem xmlns:p16="http://schemas.microsoft.com/office/powerpoint/2015/main" val="1"/>
+              </p:ext>
+            </p:extLst>
+          </p:nvPr>
+        </p:nvGrpSpPr>
+        <p:grpSpPr>
+          <a:xfrm>
+            <a:off x="0" y="1083484"/>
+            <a:ext cx="355196" cy="673460"/>
+            <a:chOff x="0" y="823811"/>
+            <a:chExt cx="355196" cy="673460"/>
+          </a:xfrm>
+        </p:grpSpPr>
+        <p:sp>
+          <p:nvSpPr>
+            <p:cNvPr id="13" name="Rectangle 12">
+              <a:extLst>
+                <a:ext uri="{FF2B5EF4-FFF2-40B4-BE49-F238E27FC236}">
+                  <a16:creationId xmlns:a16="http://schemas.microsoft.com/office/drawing/2014/main" id="{F399A70F-F8CD-4992-9EF5-6CF15472E73F}"/>
+                </a:ext>
+                <a:ext uri="{C183D7F6-B498-43B3-948B-1728B52AA6E4}">
+                  <adec:decorative xmlns:adec="http://schemas.microsoft.com/office/drawing/2017/decorative" val="1"/>
+                </a:ext>
+              </a:extLst>
+            </p:cNvPr>
+            <p:cNvSpPr/>
+            <p:nvPr>
+              <p:extLst>
+                <p:ext uri="{386F3935-93C4-4BCD-93E2-E3B085C9AB24}">
+                  <p16:designElem xmlns:p16="http://schemas.microsoft.com/office/powerpoint/2015/main" val="1"/>
+                </p:ext>
+              </p:extLst>
+            </p:nvPr>
+          </p:nvSpPr>
+          <p:spPr>
+            <a:xfrm>
+              <a:off x="0" y="823811"/>
+              <a:ext cx="87363" cy="673460"/>
+            </a:xfrm>
+            <a:prstGeom prst="rect">
+              <a:avLst/>
+            </a:prstGeom>
+            <a:solidFill>
+              <a:schemeClr val="accent4"/>
+            </a:solidFill>
+            <a:ln>
+              <a:noFill/>
+            </a:ln>
+          </p:spPr>
+          <p:style>
+            <a:lnRef idx="2">
+              <a:schemeClr val="accent1">
+                <a:shade val="50000"/>
+              </a:schemeClr>
+            </a:lnRef>
+            <a:fillRef idx="1">
+              <a:schemeClr val="accent1"/>
+            </a:fillRef>
+            <a:effectRef idx="0">
+              <a:schemeClr val="accent1"/>
+            </a:effectRef>
+            <a:fontRef idx="minor">
+              <a:schemeClr val="lt1"/>
+            </a:fontRef>
+          </p:style>
+          <p:txBody>
+            <a:bodyPr rtlCol="0" anchor="ctr"/>
+            <a:lstStyle/>
+            <a:p>
+              <a:pPr algn="ctr"/>
+              <a:endParaRPr lang="en-US"/>
+            </a:p>
+          </p:txBody>
+        </p:sp>
+        <p:sp>
+          <p:nvSpPr>
+            <p:cNvPr id="14" name="Rectangle 13">
+              <a:extLst>
+                <a:ext uri="{FF2B5EF4-FFF2-40B4-BE49-F238E27FC236}">
+                  <a16:creationId xmlns:a16="http://schemas.microsoft.com/office/drawing/2014/main" id="{48F4FEDC-6D80-458C-A665-075D9B9500FD}"/>
+                </a:ext>
+                <a:ext uri="{C183D7F6-B498-43B3-948B-1728B52AA6E4}">
+                  <adec:decorative xmlns:adec="http://schemas.microsoft.com/office/drawing/2017/decorative" val="1"/>
+                </a:ext>
+              </a:extLst>
+            </p:cNvPr>
+            <p:cNvSpPr/>
+            <p:nvPr>
+              <p:extLst>
+                <p:ext uri="{386F3935-93C4-4BCD-93E2-E3B085C9AB24}">
+                  <p16:designElem xmlns:p16="http://schemas.microsoft.com/office/powerpoint/2015/main" val="1"/>
+                </p:ext>
+              </p:extLst>
+            </p:nvPr>
+          </p:nvSpPr>
+          <p:spPr>
+            <a:xfrm>
+              <a:off x="159341" y="823811"/>
+              <a:ext cx="195855" cy="673460"/>
+            </a:xfrm>
+            <a:prstGeom prst="rect">
+              <a:avLst/>
+            </a:prstGeom>
+            <a:solidFill>
+              <a:schemeClr val="accent4"/>
+            </a:solidFill>
+            <a:ln>
+              <a:noFill/>
+            </a:ln>
+          </p:spPr>
+          <p:style>
+            <a:lnRef idx="2">
+              <a:schemeClr val="accent1">
+                <a:shade val="50000"/>
+              </a:schemeClr>
+            </a:lnRef>
+            <a:fillRef idx="1">
+              <a:schemeClr val="accent1"/>
+            </a:fillRef>
+            <a:effectRef idx="0">
+              <a:schemeClr val="accent1"/>
+            </a:effectRef>
+            <a:fontRef idx="minor">
+              <a:schemeClr val="lt1"/>
+            </a:fontRef>
+          </p:style>
+          <p:txBody>
+            <a:bodyPr rtlCol="0" anchor="ctr"/>
+            <a:lstStyle/>
+            <a:p>
+              <a:pPr algn="ctr"/>
+              <a:endParaRPr lang="en-US"/>
+            </a:p>
+          </p:txBody>
+        </p:sp>
+      </p:grpSp>
+      <p:sp>
+        <p:nvSpPr>
+          <p:cNvPr id="16" name="Rectangle 15">
+            <a:extLst>
+              <a:ext uri="{FF2B5EF4-FFF2-40B4-BE49-F238E27FC236}">
+                <a16:creationId xmlns:a16="http://schemas.microsoft.com/office/drawing/2014/main" id="{3873B707-463F-40B0-8227-E8CC6C67EB25}"/>
+              </a:ext>
+              <a:ext uri="{C183D7F6-B498-43B3-948B-1728B52AA6E4}">
+                <adec:decorative xmlns:adec="http://schemas.microsoft.com/office/drawing/2017/decorative" val="1"/>
+              </a:ext>
+            </a:extLst>
+          </p:cNvPr>
+          <p:cNvSpPr>
+            <a:spLocks noGrp="1" noRot="1" noChangeAspect="1" noMove="1" noResize="1" noEditPoints="1" noAdjustHandles="1" noChangeArrowheads="1" noChangeShapeType="1" noTextEdit="1"/>
+          </p:cNvSpPr>
+          <p:nvPr>
+            <p:extLst>
+              <p:ext uri="{386F3935-93C4-4BCD-93E2-E3B085C9AB24}">
+                <p16:designElem xmlns:p16="http://schemas.microsoft.com/office/powerpoint/2015/main" val="1"/>
+              </p:ext>
+            </p:extLst>
+          </p:nvPr>
+        </p:nvSpPr>
+        <p:spPr>
+          <a:xfrm flipH="1">
+            <a:off x="665085" y="2090569"/>
+            <a:ext cx="4297680" cy="27432"/>
+          </a:xfrm>
+          <a:prstGeom prst="rect">
+            <a:avLst/>
+          </a:prstGeom>
+          <a:solidFill>
+            <a:schemeClr val="accent4"/>
+          </a:solidFill>
+          <a:ln>
+            <a:noFill/>
+          </a:ln>
+        </p:spPr>
+        <p:style>
+          <a:lnRef idx="2">
+            <a:schemeClr val="accent1">
+              <a:shade val="50000"/>
+            </a:schemeClr>
+          </a:lnRef>
+          <a:fillRef idx="1">
+            <a:schemeClr val="accent1"/>
+          </a:fillRef>
+          <a:effectRef idx="0">
+            <a:schemeClr val="accent1"/>
+          </a:effectRef>
+          <a:fontRef idx="minor">
+            <a:schemeClr val="lt1"/>
+          </a:fontRef>
+        </p:style>
+        <p:txBody>
+          <a:bodyPr rtlCol="0" anchor="ctr"/>
+          <a:lstStyle/>
+          <a:p>
+            <a:pPr algn="ctr"/>
+            <a:endParaRPr lang="en-US"/>
+          </a:p>
+        </p:txBody>
+      </p:sp>
+      <p:sp>
+        <p:nvSpPr>
+          <p:cNvPr id="3" name="Content Placeholder 2">
+            <a:extLst>
+              <a:ext uri="{FF2B5EF4-FFF2-40B4-BE49-F238E27FC236}">
+                <a16:creationId xmlns:a16="http://schemas.microsoft.com/office/drawing/2014/main" id="{9ADE966A-233E-411E-8548-A252931F2673}"/>
+              </a:ext>
+            </a:extLst>
+          </p:cNvPr>
+          <p:cNvSpPr>
+            <a:spLocks noGrp="1"/>
+          </p:cNvSpPr>
+          <p:nvPr>
+            <p:ph idx="1"/>
+          </p:nvPr>
+        </p:nvSpPr>
+        <p:spPr>
+          <a:xfrm>
+            <a:off x="590719" y="2330505"/>
+            <a:ext cx="4559425" cy="3979585"/>
+          </a:xfrm>
+        </p:spPr>
+        <p:txBody>
+          <a:bodyPr anchor="ctr">
+            <a:normAutofit/>
+          </a:bodyPr>
+          <a:lstStyle/>
+          <a:p>
+            <a:r>
+              <a:rPr lang="en-US" sz="2000" dirty="0"/>
+              <a:t>Data collected by National Institute of Occupational Safety and Health (NIOSH)</a:t>
+            </a:r>
+          </a:p>
+          <a:p>
+            <a:r>
+              <a:rPr lang="en-US" sz="2000" dirty="0"/>
+              <a:t>Ten subjects, six lift trials in each zone defined by the American Conference of Governmental Industrial Hygienists (ACGIH) Threshold Limit Values (TLV) for lifting</a:t>
+            </a:r>
+          </a:p>
+          <a:p>
+            <a:r>
+              <a:rPr lang="en-US" sz="2000" dirty="0"/>
+              <a:t>Additional non-lifting trials</a:t>
+            </a:r>
+          </a:p>
+        </p:txBody>
+      </p:sp>
+      <p:sp>
+        <p:nvSpPr>
+          <p:cNvPr id="18" name="Rectangle 17">
+            <a:extLst>
+              <a:ext uri="{FF2B5EF4-FFF2-40B4-BE49-F238E27FC236}">
+                <a16:creationId xmlns:a16="http://schemas.microsoft.com/office/drawing/2014/main" id="{C13237C8-E62C-4F0D-A318-BD6FB6C2D138}"/>
+              </a:ext>
+              <a:ext uri="{C183D7F6-B498-43B3-948B-1728B52AA6E4}">
+                <adec:decorative xmlns:adec="http://schemas.microsoft.com/office/drawing/2017/decorative" val="1"/>
+              </a:ext>
+            </a:extLst>
+          </p:cNvPr>
+          <p:cNvSpPr>
+            <a:spLocks noGrp="1" noRot="1" noChangeAspect="1" noMove="1" noResize="1" noEditPoints="1" noAdjustHandles="1" noChangeArrowheads="1" noChangeShapeType="1" noTextEdit="1"/>
+          </p:cNvSpPr>
+          <p:nvPr>
+            <p:extLst>
+              <p:ext uri="{386F3935-93C4-4BCD-93E2-E3B085C9AB24}">
+                <p16:designElem xmlns:p16="http://schemas.microsoft.com/office/powerpoint/2015/main" val="1"/>
+              </p:ext>
+            </p:extLst>
+          </p:nvPr>
+        </p:nvSpPr>
+        <p:spPr>
+          <a:xfrm flipH="1">
+            <a:off x="10697670" y="0"/>
+            <a:ext cx="1494330" cy="6858000"/>
+          </a:xfrm>
+          <a:prstGeom prst="rect">
+            <a:avLst/>
+          </a:prstGeom>
+          <a:solidFill>
+            <a:schemeClr val="accent4"/>
+          </a:solidFill>
+          <a:ln>
+            <a:noFill/>
+          </a:ln>
+        </p:spPr>
+        <p:style>
+          <a:lnRef idx="2">
+            <a:schemeClr val="accent1">
+              <a:shade val="50000"/>
+            </a:schemeClr>
+          </a:lnRef>
+          <a:fillRef idx="1">
+            <a:schemeClr val="accent1"/>
+          </a:fillRef>
+          <a:effectRef idx="0">
+            <a:schemeClr val="accent1"/>
+          </a:effectRef>
+          <a:fontRef idx="minor">
+            <a:schemeClr val="lt1"/>
+          </a:fontRef>
+        </p:style>
+        <p:txBody>
+          <a:bodyPr rtlCol="0" anchor="ctr"/>
+          <a:lstStyle/>
+          <a:p>
+            <a:pPr algn="ctr"/>
+            <a:endParaRPr lang="en-US"/>
+          </a:p>
+        </p:txBody>
+      </p:sp>
+      <p:sp>
+        <p:nvSpPr>
+          <p:cNvPr id="20" name="Rectangle 19">
+            <a:extLst>
+              <a:ext uri="{FF2B5EF4-FFF2-40B4-BE49-F238E27FC236}">
+                <a16:creationId xmlns:a16="http://schemas.microsoft.com/office/drawing/2014/main" id="{19C9EAEA-39D0-4B0E-A0EB-51E7B26740B1}"/>
+              </a:ext>
+              <a:ext uri="{C183D7F6-B498-43B3-948B-1728B52AA6E4}">
+                <adec:decorative xmlns:adec="http://schemas.microsoft.com/office/drawing/2017/decorative" val="1"/>
+              </a:ext>
+            </a:extLst>
+          </p:cNvPr>
+          <p:cNvSpPr>
+            <a:spLocks noGrp="1" noRot="1" noChangeAspect="1" noMove="1" noResize="1" noEditPoints="1" noAdjustHandles="1" noChangeArrowheads="1" noChangeShapeType="1" noTextEdit="1"/>
+          </p:cNvSpPr>
+          <p:nvPr>
+            <p:extLst>
+              <p:ext uri="{386F3935-93C4-4BCD-93E2-E3B085C9AB24}">
+                <p16:designElem xmlns:p16="http://schemas.microsoft.com/office/powerpoint/2015/main" val="1"/>
+              </p:ext>
+            </p:extLst>
+          </p:nvPr>
+        </p:nvSpPr>
+        <p:spPr>
+          <a:xfrm>
+            <a:off x="5685810" y="513853"/>
+            <a:ext cx="6009366" cy="5834577"/>
+          </a:xfrm>
+          <a:prstGeom prst="rect">
+            <a:avLst/>
+          </a:prstGeom>
+          <a:solidFill>
+            <a:schemeClr val="bg1"/>
+          </a:solidFill>
+          <a:ln>
+            <a:noFill/>
+          </a:ln>
+          <a:effectLst>
+            <a:outerShdw blurRad="139700" dist="127000" dir="5400000" algn="t" rotWithShape="0">
+              <a:prstClr val="black">
+                <a:alpha val="15000"/>
+              </a:prstClr>
+            </a:outerShdw>
+          </a:effectLst>
+        </p:spPr>
+        <p:style>
+          <a:lnRef idx="2">
+            <a:schemeClr val="accent1">
+              <a:shade val="50000"/>
+            </a:schemeClr>
+          </a:lnRef>
+          <a:fillRef idx="1">
+            <a:schemeClr val="accent1"/>
+          </a:fillRef>
+          <a:effectRef idx="0">
+            <a:schemeClr val="accent1"/>
+          </a:effectRef>
+          <a:fontRef idx="minor">
+            <a:schemeClr val="lt1"/>
+          </a:fontRef>
+        </p:style>
+        <p:txBody>
+          <a:bodyPr rtlCol="0" anchor="ctr"/>
+          <a:lstStyle/>
+          <a:p>
+            <a:pPr algn="ctr"/>
+            <a:endParaRPr lang="en-US"/>
+          </a:p>
+        </p:txBody>
+      </p:sp>
+      <p:pic>
+        <p:nvPicPr>
+          <p:cNvPr id="5" name="Picture 4" descr="Diagram&#10;&#10;Description automatically generated">
+            <a:extLst>
+              <a:ext uri="{FF2B5EF4-FFF2-40B4-BE49-F238E27FC236}">
+                <a16:creationId xmlns:a16="http://schemas.microsoft.com/office/drawing/2014/main" id="{0DF55851-EE3B-48FE-B36B-12DAAE8F8383}"/>
+              </a:ext>
+            </a:extLst>
+          </p:cNvPr>
+          <p:cNvPicPr>
+            <a:picLocks noChangeAspect="1"/>
+          </p:cNvPicPr>
+          <p:nvPr/>
+        </p:nvPicPr>
+        <p:blipFill rotWithShape="1">
+          <a:blip r:embed="rId2">
+            <a:extLst>
+              <a:ext uri="{28A0092B-C50C-407E-A947-70E740481C1C}">
+                <a14:useLocalDpi xmlns:a14="http://schemas.microsoft.com/office/drawing/2010/main" val="0"/>
+              </a:ext>
+            </a:extLst>
+          </a:blip>
+          <a:srcRect t="3711" b="2259"/>
+          <a:stretch/>
+        </p:blipFill>
+        <p:spPr>
+          <a:xfrm>
+            <a:off x="5977788" y="799352"/>
+            <a:ext cx="5425410" cy="5259296"/>
+          </a:xfrm>
+          <a:prstGeom prst="rect">
+            <a:avLst/>
+          </a:prstGeom>
+        </p:spPr>
+      </p:pic>
+    </p:spTree>
+    <p:extLst>
+      <p:ext uri="{BB962C8B-B14F-4D97-AF65-F5344CB8AC3E}">
+        <p14:creationId xmlns:p14="http://schemas.microsoft.com/office/powerpoint/2010/main" val="2854085259"/>
+      </p:ext>
+    </p:extLst>
+  </p:cSld>
+  <p:clrMapOvr>
+    <a:masterClrMapping/>
+  </p:clrMapOvr>
+</p:sld>
+</file>
+
+<file path=ppt/slides/slide7.xml><?xml version="1.0" encoding="utf-8"?>
+<p:sld xmlns:a="http://schemas.openxmlformats.org/drawingml/2006/main" xmlns:r="http://schemas.openxmlformats.org/officeDocument/2006/relationships" xmlns:p="http://schemas.openxmlformats.org/presentationml/2006/main">
+  <p:cSld>
+    <p:bg>
+      <p:bgPr>
+        <a:solidFill>
+          <a:schemeClr val="bg1"/>
+        </a:solidFill>
+        <a:effectLst/>
+      </p:bgPr>
+    </p:bg>
+    <p:spTree>
+      <p:nvGrpSpPr>
+        <p:cNvPr id="1" name=""/>
+        <p:cNvGrpSpPr/>
+        <p:nvPr/>
+      </p:nvGrpSpPr>
+      <p:grpSpPr>
+        <a:xfrm>
+          <a:off x="0" y="0"/>
+          <a:ext cx="0" cy="0"/>
+          <a:chOff x="0" y="0"/>
+          <a:chExt cx="0" cy="0"/>
+        </a:xfrm>
+      </p:grpSpPr>
+      <p:sp useBgFill="1">
+        <p:nvSpPr>
+          <p:cNvPr id="8" name="Rectangle 7">
+            <a:extLst>
+              <a:ext uri="{FF2B5EF4-FFF2-40B4-BE49-F238E27FC236}">
+                <a16:creationId xmlns:a16="http://schemas.microsoft.com/office/drawing/2014/main" id="{DBF61EA3-B236-439E-9C0B-340980D56BEE}"/>
+              </a:ext>
+              <a:ext uri="{C183D7F6-B498-43B3-948B-1728B52AA6E4}">
+                <adec:decorative xmlns:adec="http://schemas.microsoft.com/office/drawing/2017/decorative" val="1"/>
+              </a:ext>
+            </a:extLst>
+          </p:cNvPr>
+          <p:cNvSpPr>
+            <a:spLocks noGrp="1" noRot="1" noChangeAspect="1" noMove="1" noResize="1" noEditPoints="1" noAdjustHandles="1" noChangeArrowheads="1" noChangeShapeType="1" noTextEdit="1"/>
+          </p:cNvSpPr>
+          <p:nvPr>
+            <p:extLst>
+              <p:ext uri="{386F3935-93C4-4BCD-93E2-E3B085C9AB24}">
+                <p16:designElem xmlns:p16="http://schemas.microsoft.com/office/powerpoint/2015/main" val="1"/>
+              </p:ext>
+            </p:extLst>
+          </p:nvPr>
+        </p:nvSpPr>
+        <p:spPr>
+          <a:xfrm>
+            <a:off x="0" y="0"/>
+            <a:ext cx="12191999" cy="6857365"/>
+          </a:xfrm>
+          <a:prstGeom prst="rect">
+            <a:avLst/>
+          </a:prstGeom>
+          <a:ln>
+            <a:noFill/>
+          </a:ln>
+        </p:spPr>
+        <p:style>
+          <a:lnRef idx="2">
+            <a:schemeClr val="accent1">
+              <a:shade val="50000"/>
+            </a:schemeClr>
+          </a:lnRef>
+          <a:fillRef idx="1">
+            <a:schemeClr val="accent1"/>
+          </a:fillRef>
+          <a:effectRef idx="0">
+            <a:schemeClr val="accent1"/>
+          </a:effectRef>
+          <a:fontRef idx="minor">
+            <a:schemeClr val="lt1"/>
+          </a:fontRef>
+        </p:style>
+        <p:txBody>
+          <a:bodyPr rtlCol="0" anchor="ctr"/>
+          <a:lstStyle/>
+          <a:p>
+            <a:pPr algn="ctr"/>
+            <a:endParaRPr lang="en-US"/>
+          </a:p>
+        </p:txBody>
+      </p:sp>
+      <p:sp>
+        <p:nvSpPr>
+          <p:cNvPr id="2" name="Title 1">
+            <a:extLst>
+              <a:ext uri="{FF2B5EF4-FFF2-40B4-BE49-F238E27FC236}">
+                <a16:creationId xmlns:a16="http://schemas.microsoft.com/office/drawing/2014/main" id="{90536E4A-5660-4A96-B959-43EB7D8884F7}"/>
+              </a:ext>
+            </a:extLst>
+          </p:cNvPr>
+          <p:cNvSpPr>
+            <a:spLocks noGrp="1"/>
+          </p:cNvSpPr>
+          <p:nvPr>
+            <p:ph type="title"/>
+          </p:nvPr>
+        </p:nvSpPr>
+        <p:spPr>
+          <a:xfrm>
+            <a:off x="808638" y="386930"/>
+            <a:ext cx="9236700" cy="1188950"/>
+          </a:xfrm>
+        </p:spPr>
+        <p:txBody>
+          <a:bodyPr anchor="b">
+            <a:normAutofit/>
+          </a:bodyPr>
+          <a:lstStyle/>
+          <a:p>
+            <a:r>
+              <a:rPr lang="en-US" sz="4600"/>
+              <a:t>Design Specifications - Preprocessing</a:t>
+            </a:r>
+          </a:p>
+        </p:txBody>
+      </p:sp>
+      <p:grpSp>
+        <p:nvGrpSpPr>
+          <p:cNvPr id="10" name="Group 9">
+            <a:extLst>
+              <a:ext uri="{FF2B5EF4-FFF2-40B4-BE49-F238E27FC236}">
+                <a16:creationId xmlns:a16="http://schemas.microsoft.com/office/drawing/2014/main" id="{28FAF094-D087-493F-8DF9-A486C2D6BBAA}"/>
+              </a:ext>
+              <a:ext uri="{C183D7F6-B498-43B3-948B-1728B52AA6E4}">
+                <adec:decorative xmlns:adec="http://schemas.microsoft.com/office/drawing/2017/decorative" val="1"/>
+              </a:ext>
+            </a:extLst>
+          </p:cNvPr>
+          <p:cNvGrpSpPr>
+            <a:grpSpLocks noGrp="1" noUngrp="1" noRot="1" noChangeAspect="1" noMove="1" noResize="1"/>
+          </p:cNvGrpSpPr>
+          <p:nvPr>
+            <p:extLst>
+              <p:ext uri="{386F3935-93C4-4BCD-93E2-E3B085C9AB24}">
+                <p16:designElem xmlns:p16="http://schemas.microsoft.com/office/powerpoint/2015/main" val="1"/>
+              </p:ext>
+            </p:extLst>
+          </p:nvPr>
+        </p:nvGrpSpPr>
+        <p:grpSpPr>
+          <a:xfrm>
+            <a:off x="-2" y="1998368"/>
+            <a:ext cx="11695083" cy="782176"/>
+            <a:chOff x="-2" y="1998368"/>
+            <a:chExt cx="11695083" cy="782176"/>
+          </a:xfrm>
+        </p:grpSpPr>
+        <p:sp>
+          <p:nvSpPr>
+            <p:cNvPr id="11" name="Rectangle 10">
+              <a:extLst>
+                <a:ext uri="{FF2B5EF4-FFF2-40B4-BE49-F238E27FC236}">
+                  <a16:creationId xmlns:a16="http://schemas.microsoft.com/office/drawing/2014/main" id="{8D7C88D8-5509-4514-925A-9CE148E5CBD6}"/>
+                </a:ext>
+                <a:ext uri="{C183D7F6-B498-43B3-948B-1728B52AA6E4}">
+                  <adec:decorative xmlns:adec="http://schemas.microsoft.com/office/drawing/2017/decorative" val="1"/>
+                </a:ext>
+              </a:extLst>
+            </p:cNvPr>
+            <p:cNvSpPr/>
+            <p:nvPr>
+              <p:extLst>
+                <p:ext uri="{386F3935-93C4-4BCD-93E2-E3B085C9AB24}">
+                  <p16:designElem xmlns:p16="http://schemas.microsoft.com/office/powerpoint/2015/main" val="1"/>
+                </p:ext>
+              </p:extLst>
+            </p:nvPr>
+          </p:nvSpPr>
+          <p:spPr>
+            <a:xfrm rot="5400000">
+              <a:off x="11228040" y="2313027"/>
+              <a:ext cx="781700" cy="152382"/>
+            </a:xfrm>
+            <a:prstGeom prst="rect">
+              <a:avLst/>
+            </a:prstGeom>
+            <a:solidFill>
+              <a:schemeClr val="accent4"/>
+            </a:solidFill>
+            <a:ln>
+              <a:noFill/>
+            </a:ln>
+          </p:spPr>
+          <p:style>
+            <a:lnRef idx="2">
+              <a:schemeClr val="accent1">
+                <a:shade val="50000"/>
+              </a:schemeClr>
+            </a:lnRef>
+            <a:fillRef idx="1">
+              <a:schemeClr val="accent1"/>
+            </a:fillRef>
+            <a:effectRef idx="0">
+              <a:schemeClr val="accent1"/>
+            </a:effectRef>
+            <a:fontRef idx="minor">
+              <a:schemeClr val="lt1"/>
+            </a:fontRef>
+          </p:style>
+          <p:txBody>
+            <a:bodyPr rtlCol="0" anchor="ctr"/>
+            <a:lstStyle/>
+            <a:p>
+              <a:pPr algn="ctr"/>
+              <a:endParaRPr lang="en-US"/>
+            </a:p>
+          </p:txBody>
+        </p:sp>
+        <p:sp>
+          <p:nvSpPr>
+            <p:cNvPr id="12" name="Rectangle 11">
+              <a:extLst>
+                <a:ext uri="{FF2B5EF4-FFF2-40B4-BE49-F238E27FC236}">
+                  <a16:creationId xmlns:a16="http://schemas.microsoft.com/office/drawing/2014/main" id="{7275593D-F75E-4426-AE3E-2CDEFD228D25}"/>
+                </a:ext>
+                <a:ext uri="{C183D7F6-B498-43B3-948B-1728B52AA6E4}">
+                  <adec:decorative xmlns:adec="http://schemas.microsoft.com/office/drawing/2017/decorative" val="1"/>
+                </a:ext>
+              </a:extLst>
+            </p:cNvPr>
+            <p:cNvSpPr/>
+            <p:nvPr>
+              <p:extLst>
+                <p:ext uri="{386F3935-93C4-4BCD-93E2-E3B085C9AB24}">
+                  <p16:designElem xmlns:p16="http://schemas.microsoft.com/office/powerpoint/2015/main" val="1"/>
+                </p:ext>
+              </p:extLst>
+            </p:nvPr>
+          </p:nvSpPr>
+          <p:spPr>
+            <a:xfrm flipH="1" flipV="1">
+              <a:off x="-2" y="1998845"/>
+              <a:ext cx="11454595" cy="781699"/>
+            </a:xfrm>
+            <a:prstGeom prst="rect">
+              <a:avLst/>
+            </a:prstGeom>
+            <a:solidFill>
+              <a:schemeClr val="accent4"/>
+            </a:solidFill>
+            <a:ln>
+              <a:noFill/>
+            </a:ln>
+          </p:spPr>
+          <p:style>
+            <a:lnRef idx="2">
+              <a:schemeClr val="accent1">
+                <a:shade val="50000"/>
+              </a:schemeClr>
+            </a:lnRef>
+            <a:fillRef idx="1">
+              <a:schemeClr val="accent1"/>
+            </a:fillRef>
+            <a:effectRef idx="0">
+              <a:schemeClr val="accent1"/>
+            </a:effectRef>
+            <a:fontRef idx="minor">
+              <a:schemeClr val="lt1"/>
+            </a:fontRef>
+          </p:style>
+          <p:txBody>
+            <a:bodyPr rtlCol="0" anchor="ctr"/>
+            <a:lstStyle/>
+            <a:p>
+              <a:pPr algn="ctr"/>
+              <a:endParaRPr lang="en-US"/>
+            </a:p>
+          </p:txBody>
+        </p:sp>
+      </p:grpSp>
+      <p:sp>
+        <p:nvSpPr>
+          <p:cNvPr id="14" name="Rectangle 13">
+            <a:extLst>
+              <a:ext uri="{FF2B5EF4-FFF2-40B4-BE49-F238E27FC236}">
+                <a16:creationId xmlns:a16="http://schemas.microsoft.com/office/drawing/2014/main" id="{E659831F-0D9A-4C63-9EBB-8435B85A440F}"/>
+              </a:ext>
+              <a:ext uri="{C183D7F6-B498-43B3-948B-1728B52AA6E4}">
+                <adec:decorative xmlns:adec="http://schemas.microsoft.com/office/drawing/2017/decorative" val="1"/>
+              </a:ext>
+            </a:extLst>
+          </p:cNvPr>
+          <p:cNvSpPr>
+            <a:spLocks noGrp="1" noRot="1" noChangeAspect="1" noMove="1" noResize="1" noEditPoints="1" noAdjustHandles="1" noChangeArrowheads="1" noChangeShapeType="1" noTextEdit="1"/>
+          </p:cNvSpPr>
+          <p:nvPr>
+            <p:extLst>
+              <p:ext uri="{386F3935-93C4-4BCD-93E2-E3B085C9AB24}">
+                <p16:designElem xmlns:p16="http://schemas.microsoft.com/office/powerpoint/2015/main" val="1"/>
+              </p:ext>
+            </p:extLst>
+          </p:nvPr>
+        </p:nvSpPr>
+        <p:spPr>
+          <a:xfrm>
+            <a:off x="0" y="2203079"/>
+            <a:ext cx="11383362" cy="4147845"/>
+          </a:xfrm>
+          <a:prstGeom prst="rect">
+            <a:avLst/>
+          </a:prstGeom>
+          <a:solidFill>
+            <a:schemeClr val="bg1"/>
+          </a:solidFill>
+          <a:ln>
+            <a:noFill/>
+          </a:ln>
+          <a:effectLst>
+            <a:outerShdw blurRad="139700" dist="127000" dir="5400000" algn="t" rotWithShape="0">
+              <a:prstClr val="black">
+                <a:alpha val="15000"/>
+              </a:prstClr>
+            </a:outerShdw>
+          </a:effectLst>
+        </p:spPr>
+        <p:style>
+          <a:lnRef idx="2">
+            <a:schemeClr val="accent1">
+              <a:shade val="50000"/>
+            </a:schemeClr>
+          </a:lnRef>
+          <a:fillRef idx="1">
+            <a:schemeClr val="accent1"/>
+          </a:fillRef>
+          <a:effectRef idx="0">
+            <a:schemeClr val="accent1"/>
+          </a:effectRef>
+          <a:fontRef idx="minor">
+            <a:schemeClr val="lt1"/>
+          </a:fontRef>
+        </p:style>
+        <p:txBody>
+          <a:bodyPr rtlCol="0" anchor="ctr"/>
+          <a:lstStyle/>
+          <a:p>
+            <a:pPr algn="ctr"/>
+            <a:endParaRPr lang="en-US"/>
+          </a:p>
+        </p:txBody>
+      </p:sp>
+      <p:sp>
+        <p:nvSpPr>
+          <p:cNvPr id="3" name="Content Placeholder 2">
+            <a:extLst>
+              <a:ext uri="{FF2B5EF4-FFF2-40B4-BE49-F238E27FC236}">
+                <a16:creationId xmlns:a16="http://schemas.microsoft.com/office/drawing/2014/main" id="{92E0E3BE-B95C-4D2F-94C3-C668627F5D42}"/>
+              </a:ext>
+            </a:extLst>
+          </p:cNvPr>
+          <p:cNvSpPr>
+            <a:spLocks noGrp="1"/>
+          </p:cNvSpPr>
+          <p:nvPr>
+            <p:ph idx="1"/>
+          </p:nvPr>
+        </p:nvSpPr>
+        <p:spPr>
+          <a:xfrm>
+            <a:off x="793660" y="2599509"/>
+            <a:ext cx="10143668" cy="3435531"/>
+          </a:xfrm>
+        </p:spPr>
+        <p:txBody>
+          <a:bodyPr anchor="ctr">
+            <a:normAutofit/>
+          </a:bodyPr>
+          <a:lstStyle/>
+          <a:p>
+            <a:r>
+              <a:rPr lang="en-US" sz="2400" dirty="0"/>
+              <a:t>Data split using leave-one-subject-out cross-validation</a:t>
+            </a:r>
+          </a:p>
+          <a:p>
+            <a:r>
+              <a:rPr lang="en-US" sz="2400" dirty="0"/>
+              <a:t>Samples segmented using sliding window for detection using binary labeling</a:t>
+            </a:r>
+          </a:p>
+          <a:p>
+            <a:r>
+              <a:rPr lang="en-US" sz="2400" dirty="0"/>
+              <a:t>Entire sample used as input for classification</a:t>
+            </a:r>
+          </a:p>
+          <a:p>
+            <a:r>
+              <a:rPr lang="en-US" sz="2400" dirty="0"/>
+              <a:t>No further preprocessing</a:t>
+            </a:r>
+          </a:p>
+          <a:p>
+            <a:endParaRPr lang="en-US" sz="2400" dirty="0"/>
+          </a:p>
+        </p:txBody>
+      </p:sp>
+    </p:spTree>
+    <p:extLst>
+      <p:ext uri="{BB962C8B-B14F-4D97-AF65-F5344CB8AC3E}">
+        <p14:creationId xmlns:p14="http://schemas.microsoft.com/office/powerpoint/2010/main" val="756220901"/>
+      </p:ext>
+    </p:extLst>
+  </p:cSld>
+  <p:clrMapOvr>
+    <a:masterClrMapping/>
+  </p:clrMapOvr>
+</p:sld>
+</file>
+
+<file path=ppt/slides/slide8.xml><?xml version="1.0" encoding="utf-8"?>
+<p:sld xmlns:a="http://schemas.openxmlformats.org/drawingml/2006/main" xmlns:r="http://schemas.openxmlformats.org/officeDocument/2006/relationships" xmlns:p="http://schemas.openxmlformats.org/presentationml/2006/main">
+  <p:cSld>
+    <p:bg>
+      <p:bgPr>
+        <a:solidFill>
+          <a:schemeClr val="bg1"/>
+        </a:solidFill>
+        <a:effectLst/>
+      </p:bgPr>
+    </p:bg>
+    <p:spTree>
+      <p:nvGrpSpPr>
+        <p:cNvPr id="1" name=""/>
+        <p:cNvGrpSpPr/>
+        <p:nvPr/>
+      </p:nvGrpSpPr>
+      <p:grpSpPr>
+        <a:xfrm>
+          <a:off x="0" y="0"/>
+          <a:ext cx="0" cy="0"/>
+          <a:chOff x="0" y="0"/>
+          <a:chExt cx="0" cy="0"/>
+        </a:xfrm>
+      </p:grpSpPr>
+      <p:sp useBgFill="1">
+        <p:nvSpPr>
           <p:cNvPr id="62" name="Rectangle 26">
             <a:extLst>
               <a:ext uri="{FF2B5EF4-FFF2-40B4-BE49-F238E27FC236}">
@@ -11263,7 +14395,7 @@
 </p:sld>
 </file>
 
-<file path=ppt/slides/slide7.xml><?xml version="1.0" encoding="utf-8"?>
+<file path=ppt/slides/slide9.xml><?xml version="1.0" encoding="utf-8"?>
 <p:sld xmlns:a="http://schemas.openxmlformats.org/drawingml/2006/main" xmlns:r="http://schemas.openxmlformats.org/officeDocument/2006/relationships" xmlns:p="http://schemas.openxmlformats.org/presentationml/2006/main">
   <p:cSld>
     <p:bg>
@@ -11669,1369 +14801,6 @@
     <p:extLst>
       <p:ext uri="{BB962C8B-B14F-4D97-AF65-F5344CB8AC3E}">
         <p14:creationId xmlns:p14="http://schemas.microsoft.com/office/powerpoint/2010/main" val="3279502215"/>
-      </p:ext>
-    </p:extLst>
-  </p:cSld>
-  <p:clrMapOvr>
-    <a:masterClrMapping/>
-  </p:clrMapOvr>
-</p:sld>
-</file>
-
-<file path=ppt/slides/slide8.xml><?xml version="1.0" encoding="utf-8"?>
-<p:sld xmlns:a="http://schemas.openxmlformats.org/drawingml/2006/main" xmlns:r="http://schemas.openxmlformats.org/officeDocument/2006/relationships" xmlns:p="http://schemas.openxmlformats.org/presentationml/2006/main">
-  <p:cSld>
-    <p:bg>
-      <p:bgPr>
-        <a:solidFill>
-          <a:schemeClr val="bg1"/>
-        </a:solidFill>
-        <a:effectLst/>
-      </p:bgPr>
-    </p:bg>
-    <p:spTree>
-      <p:nvGrpSpPr>
-        <p:cNvPr id="1" name=""/>
-        <p:cNvGrpSpPr/>
-        <p:nvPr/>
-      </p:nvGrpSpPr>
-      <p:grpSpPr>
-        <a:xfrm>
-          <a:off x="0" y="0"/>
-          <a:ext cx="0" cy="0"/>
-          <a:chOff x="0" y="0"/>
-          <a:chExt cx="0" cy="0"/>
-        </a:xfrm>
-      </p:grpSpPr>
-      <p:sp useBgFill="1">
-        <p:nvSpPr>
-          <p:cNvPr id="1051" name="Rectangle 72">
-            <a:extLst>
-              <a:ext uri="{FF2B5EF4-FFF2-40B4-BE49-F238E27FC236}">
-                <a16:creationId xmlns:a16="http://schemas.microsoft.com/office/drawing/2014/main" id="{85861AFF-3522-4704-9245-9C78B6945854}"/>
-              </a:ext>
-              <a:ext uri="{C183D7F6-B498-43B3-948B-1728B52AA6E4}">
-                <adec:decorative xmlns:adec="http://schemas.microsoft.com/office/drawing/2017/decorative" val="1"/>
-              </a:ext>
-            </a:extLst>
-          </p:cNvPr>
-          <p:cNvSpPr>
-            <a:spLocks noGrp="1" noRot="1" noChangeAspect="1" noMove="1" noResize="1" noEditPoints="1" noAdjustHandles="1" noChangeArrowheads="1" noChangeShapeType="1" noTextEdit="1"/>
-          </p:cNvSpPr>
-          <p:nvPr>
-            <p:extLst>
-              <p:ext uri="{386F3935-93C4-4BCD-93E2-E3B085C9AB24}">
-                <p16:designElem xmlns:p16="http://schemas.microsoft.com/office/powerpoint/2015/main" val="1"/>
-              </p:ext>
-            </p:extLst>
-          </p:nvPr>
-        </p:nvSpPr>
-        <p:spPr>
-          <a:xfrm>
-            <a:off x="0" y="0"/>
-            <a:ext cx="12191999" cy="6857365"/>
-          </a:xfrm>
-          <a:prstGeom prst="rect">
-            <a:avLst/>
-          </a:prstGeom>
-          <a:ln>
-            <a:noFill/>
-          </a:ln>
-        </p:spPr>
-        <p:style>
-          <a:lnRef idx="2">
-            <a:schemeClr val="accent1">
-              <a:shade val="50000"/>
-            </a:schemeClr>
-          </a:lnRef>
-          <a:fillRef idx="1">
-            <a:schemeClr val="accent1"/>
-          </a:fillRef>
-          <a:effectRef idx="0">
-            <a:schemeClr val="accent1"/>
-          </a:effectRef>
-          <a:fontRef idx="minor">
-            <a:schemeClr val="lt1"/>
-          </a:fontRef>
-        </p:style>
-        <p:txBody>
-          <a:bodyPr rtlCol="0" anchor="ctr"/>
-          <a:lstStyle/>
-          <a:p>
-            <a:pPr algn="ctr"/>
-            <a:endParaRPr lang="en-US"/>
-          </a:p>
-        </p:txBody>
-      </p:sp>
-      <p:grpSp>
-        <p:nvGrpSpPr>
-          <p:cNvPr id="1052" name="Group 74">
-            <a:extLst>
-              <a:ext uri="{FF2B5EF4-FFF2-40B4-BE49-F238E27FC236}">
-                <a16:creationId xmlns:a16="http://schemas.microsoft.com/office/drawing/2014/main" id="{AE1C45F0-260A-458C-96ED-C1F6D2151219}"/>
-              </a:ext>
-              <a:ext uri="{C183D7F6-B498-43B3-948B-1728B52AA6E4}">
-                <adec:decorative xmlns:adec="http://schemas.microsoft.com/office/drawing/2017/decorative" val="1"/>
-              </a:ext>
-            </a:extLst>
-          </p:cNvPr>
-          <p:cNvGrpSpPr>
-            <a:grpSpLocks noGrp="1" noUngrp="1" noRot="1" noChangeAspect="1" noMove="1" noResize="1"/>
-          </p:cNvGrpSpPr>
-          <p:nvPr>
-            <p:extLst>
-              <p:ext uri="{386F3935-93C4-4BCD-93E2-E3B085C9AB24}">
-                <p16:designElem xmlns:p16="http://schemas.microsoft.com/office/powerpoint/2015/main" val="1"/>
-              </p:ext>
-            </p:extLst>
-          </p:nvPr>
-        </p:nvGrpSpPr>
-        <p:grpSpPr>
-          <a:xfrm>
-            <a:off x="4" y="1062849"/>
-            <a:ext cx="731521" cy="673460"/>
-            <a:chOff x="3940602" y="308034"/>
-            <a:chExt cx="2116791" cy="3428999"/>
-          </a:xfrm>
-          <a:solidFill>
-            <a:schemeClr val="accent4"/>
-          </a:solidFill>
-        </p:grpSpPr>
-        <p:sp>
-          <p:nvSpPr>
-            <p:cNvPr id="76" name="Rectangle 75">
-              <a:extLst>
-                <a:ext uri="{FF2B5EF4-FFF2-40B4-BE49-F238E27FC236}">
-                  <a16:creationId xmlns:a16="http://schemas.microsoft.com/office/drawing/2014/main" id="{A6604B49-AD5C-4590-B051-06C8222ECD99}"/>
-                </a:ext>
-                <a:ext uri="{C183D7F6-B498-43B3-948B-1728B52AA6E4}">
-                  <adec:decorative xmlns:adec="http://schemas.microsoft.com/office/drawing/2017/decorative" val="1"/>
-                </a:ext>
-              </a:extLst>
-            </p:cNvPr>
-            <p:cNvSpPr/>
-            <p:nvPr>
-              <p:extLst>
-                <p:ext uri="{386F3935-93C4-4BCD-93E2-E3B085C9AB24}">
-                  <p16:designElem xmlns:p16="http://schemas.microsoft.com/office/powerpoint/2015/main" val="1"/>
-                </p:ext>
-              </p:extLst>
-            </p:nvPr>
-          </p:nvSpPr>
-          <p:spPr>
-            <a:xfrm>
-              <a:off x="3940602" y="308034"/>
-              <a:ext cx="566743" cy="3428999"/>
-            </a:xfrm>
-            <a:prstGeom prst="rect">
-              <a:avLst/>
-            </a:prstGeom>
-            <a:grpFill/>
-            <a:ln>
-              <a:noFill/>
-            </a:ln>
-          </p:spPr>
-          <p:style>
-            <a:lnRef idx="2">
-              <a:schemeClr val="accent1">
-                <a:shade val="50000"/>
-              </a:schemeClr>
-            </a:lnRef>
-            <a:fillRef idx="1">
-              <a:schemeClr val="accent1"/>
-            </a:fillRef>
-            <a:effectRef idx="0">
-              <a:schemeClr val="accent1"/>
-            </a:effectRef>
-            <a:fontRef idx="minor">
-              <a:schemeClr val="lt1"/>
-            </a:fontRef>
-          </p:style>
-          <p:txBody>
-            <a:bodyPr rtlCol="0" anchor="ctr"/>
-            <a:lstStyle/>
-            <a:p>
-              <a:pPr algn="ctr"/>
-              <a:endParaRPr lang="en-US"/>
-            </a:p>
-          </p:txBody>
-        </p:sp>
-        <p:sp>
-          <p:nvSpPr>
-            <p:cNvPr id="77" name="Rectangle 76">
-              <a:extLst>
-                <a:ext uri="{FF2B5EF4-FFF2-40B4-BE49-F238E27FC236}">
-                  <a16:creationId xmlns:a16="http://schemas.microsoft.com/office/drawing/2014/main" id="{743ECCAF-29C5-4537-947C-7EA1292463DB}"/>
-                </a:ext>
-                <a:ext uri="{C183D7F6-B498-43B3-948B-1728B52AA6E4}">
-                  <adec:decorative xmlns:adec="http://schemas.microsoft.com/office/drawing/2017/decorative" val="1"/>
-                </a:ext>
-              </a:extLst>
-            </p:cNvPr>
-            <p:cNvSpPr/>
-            <p:nvPr>
-              <p:extLst>
-                <p:ext uri="{386F3935-93C4-4BCD-93E2-E3B085C9AB24}">
-                  <p16:designElem xmlns:p16="http://schemas.microsoft.com/office/powerpoint/2015/main" val="1"/>
-                </p:ext>
-              </p:extLst>
-            </p:nvPr>
-          </p:nvSpPr>
-          <p:spPr>
-            <a:xfrm>
-              <a:off x="4715626" y="308034"/>
-              <a:ext cx="566743" cy="3428999"/>
-            </a:xfrm>
-            <a:prstGeom prst="rect">
-              <a:avLst/>
-            </a:prstGeom>
-            <a:grpFill/>
-            <a:ln>
-              <a:noFill/>
-            </a:ln>
-          </p:spPr>
-          <p:style>
-            <a:lnRef idx="2">
-              <a:schemeClr val="accent1">
-                <a:shade val="50000"/>
-              </a:schemeClr>
-            </a:lnRef>
-            <a:fillRef idx="1">
-              <a:schemeClr val="accent1"/>
-            </a:fillRef>
-            <a:effectRef idx="0">
-              <a:schemeClr val="accent1"/>
-            </a:effectRef>
-            <a:fontRef idx="minor">
-              <a:schemeClr val="lt1"/>
-            </a:fontRef>
-          </p:style>
-          <p:txBody>
-            <a:bodyPr rtlCol="0" anchor="ctr"/>
-            <a:lstStyle/>
-            <a:p>
-              <a:pPr algn="ctr"/>
-              <a:endParaRPr lang="en-US"/>
-            </a:p>
-          </p:txBody>
-        </p:sp>
-        <p:sp>
-          <p:nvSpPr>
-            <p:cNvPr id="78" name="Rectangle 77">
-              <a:extLst>
-                <a:ext uri="{FF2B5EF4-FFF2-40B4-BE49-F238E27FC236}">
-                  <a16:creationId xmlns:a16="http://schemas.microsoft.com/office/drawing/2014/main" id="{ED49787B-8DE6-4467-AD0A-8DECC6E0C2D6}"/>
-                </a:ext>
-                <a:ext uri="{C183D7F6-B498-43B3-948B-1728B52AA6E4}">
-                  <adec:decorative xmlns:adec="http://schemas.microsoft.com/office/drawing/2017/decorative" val="1"/>
-                </a:ext>
-              </a:extLst>
-            </p:cNvPr>
-            <p:cNvSpPr/>
-            <p:nvPr>
-              <p:extLst>
-                <p:ext uri="{386F3935-93C4-4BCD-93E2-E3B085C9AB24}">
-                  <p16:designElem xmlns:p16="http://schemas.microsoft.com/office/powerpoint/2015/main" val="1"/>
-                </p:ext>
-              </p:extLst>
-            </p:nvPr>
-          </p:nvSpPr>
-          <p:spPr>
-            <a:xfrm>
-              <a:off x="5490650" y="308034"/>
-              <a:ext cx="566743" cy="3428999"/>
-            </a:xfrm>
-            <a:prstGeom prst="rect">
-              <a:avLst/>
-            </a:prstGeom>
-            <a:grpFill/>
-            <a:ln>
-              <a:noFill/>
-            </a:ln>
-          </p:spPr>
-          <p:style>
-            <a:lnRef idx="2">
-              <a:schemeClr val="accent1">
-                <a:shade val="50000"/>
-              </a:schemeClr>
-            </a:lnRef>
-            <a:fillRef idx="1">
-              <a:schemeClr val="accent1"/>
-            </a:fillRef>
-            <a:effectRef idx="0">
-              <a:schemeClr val="accent1"/>
-            </a:effectRef>
-            <a:fontRef idx="minor">
-              <a:schemeClr val="lt1"/>
-            </a:fontRef>
-          </p:style>
-          <p:txBody>
-            <a:bodyPr rtlCol="0" anchor="ctr"/>
-            <a:lstStyle/>
-            <a:p>
-              <a:pPr algn="ctr"/>
-              <a:endParaRPr lang="en-US"/>
-            </a:p>
-          </p:txBody>
-        </p:sp>
-      </p:grpSp>
-      <p:sp>
-        <p:nvSpPr>
-          <p:cNvPr id="1053" name="Rectangle 79">
-            <a:extLst>
-              <a:ext uri="{FF2B5EF4-FFF2-40B4-BE49-F238E27FC236}">
-                <a16:creationId xmlns:a16="http://schemas.microsoft.com/office/drawing/2014/main" id="{D5B0017B-2ECA-49AF-B397-DC140825DF8D}"/>
-              </a:ext>
-              <a:ext uri="{C183D7F6-B498-43B3-948B-1728B52AA6E4}">
-                <adec:decorative xmlns:adec="http://schemas.microsoft.com/office/drawing/2017/decorative" val="1"/>
-              </a:ext>
-            </a:extLst>
-          </p:cNvPr>
-          <p:cNvSpPr>
-            <a:spLocks noGrp="1" noRot="1" noChangeAspect="1" noMove="1" noResize="1" noEditPoints="1" noAdjustHandles="1" noChangeArrowheads="1" noChangeShapeType="1" noTextEdit="1"/>
-          </p:cNvSpPr>
-          <p:nvPr>
-            <p:extLst>
-              <p:ext uri="{386F3935-93C4-4BCD-93E2-E3B085C9AB24}">
-                <p16:designElem xmlns:p16="http://schemas.microsoft.com/office/powerpoint/2015/main" val="1"/>
-              </p:ext>
-            </p:extLst>
-          </p:nvPr>
-        </p:nvSpPr>
-        <p:spPr>
-          <a:xfrm>
-            <a:off x="640080" y="656150"/>
-            <a:ext cx="4651477" cy="1431591"/>
-          </a:xfrm>
-          <a:prstGeom prst="rect">
-            <a:avLst/>
-          </a:prstGeom>
-          <a:solidFill>
-            <a:schemeClr val="bg1"/>
-          </a:solidFill>
-          <a:ln>
-            <a:noFill/>
-          </a:ln>
-          <a:effectLst>
-            <a:outerShdw blurRad="139700" dist="127000" dir="5400000" algn="t" rotWithShape="0">
-              <a:prstClr val="black">
-                <a:alpha val="15000"/>
-              </a:prstClr>
-            </a:outerShdw>
-          </a:effectLst>
-        </p:spPr>
-        <p:style>
-          <a:lnRef idx="2">
-            <a:schemeClr val="accent1">
-              <a:shade val="50000"/>
-            </a:schemeClr>
-          </a:lnRef>
-          <a:fillRef idx="1">
-            <a:schemeClr val="accent1"/>
-          </a:fillRef>
-          <a:effectRef idx="0">
-            <a:schemeClr val="accent1"/>
-          </a:effectRef>
-          <a:fontRef idx="minor">
-            <a:schemeClr val="lt1"/>
-          </a:fontRef>
-        </p:style>
-        <p:txBody>
-          <a:bodyPr rtlCol="0" anchor="ctr"/>
-          <a:lstStyle/>
-          <a:p>
-            <a:pPr algn="ctr"/>
-            <a:endParaRPr lang="en-US"/>
-          </a:p>
-        </p:txBody>
-      </p:sp>
-      <p:sp>
-        <p:nvSpPr>
-          <p:cNvPr id="2" name="Title 1">
-            <a:extLst>
-              <a:ext uri="{FF2B5EF4-FFF2-40B4-BE49-F238E27FC236}">
-                <a16:creationId xmlns:a16="http://schemas.microsoft.com/office/drawing/2014/main" id="{87202D7F-D800-4033-8EF5-3E4BDA8A3883}"/>
-              </a:ext>
-            </a:extLst>
-          </p:cNvPr>
-          <p:cNvSpPr>
-            <a:spLocks noGrp="1"/>
-          </p:cNvSpPr>
-          <p:nvPr>
-            <p:ph type="title"/>
-          </p:nvPr>
-        </p:nvSpPr>
-        <p:spPr>
-          <a:xfrm>
-            <a:off x="1043632" y="873940"/>
-            <a:ext cx="3951525" cy="1035781"/>
-          </a:xfrm>
-        </p:spPr>
-        <p:txBody>
-          <a:bodyPr anchor="ctr">
-            <a:normAutofit/>
-          </a:bodyPr>
-          <a:lstStyle/>
-          <a:p>
-            <a:r>
-              <a:rPr lang="en-US" sz="3200"/>
-              <a:t>Technologies</a:t>
-            </a:r>
-          </a:p>
-        </p:txBody>
-      </p:sp>
-      <p:sp>
-        <p:nvSpPr>
-          <p:cNvPr id="3" name="Content Placeholder 2">
-            <a:extLst>
-              <a:ext uri="{FF2B5EF4-FFF2-40B4-BE49-F238E27FC236}">
-                <a16:creationId xmlns:a16="http://schemas.microsoft.com/office/drawing/2014/main" id="{913C0F7A-26DB-42C9-88B3-4CE7153D5AC8}"/>
-              </a:ext>
-            </a:extLst>
-          </p:cNvPr>
-          <p:cNvSpPr>
-            <a:spLocks noGrp="1"/>
-          </p:cNvSpPr>
-          <p:nvPr>
-            <p:ph idx="1"/>
-          </p:nvPr>
-        </p:nvSpPr>
-        <p:spPr>
-          <a:xfrm>
-            <a:off x="1045030" y="2524721"/>
-            <a:ext cx="3943993" cy="3677123"/>
-          </a:xfrm>
-        </p:spPr>
-        <p:txBody>
-          <a:bodyPr anchor="ctr">
-            <a:normAutofit/>
-          </a:bodyPr>
-          <a:lstStyle/>
-          <a:p>
-            <a:r>
-              <a:rPr lang="en-US" sz="1500"/>
-              <a:t>Code is written in Python</a:t>
-            </a:r>
-          </a:p>
-          <a:p>
-            <a:pPr lvl="1"/>
-            <a:r>
-              <a:rPr lang="en-US" sz="1500"/>
-              <a:t>Tensorflow used for model implementations</a:t>
-            </a:r>
-          </a:p>
-          <a:p>
-            <a:pPr lvl="1"/>
-            <a:r>
-              <a:rPr lang="en-US" sz="1500"/>
-              <a:t>Numpy and Pandas for data preprocessing</a:t>
-            </a:r>
-          </a:p>
-          <a:p>
-            <a:pPr lvl="1"/>
-            <a:r>
-              <a:rPr lang="en-US" sz="1500"/>
-              <a:t>Scikit Learn for metrics</a:t>
-            </a:r>
-          </a:p>
-          <a:p>
-            <a:r>
-              <a:rPr lang="en-US" sz="1500"/>
-              <a:t>Machine Learning models</a:t>
-            </a:r>
-          </a:p>
-          <a:p>
-            <a:pPr lvl="1"/>
-            <a:r>
-              <a:rPr lang="en-US" sz="1500"/>
-              <a:t>Both models are implementations of deep learning networks</a:t>
-            </a:r>
-          </a:p>
-          <a:p>
-            <a:pPr lvl="1"/>
-            <a:r>
-              <a:rPr lang="en-US" sz="1500"/>
-              <a:t>Long Short-Term Memory Networks (LSTM) and convolutional layers form the core of the networks</a:t>
-            </a:r>
-          </a:p>
-          <a:p>
-            <a:r>
-              <a:rPr lang="en-US" sz="1500"/>
-              <a:t>IMU Sensors provide training and testing data</a:t>
-            </a:r>
-          </a:p>
-        </p:txBody>
-      </p:sp>
-      <p:sp>
-        <p:nvSpPr>
-          <p:cNvPr id="1054" name="Rectangle 81">
-            <a:extLst>
-              <a:ext uri="{FF2B5EF4-FFF2-40B4-BE49-F238E27FC236}">
-                <a16:creationId xmlns:a16="http://schemas.microsoft.com/office/drawing/2014/main" id="{DF909CAE-F41A-4061-A316-864DC2A710A2}"/>
-              </a:ext>
-              <a:ext uri="{C183D7F6-B498-43B3-948B-1728B52AA6E4}">
-                <adec:decorative xmlns:adec="http://schemas.microsoft.com/office/drawing/2017/decorative" val="1"/>
-              </a:ext>
-            </a:extLst>
-          </p:cNvPr>
-          <p:cNvSpPr>
-            <a:spLocks noGrp="1" noRot="1" noChangeAspect="1" noMove="1" noResize="1" noEditPoints="1" noAdjustHandles="1" noChangeArrowheads="1" noChangeShapeType="1" noTextEdit="1"/>
-          </p:cNvSpPr>
-          <p:nvPr>
-            <p:extLst>
-              <p:ext uri="{386F3935-93C4-4BCD-93E2-E3B085C9AB24}">
-                <p16:designElem xmlns:p16="http://schemas.microsoft.com/office/powerpoint/2015/main" val="1"/>
-              </p:ext>
-            </p:extLst>
-          </p:nvPr>
-        </p:nvSpPr>
-        <p:spPr>
-          <a:xfrm>
-            <a:off x="5827222" y="650055"/>
-            <a:ext cx="5526578" cy="5634880"/>
-          </a:xfrm>
-          <a:prstGeom prst="rect">
-            <a:avLst/>
-          </a:prstGeom>
-          <a:solidFill>
-            <a:schemeClr val="bg1"/>
-          </a:solidFill>
-          <a:ln>
-            <a:noFill/>
-          </a:ln>
-          <a:effectLst>
-            <a:outerShdw blurRad="139700" dist="127000" dir="5400000" algn="t" rotWithShape="0">
-              <a:prstClr val="black">
-                <a:alpha val="15000"/>
-              </a:prstClr>
-            </a:outerShdw>
-          </a:effectLst>
-        </p:spPr>
-        <p:style>
-          <a:lnRef idx="2">
-            <a:schemeClr val="accent1">
-              <a:shade val="50000"/>
-            </a:schemeClr>
-          </a:lnRef>
-          <a:fillRef idx="1">
-            <a:schemeClr val="accent1"/>
-          </a:fillRef>
-          <a:effectRef idx="0">
-            <a:schemeClr val="accent1"/>
-          </a:effectRef>
-          <a:fontRef idx="minor">
-            <a:schemeClr val="lt1"/>
-          </a:fontRef>
-        </p:style>
-        <p:txBody>
-          <a:bodyPr rtlCol="0" anchor="ctr"/>
-          <a:lstStyle/>
-          <a:p>
-            <a:pPr algn="ctr"/>
-            <a:endParaRPr lang="en-US"/>
-          </a:p>
-        </p:txBody>
-      </p:sp>
-      <p:pic>
-        <p:nvPicPr>
-          <p:cNvPr id="1026" name="Picture 2" descr="Image result for numpy">
-            <a:extLst>
-              <a:ext uri="{FF2B5EF4-FFF2-40B4-BE49-F238E27FC236}">
-                <a16:creationId xmlns:a16="http://schemas.microsoft.com/office/drawing/2014/main" id="{701D79D4-63F5-4689-A54F-9562DC9642B5}"/>
-              </a:ext>
-            </a:extLst>
-          </p:cNvPr>
-          <p:cNvPicPr>
-            <a:picLocks noChangeAspect="1" noChangeArrowheads="1"/>
-          </p:cNvPicPr>
-          <p:nvPr/>
-        </p:nvPicPr>
-        <p:blipFill>
-          <a:blip r:embed="rId2">
-            <a:extLst>
-              <a:ext uri="{28A0092B-C50C-407E-A947-70E740481C1C}">
-                <a14:useLocalDpi xmlns:a14="http://schemas.microsoft.com/office/drawing/2010/main" val="0"/>
-              </a:ext>
-            </a:extLst>
-          </a:blip>
-          <a:stretch>
-            <a:fillRect/>
-          </a:stretch>
-        </p:blipFill>
-        <p:spPr bwMode="auto">
-          <a:xfrm>
-            <a:off x="6096000" y="985932"/>
-            <a:ext cx="1599140" cy="1599140"/>
-          </a:xfrm>
-          <a:prstGeom prst="rect">
-            <a:avLst/>
-          </a:prstGeom>
-          <a:noFill/>
-          <a:extLst>
-            <a:ext uri="{909E8E84-426E-40DD-AFC4-6F175D3DCCD1}">
-              <a14:hiddenFill xmlns:a14="http://schemas.microsoft.com/office/drawing/2010/main">
-                <a:solidFill>
-                  <a:srgbClr val="FFFFFF"/>
-                </a:solidFill>
-              </a14:hiddenFill>
-            </a:ext>
-          </a:extLst>
-        </p:spPr>
-      </p:pic>
-      <p:pic>
-        <p:nvPicPr>
-          <p:cNvPr id="1028" name="Picture 4" descr="Image result for pandas python logo">
-            <a:extLst>
-              <a:ext uri="{FF2B5EF4-FFF2-40B4-BE49-F238E27FC236}">
-                <a16:creationId xmlns:a16="http://schemas.microsoft.com/office/drawing/2014/main" id="{85236C5D-93FC-4EC5-B9C0-34EDD90D5280}"/>
-              </a:ext>
-            </a:extLst>
-          </p:cNvPr>
-          <p:cNvPicPr>
-            <a:picLocks noChangeAspect="1" noChangeArrowheads="1"/>
-          </p:cNvPicPr>
-          <p:nvPr/>
-        </p:nvPicPr>
-        <p:blipFill>
-          <a:blip r:embed="rId3">
-            <a:extLst>
-              <a:ext uri="{28A0092B-C50C-407E-A947-70E740481C1C}">
-                <a14:useLocalDpi xmlns:a14="http://schemas.microsoft.com/office/drawing/2010/main" val="0"/>
-              </a:ext>
-            </a:extLst>
-          </a:blip>
-          <a:stretch>
-            <a:fillRect/>
-          </a:stretch>
-        </p:blipFill>
-        <p:spPr bwMode="auto">
-          <a:xfrm>
-            <a:off x="7973126" y="985937"/>
-            <a:ext cx="1290062" cy="1722300"/>
-          </a:xfrm>
-          <a:prstGeom prst="rect">
-            <a:avLst/>
-          </a:prstGeom>
-          <a:noFill/>
-          <a:extLst>
-            <a:ext uri="{909E8E84-426E-40DD-AFC4-6F175D3DCCD1}">
-              <a14:hiddenFill xmlns:a14="http://schemas.microsoft.com/office/drawing/2010/main">
-                <a:solidFill>
-                  <a:srgbClr val="FFFFFF"/>
-                </a:solidFill>
-              </a14:hiddenFill>
-            </a:ext>
-          </a:extLst>
-        </p:spPr>
-      </p:pic>
-      <p:pic>
-        <p:nvPicPr>
-          <p:cNvPr id="9" name="Picture 8">
-            <a:extLst>
-              <a:ext uri="{FF2B5EF4-FFF2-40B4-BE49-F238E27FC236}">
-                <a16:creationId xmlns:a16="http://schemas.microsoft.com/office/drawing/2014/main" id="{13E274DE-3A86-455D-95EA-883E1FF16FD2}"/>
-              </a:ext>
-            </a:extLst>
-          </p:cNvPr>
-          <p:cNvPicPr>
-            <a:picLocks noChangeAspect="1"/>
-          </p:cNvPicPr>
-          <p:nvPr/>
-        </p:nvPicPr>
-        <p:blipFill>
-          <a:blip r:embed="rId4">
-            <a:extLst>
-              <a:ext uri="{28A0092B-C50C-407E-A947-70E740481C1C}">
-                <a14:useLocalDpi xmlns:a14="http://schemas.microsoft.com/office/drawing/2010/main" val="0"/>
-              </a:ext>
-            </a:extLst>
-          </a:blip>
-          <a:stretch>
-            <a:fillRect/>
-          </a:stretch>
-        </p:blipFill>
-        <p:spPr>
-          <a:xfrm>
-            <a:off x="9547828" y="985931"/>
-            <a:ext cx="1599141" cy="1599141"/>
-          </a:xfrm>
-          <a:prstGeom prst="rect">
-            <a:avLst/>
-          </a:prstGeom>
-        </p:spPr>
-      </p:pic>
-      <p:pic>
-        <p:nvPicPr>
-          <p:cNvPr id="7" name="Picture 6">
-            <a:extLst>
-              <a:ext uri="{FF2B5EF4-FFF2-40B4-BE49-F238E27FC236}">
-                <a16:creationId xmlns:a16="http://schemas.microsoft.com/office/drawing/2014/main" id="{DA8C6CCF-D7C5-455B-875D-015B7E2A0595}"/>
-              </a:ext>
-            </a:extLst>
-          </p:cNvPr>
-          <p:cNvPicPr>
-            <a:picLocks noChangeAspect="1"/>
-          </p:cNvPicPr>
-          <p:nvPr/>
-        </p:nvPicPr>
-        <p:blipFill>
-          <a:blip r:embed="rId5">
-            <a:extLst>
-              <a:ext uri="{28A0092B-C50C-407E-A947-70E740481C1C}">
-                <a14:useLocalDpi xmlns:a14="http://schemas.microsoft.com/office/drawing/2010/main" val="0"/>
-              </a:ext>
-            </a:extLst>
-          </a:blip>
-          <a:stretch>
-            <a:fillRect/>
-          </a:stretch>
-        </p:blipFill>
-        <p:spPr>
-          <a:xfrm>
-            <a:off x="7008178" y="2816738"/>
-            <a:ext cx="3226615" cy="3226615"/>
-          </a:xfrm>
-          <a:prstGeom prst="rect">
-            <a:avLst/>
-          </a:prstGeom>
-        </p:spPr>
-      </p:pic>
-      <p:cxnSp>
-        <p:nvCxnSpPr>
-          <p:cNvPr id="1055" name="Straight Connector 83">
-            <a:extLst>
-              <a:ext uri="{FF2B5EF4-FFF2-40B4-BE49-F238E27FC236}">
-                <a16:creationId xmlns:a16="http://schemas.microsoft.com/office/drawing/2014/main" id="{6CF1BAF6-AD41-4082-B212-8A1F9A2E8779}"/>
-              </a:ext>
-              <a:ext uri="{C183D7F6-B498-43B3-948B-1728B52AA6E4}">
-                <adec:decorative xmlns:adec="http://schemas.microsoft.com/office/drawing/2017/decorative" val="1"/>
-              </a:ext>
-            </a:extLst>
-          </p:cNvPr>
-          <p:cNvCxnSpPr>
-            <a:cxnSpLocks noGrp="1" noRot="1" noChangeAspect="1" noMove="1" noResize="1" noEditPoints="1" noAdjustHandles="1" noChangeArrowheads="1" noChangeShapeType="1"/>
-          </p:cNvCxnSpPr>
-          <p:nvPr>
-            <p:extLst>
-              <p:ext uri="{386F3935-93C4-4BCD-93E2-E3B085C9AB24}">
-                <p16:designElem xmlns:p16="http://schemas.microsoft.com/office/powerpoint/2015/main" val="1"/>
-              </p:ext>
-            </p:extLst>
-          </p:nvPr>
-        </p:nvCxnSpPr>
-        <p:spPr>
-          <a:xfrm flipH="1">
-            <a:off x="838200" y="6492240"/>
-            <a:ext cx="10515600" cy="0"/>
-          </a:xfrm>
-          <a:prstGeom prst="line">
-            <a:avLst/>
-          </a:prstGeom>
-          <a:ln w="57150">
-            <a:solidFill>
-              <a:schemeClr val="accent4"/>
-            </a:solidFill>
-          </a:ln>
-        </p:spPr>
-        <p:style>
-          <a:lnRef idx="1">
-            <a:schemeClr val="accent1"/>
-          </a:lnRef>
-          <a:fillRef idx="0">
-            <a:schemeClr val="accent1"/>
-          </a:fillRef>
-          <a:effectRef idx="0">
-            <a:schemeClr val="accent1"/>
-          </a:effectRef>
-          <a:fontRef idx="minor">
-            <a:schemeClr val="tx1"/>
-          </a:fontRef>
-        </p:style>
-      </p:cxnSp>
-    </p:spTree>
-    <p:extLst>
-      <p:ext uri="{BB962C8B-B14F-4D97-AF65-F5344CB8AC3E}">
-        <p14:creationId xmlns:p14="http://schemas.microsoft.com/office/powerpoint/2010/main" val="4093930349"/>
-      </p:ext>
-    </p:extLst>
-  </p:cSld>
-  <p:clrMapOvr>
-    <a:masterClrMapping/>
-  </p:clrMapOvr>
-</p:sld>
-</file>
-
-<file path=ppt/slides/slide9.xml><?xml version="1.0" encoding="utf-8"?>
-<p:sld xmlns:a="http://schemas.openxmlformats.org/drawingml/2006/main" xmlns:r="http://schemas.openxmlformats.org/officeDocument/2006/relationships" xmlns:p="http://schemas.openxmlformats.org/presentationml/2006/main">
-  <p:cSld>
-    <p:bg>
-      <p:bgPr>
-        <a:solidFill>
-          <a:schemeClr val="bg1"/>
-        </a:solidFill>
-        <a:effectLst/>
-      </p:bgPr>
-    </p:bg>
-    <p:spTree>
-      <p:nvGrpSpPr>
-        <p:cNvPr id="1" name=""/>
-        <p:cNvGrpSpPr/>
-        <p:nvPr/>
-      </p:nvGrpSpPr>
-      <p:grpSpPr>
-        <a:xfrm>
-          <a:off x="0" y="0"/>
-          <a:ext cx="0" cy="0"/>
-          <a:chOff x="0" y="0"/>
-          <a:chExt cx="0" cy="0"/>
-        </a:xfrm>
-      </p:grpSpPr>
-      <p:sp useBgFill="1">
-        <p:nvSpPr>
-          <p:cNvPr id="16" name="Rectangle 7">
-            <a:extLst>
-              <a:ext uri="{FF2B5EF4-FFF2-40B4-BE49-F238E27FC236}">
-                <a16:creationId xmlns:a16="http://schemas.microsoft.com/office/drawing/2014/main" id="{B6CDA21F-E7AF-4C75-8395-33F58D5B0E45}"/>
-              </a:ext>
-              <a:ext uri="{C183D7F6-B498-43B3-948B-1728B52AA6E4}">
-                <adec:decorative xmlns:adec="http://schemas.microsoft.com/office/drawing/2017/decorative" val="1"/>
-              </a:ext>
-            </a:extLst>
-          </p:cNvPr>
-          <p:cNvSpPr>
-            <a:spLocks noGrp="1" noRot="1" noChangeAspect="1" noMove="1" noResize="1" noEditPoints="1" noAdjustHandles="1" noChangeArrowheads="1" noChangeShapeType="1" noTextEdit="1"/>
-          </p:cNvSpPr>
-          <p:nvPr>
-            <p:extLst>
-              <p:ext uri="{386F3935-93C4-4BCD-93E2-E3B085C9AB24}">
-                <p16:designElem xmlns:p16="http://schemas.microsoft.com/office/powerpoint/2015/main" val="1"/>
-              </p:ext>
-            </p:extLst>
-          </p:nvPr>
-        </p:nvSpPr>
-        <p:spPr>
-          <a:xfrm>
-            <a:off x="0" y="0"/>
-            <a:ext cx="12191999" cy="6857365"/>
-          </a:xfrm>
-          <a:prstGeom prst="rect">
-            <a:avLst/>
-          </a:prstGeom>
-          <a:ln>
-            <a:noFill/>
-          </a:ln>
-        </p:spPr>
-        <p:style>
-          <a:lnRef idx="2">
-            <a:schemeClr val="accent1">
-              <a:shade val="50000"/>
-            </a:schemeClr>
-          </a:lnRef>
-          <a:fillRef idx="1">
-            <a:schemeClr val="accent1"/>
-          </a:fillRef>
-          <a:effectRef idx="0">
-            <a:schemeClr val="accent1"/>
-          </a:effectRef>
-          <a:fontRef idx="minor">
-            <a:schemeClr val="lt1"/>
-          </a:fontRef>
-        </p:style>
-        <p:txBody>
-          <a:bodyPr rtlCol="0" anchor="ctr"/>
-          <a:lstStyle/>
-          <a:p>
-            <a:pPr algn="ctr"/>
-            <a:endParaRPr lang="en-US"/>
-          </a:p>
-        </p:txBody>
-      </p:sp>
-      <p:grpSp>
-        <p:nvGrpSpPr>
-          <p:cNvPr id="18" name="Group 9">
-            <a:extLst>
-              <a:ext uri="{FF2B5EF4-FFF2-40B4-BE49-F238E27FC236}">
-                <a16:creationId xmlns:a16="http://schemas.microsoft.com/office/drawing/2014/main" id="{AE1C45F0-260A-458C-96ED-C1F6D2151219}"/>
-              </a:ext>
-              <a:ext uri="{C183D7F6-B498-43B3-948B-1728B52AA6E4}">
-                <adec:decorative xmlns:adec="http://schemas.microsoft.com/office/drawing/2017/decorative" val="1"/>
-              </a:ext>
-            </a:extLst>
-          </p:cNvPr>
-          <p:cNvGrpSpPr>
-            <a:grpSpLocks noGrp="1" noUngrp="1" noRot="1" noChangeAspect="1" noMove="1" noResize="1"/>
-          </p:cNvGrpSpPr>
-          <p:nvPr>
-            <p:extLst>
-              <p:ext uri="{386F3935-93C4-4BCD-93E2-E3B085C9AB24}">
-                <p16:designElem xmlns:p16="http://schemas.microsoft.com/office/powerpoint/2015/main" val="1"/>
-              </p:ext>
-            </p:extLst>
-          </p:nvPr>
-        </p:nvGrpSpPr>
-        <p:grpSpPr>
-          <a:xfrm>
-            <a:off x="4" y="1216597"/>
-            <a:ext cx="731521" cy="673460"/>
-            <a:chOff x="3940602" y="308034"/>
-            <a:chExt cx="2116791" cy="3428999"/>
-          </a:xfrm>
-          <a:solidFill>
-            <a:schemeClr val="accent4"/>
-          </a:solidFill>
-        </p:grpSpPr>
-        <p:sp>
-          <p:nvSpPr>
-            <p:cNvPr id="19" name="Rectangle 10">
-              <a:extLst>
-                <a:ext uri="{FF2B5EF4-FFF2-40B4-BE49-F238E27FC236}">
-                  <a16:creationId xmlns:a16="http://schemas.microsoft.com/office/drawing/2014/main" id="{A6604B49-AD5C-4590-B051-06C8222ECD99}"/>
-                </a:ext>
-                <a:ext uri="{C183D7F6-B498-43B3-948B-1728B52AA6E4}">
-                  <adec:decorative xmlns:adec="http://schemas.microsoft.com/office/drawing/2017/decorative" val="1"/>
-                </a:ext>
-              </a:extLst>
-            </p:cNvPr>
-            <p:cNvSpPr/>
-            <p:nvPr>
-              <p:extLst>
-                <p:ext uri="{386F3935-93C4-4BCD-93E2-E3B085C9AB24}">
-                  <p16:designElem xmlns:p16="http://schemas.microsoft.com/office/powerpoint/2015/main" val="1"/>
-                </p:ext>
-              </p:extLst>
-            </p:nvPr>
-          </p:nvSpPr>
-          <p:spPr>
-            <a:xfrm>
-              <a:off x="3940602" y="308034"/>
-              <a:ext cx="566743" cy="3428999"/>
-            </a:xfrm>
-            <a:prstGeom prst="rect">
-              <a:avLst/>
-            </a:prstGeom>
-            <a:grpFill/>
-            <a:ln>
-              <a:noFill/>
-            </a:ln>
-          </p:spPr>
-          <p:style>
-            <a:lnRef idx="2">
-              <a:schemeClr val="accent1">
-                <a:shade val="50000"/>
-              </a:schemeClr>
-            </a:lnRef>
-            <a:fillRef idx="1">
-              <a:schemeClr val="accent1"/>
-            </a:fillRef>
-            <a:effectRef idx="0">
-              <a:schemeClr val="accent1"/>
-            </a:effectRef>
-            <a:fontRef idx="minor">
-              <a:schemeClr val="lt1"/>
-            </a:fontRef>
-          </p:style>
-          <p:txBody>
-            <a:bodyPr rtlCol="0" anchor="ctr"/>
-            <a:lstStyle/>
-            <a:p>
-              <a:pPr algn="ctr"/>
-              <a:endParaRPr lang="en-US"/>
-            </a:p>
-          </p:txBody>
-        </p:sp>
-        <p:sp>
-          <p:nvSpPr>
-            <p:cNvPr id="20" name="Rectangle 11">
-              <a:extLst>
-                <a:ext uri="{FF2B5EF4-FFF2-40B4-BE49-F238E27FC236}">
-                  <a16:creationId xmlns:a16="http://schemas.microsoft.com/office/drawing/2014/main" id="{743ECCAF-29C5-4537-947C-7EA1292463DB}"/>
-                </a:ext>
-                <a:ext uri="{C183D7F6-B498-43B3-948B-1728B52AA6E4}">
-                  <adec:decorative xmlns:adec="http://schemas.microsoft.com/office/drawing/2017/decorative" val="1"/>
-                </a:ext>
-              </a:extLst>
-            </p:cNvPr>
-            <p:cNvSpPr/>
-            <p:nvPr>
-              <p:extLst>
-                <p:ext uri="{386F3935-93C4-4BCD-93E2-E3B085C9AB24}">
-                  <p16:designElem xmlns:p16="http://schemas.microsoft.com/office/powerpoint/2015/main" val="1"/>
-                </p:ext>
-              </p:extLst>
-            </p:nvPr>
-          </p:nvSpPr>
-          <p:spPr>
-            <a:xfrm>
-              <a:off x="4715626" y="308034"/>
-              <a:ext cx="566743" cy="3428999"/>
-            </a:xfrm>
-            <a:prstGeom prst="rect">
-              <a:avLst/>
-            </a:prstGeom>
-            <a:grpFill/>
-            <a:ln>
-              <a:noFill/>
-            </a:ln>
-          </p:spPr>
-          <p:style>
-            <a:lnRef idx="2">
-              <a:schemeClr val="accent1">
-                <a:shade val="50000"/>
-              </a:schemeClr>
-            </a:lnRef>
-            <a:fillRef idx="1">
-              <a:schemeClr val="accent1"/>
-            </a:fillRef>
-            <a:effectRef idx="0">
-              <a:schemeClr val="accent1"/>
-            </a:effectRef>
-            <a:fontRef idx="minor">
-              <a:schemeClr val="lt1"/>
-            </a:fontRef>
-          </p:style>
-          <p:txBody>
-            <a:bodyPr rtlCol="0" anchor="ctr"/>
-            <a:lstStyle/>
-            <a:p>
-              <a:pPr algn="ctr"/>
-              <a:endParaRPr lang="en-US"/>
-            </a:p>
-          </p:txBody>
-        </p:sp>
-        <p:sp>
-          <p:nvSpPr>
-            <p:cNvPr id="13" name="Rectangle 12">
-              <a:extLst>
-                <a:ext uri="{FF2B5EF4-FFF2-40B4-BE49-F238E27FC236}">
-                  <a16:creationId xmlns:a16="http://schemas.microsoft.com/office/drawing/2014/main" id="{ED49787B-8DE6-4467-AD0A-8DECC6E0C2D6}"/>
-                </a:ext>
-                <a:ext uri="{C183D7F6-B498-43B3-948B-1728B52AA6E4}">
-                  <adec:decorative xmlns:adec="http://schemas.microsoft.com/office/drawing/2017/decorative" val="1"/>
-                </a:ext>
-              </a:extLst>
-            </p:cNvPr>
-            <p:cNvSpPr/>
-            <p:nvPr>
-              <p:extLst>
-                <p:ext uri="{386F3935-93C4-4BCD-93E2-E3B085C9AB24}">
-                  <p16:designElem xmlns:p16="http://schemas.microsoft.com/office/powerpoint/2015/main" val="1"/>
-                </p:ext>
-              </p:extLst>
-            </p:nvPr>
-          </p:nvSpPr>
-          <p:spPr>
-            <a:xfrm>
-              <a:off x="5490650" y="308034"/>
-              <a:ext cx="566743" cy="3428999"/>
-            </a:xfrm>
-            <a:prstGeom prst="rect">
-              <a:avLst/>
-            </a:prstGeom>
-            <a:grpFill/>
-            <a:ln>
-              <a:noFill/>
-            </a:ln>
-          </p:spPr>
-          <p:style>
-            <a:lnRef idx="2">
-              <a:schemeClr val="accent1">
-                <a:shade val="50000"/>
-              </a:schemeClr>
-            </a:lnRef>
-            <a:fillRef idx="1">
-              <a:schemeClr val="accent1"/>
-            </a:fillRef>
-            <a:effectRef idx="0">
-              <a:schemeClr val="accent1"/>
-            </a:effectRef>
-            <a:fontRef idx="minor">
-              <a:schemeClr val="lt1"/>
-            </a:fontRef>
-          </p:style>
-          <p:txBody>
-            <a:bodyPr rtlCol="0" anchor="ctr"/>
-            <a:lstStyle/>
-            <a:p>
-              <a:pPr algn="ctr"/>
-              <a:endParaRPr lang="en-US"/>
-            </a:p>
-          </p:txBody>
-        </p:sp>
-      </p:grpSp>
-      <p:sp>
-        <p:nvSpPr>
-          <p:cNvPr id="15" name="Rectangle 14">
-            <a:extLst>
-              <a:ext uri="{FF2B5EF4-FFF2-40B4-BE49-F238E27FC236}">
-                <a16:creationId xmlns:a16="http://schemas.microsoft.com/office/drawing/2014/main" id="{D5B0017B-2ECA-49AF-B397-DC140825DF8D}"/>
-              </a:ext>
-              <a:ext uri="{C183D7F6-B498-43B3-948B-1728B52AA6E4}">
-                <adec:decorative xmlns:adec="http://schemas.microsoft.com/office/drawing/2017/decorative" val="1"/>
-              </a:ext>
-            </a:extLst>
-          </p:cNvPr>
-          <p:cNvSpPr>
-            <a:spLocks noGrp="1" noRot="1" noChangeAspect="1" noMove="1" noResize="1" noEditPoints="1" noAdjustHandles="1" noChangeArrowheads="1" noChangeShapeType="1" noTextEdit="1"/>
-          </p:cNvSpPr>
-          <p:nvPr>
-            <p:extLst>
-              <p:ext uri="{386F3935-93C4-4BCD-93E2-E3B085C9AB24}">
-                <p16:designElem xmlns:p16="http://schemas.microsoft.com/office/powerpoint/2015/main" val="1"/>
-              </p:ext>
-            </p:extLst>
-          </p:nvPr>
-        </p:nvSpPr>
-        <p:spPr>
-          <a:xfrm>
-            <a:off x="640079" y="613954"/>
-            <a:ext cx="10907487" cy="1894116"/>
-          </a:xfrm>
-          <a:prstGeom prst="rect">
-            <a:avLst/>
-          </a:prstGeom>
-          <a:solidFill>
-            <a:schemeClr val="bg1"/>
-          </a:solidFill>
-          <a:ln>
-            <a:noFill/>
-          </a:ln>
-          <a:effectLst>
-            <a:outerShdw blurRad="139700" dist="127000" dir="5400000" algn="t" rotWithShape="0">
-              <a:prstClr val="black">
-                <a:alpha val="15000"/>
-              </a:prstClr>
-            </a:outerShdw>
-          </a:effectLst>
-        </p:spPr>
-        <p:style>
-          <a:lnRef idx="2">
-            <a:schemeClr val="accent1">
-              <a:shade val="50000"/>
-            </a:schemeClr>
-          </a:lnRef>
-          <a:fillRef idx="1">
-            <a:schemeClr val="accent1"/>
-          </a:fillRef>
-          <a:effectRef idx="0">
-            <a:schemeClr val="accent1"/>
-          </a:effectRef>
-          <a:fontRef idx="minor">
-            <a:schemeClr val="lt1"/>
-          </a:fontRef>
-        </p:style>
-        <p:txBody>
-          <a:bodyPr rtlCol="0" anchor="ctr"/>
-          <a:lstStyle/>
-          <a:p>
-            <a:pPr algn="ctr"/>
-            <a:endParaRPr lang="en-US"/>
-          </a:p>
-        </p:txBody>
-      </p:sp>
-      <p:sp>
-        <p:nvSpPr>
-          <p:cNvPr id="2" name="Title 1">
-            <a:extLst>
-              <a:ext uri="{FF2B5EF4-FFF2-40B4-BE49-F238E27FC236}">
-                <a16:creationId xmlns:a16="http://schemas.microsoft.com/office/drawing/2014/main" id="{88055E0C-5801-46C6-B7CE-67069F722492}"/>
-              </a:ext>
-            </a:extLst>
-          </p:cNvPr>
-          <p:cNvSpPr>
-            <a:spLocks noGrp="1"/>
-          </p:cNvSpPr>
-          <p:nvPr>
-            <p:ph type="title"/>
-          </p:nvPr>
-        </p:nvSpPr>
-        <p:spPr>
-          <a:xfrm>
-            <a:off x="1043631" y="809898"/>
-            <a:ext cx="9942716" cy="1554480"/>
-          </a:xfrm>
-        </p:spPr>
-        <p:txBody>
-          <a:bodyPr anchor="ctr">
-            <a:normAutofit/>
-          </a:bodyPr>
-          <a:lstStyle/>
-          <a:p>
-            <a:r>
-              <a:rPr lang="en-US" sz="4800"/>
-              <a:t>Milestones</a:t>
-            </a:r>
-          </a:p>
-        </p:txBody>
-      </p:sp>
-      <p:sp>
-        <p:nvSpPr>
-          <p:cNvPr id="3" name="Content Placeholder 2">
-            <a:extLst>
-              <a:ext uri="{FF2B5EF4-FFF2-40B4-BE49-F238E27FC236}">
-                <a16:creationId xmlns:a16="http://schemas.microsoft.com/office/drawing/2014/main" id="{F4E57FA3-77D7-4693-801D-B5C092DB223C}"/>
-              </a:ext>
-            </a:extLst>
-          </p:cNvPr>
-          <p:cNvSpPr>
-            <a:spLocks noGrp="1"/>
-          </p:cNvSpPr>
-          <p:nvPr>
-            <p:ph idx="1"/>
-          </p:nvPr>
-        </p:nvSpPr>
-        <p:spPr>
-          <a:xfrm>
-            <a:off x="1045028" y="3017522"/>
-            <a:ext cx="9941319" cy="3124658"/>
-          </a:xfrm>
-        </p:spPr>
-        <p:txBody>
-          <a:bodyPr anchor="ctr">
-            <a:normAutofit/>
-          </a:bodyPr>
-          <a:lstStyle/>
-          <a:p>
-            <a:r>
-              <a:rPr lang="en-US" sz="1700"/>
-              <a:t>Preprocessing – Oct 26</a:t>
-            </a:r>
-            <a:r>
-              <a:rPr lang="en-US" sz="1700" baseline="30000"/>
-              <a:t>th</a:t>
-            </a:r>
-            <a:r>
-              <a:rPr lang="en-US" sz="1700"/>
-              <a:t>, 2020</a:t>
-            </a:r>
-          </a:p>
-          <a:p>
-            <a:pPr lvl="1"/>
-            <a:r>
-              <a:rPr lang="en-US" sz="1700"/>
-              <a:t>Python code for preparing data for model consumption</a:t>
-            </a:r>
-          </a:p>
-          <a:p>
-            <a:r>
-              <a:rPr lang="en-US" sz="1700"/>
-              <a:t>Lift Detection – Dec 1</a:t>
-            </a:r>
-            <a:r>
-              <a:rPr lang="en-US" sz="1700" baseline="30000"/>
-              <a:t>st</a:t>
-            </a:r>
-            <a:r>
-              <a:rPr lang="en-US" sz="1700"/>
-              <a:t>, 2020</a:t>
-            </a:r>
-          </a:p>
-          <a:p>
-            <a:pPr lvl="1"/>
-            <a:r>
-              <a:rPr lang="en-US" sz="1700"/>
-              <a:t>Python implementation of a machine learning model capable of detecting if a lift is occurring in a segment of IMU data</a:t>
-            </a:r>
-          </a:p>
-          <a:p>
-            <a:r>
-              <a:rPr lang="en-US" sz="1700"/>
-              <a:t>Lift Classification – Jan 5</a:t>
-            </a:r>
-            <a:r>
-              <a:rPr lang="en-US" sz="1700" baseline="30000"/>
-              <a:t>th</a:t>
-            </a:r>
-            <a:r>
-              <a:rPr lang="en-US" sz="1700"/>
-              <a:t>, 2021</a:t>
-            </a:r>
-          </a:p>
-          <a:p>
-            <a:pPr lvl="1"/>
-            <a:r>
-              <a:rPr lang="en-US" sz="1700"/>
-              <a:t>Python implementation of a machine learning model capable of classifying a lift’s risk level from a segment of IMU data</a:t>
-            </a:r>
-          </a:p>
-          <a:p>
-            <a:r>
-              <a:rPr lang="en-US" sz="1700"/>
-              <a:t>Refinement – Feb 28</a:t>
-            </a:r>
-            <a:r>
-              <a:rPr lang="en-US" sz="1700" baseline="30000"/>
-              <a:t>th</a:t>
-            </a:r>
-            <a:r>
-              <a:rPr lang="en-US" sz="1700"/>
-              <a:t>, 2021</a:t>
-            </a:r>
-          </a:p>
-          <a:p>
-            <a:pPr lvl="1"/>
-            <a:r>
-              <a:rPr lang="en-US" sz="1700"/>
-              <a:t>Modifications to previous milestones based on possible improvements</a:t>
-            </a:r>
-          </a:p>
-        </p:txBody>
-      </p:sp>
-      <p:cxnSp>
-        <p:nvCxnSpPr>
-          <p:cNvPr id="17" name="Straight Connector 16">
-            <a:extLst>
-              <a:ext uri="{FF2B5EF4-FFF2-40B4-BE49-F238E27FC236}">
-                <a16:creationId xmlns:a16="http://schemas.microsoft.com/office/drawing/2014/main" id="{6CF1BAF6-AD41-4082-B212-8A1F9A2E8779}"/>
-              </a:ext>
-              <a:ext uri="{C183D7F6-B498-43B3-948B-1728B52AA6E4}">
-                <adec:decorative xmlns:adec="http://schemas.microsoft.com/office/drawing/2017/decorative" val="1"/>
-              </a:ext>
-            </a:extLst>
-          </p:cNvPr>
-          <p:cNvCxnSpPr>
-            <a:cxnSpLocks noGrp="1" noRot="1" noChangeAspect="1" noMove="1" noResize="1" noEditPoints="1" noAdjustHandles="1" noChangeArrowheads="1" noChangeShapeType="1"/>
-          </p:cNvCxnSpPr>
-          <p:nvPr>
-            <p:extLst>
-              <p:ext uri="{386F3935-93C4-4BCD-93E2-E3B085C9AB24}">
-                <p16:designElem xmlns:p16="http://schemas.microsoft.com/office/powerpoint/2015/main" val="1"/>
-              </p:ext>
-            </p:extLst>
-          </p:nvPr>
-        </p:nvCxnSpPr>
-        <p:spPr>
-          <a:xfrm flipH="1">
-            <a:off x="838200" y="6485313"/>
-            <a:ext cx="10515600" cy="0"/>
-          </a:xfrm>
-          <a:prstGeom prst="line">
-            <a:avLst/>
-          </a:prstGeom>
-          <a:ln w="57150">
-            <a:solidFill>
-              <a:schemeClr val="accent4"/>
-            </a:solidFill>
-          </a:ln>
-        </p:spPr>
-        <p:style>
-          <a:lnRef idx="1">
-            <a:schemeClr val="accent1"/>
-          </a:lnRef>
-          <a:fillRef idx="0">
-            <a:schemeClr val="accent1"/>
-          </a:fillRef>
-          <a:effectRef idx="0">
-            <a:schemeClr val="accent1"/>
-          </a:effectRef>
-          <a:fontRef idx="minor">
-            <a:schemeClr val="tx1"/>
-          </a:fontRef>
-        </p:style>
-      </p:cxnSp>
-    </p:spTree>
-    <p:extLst>
-      <p:ext uri="{BB962C8B-B14F-4D97-AF65-F5344CB8AC3E}">
-        <p14:creationId xmlns:p14="http://schemas.microsoft.com/office/powerpoint/2010/main" val="4227927210"/>
       </p:ext>
     </p:extLst>
   </p:cSld>

</xml_diff>